<commit_message>
EF Core v9 troubleshooting item
</commit_message>
<xml_diff>
--- a/images/graphics.pptx
+++ b/images/graphics.pptx
@@ -50,6 +50,11 @@
     <p:sldId id="300" r:id="rId44"/>
     <p:sldId id="301" r:id="rId45"/>
     <p:sldId id="302" r:id="rId46"/>
+    <p:sldId id="303" r:id="rId47"/>
+    <p:sldId id="304" r:id="rId48"/>
+    <p:sldId id="305" r:id="rId49"/>
+    <p:sldId id="306" r:id="rId50"/>
+    <p:sldId id="307" r:id="rId51"/>
   </p:sldIdLst>
   <p:sldSz cx="12192000" cy="6858000"/>
   <p:notesSz cx="6858000" cy="9144000"/>
@@ -3383,7 +3388,7 @@
           <a:p>
             <a:fld id="{E9175749-BE88-2442-8D84-DEA4B15C26FA}" type="datetimeFigureOut">
               <a:rPr lang="en-US" smtClean="0"/>
-              <a:t>1/8/25</a:t>
+              <a:t>2/15/25</a:t>
             </a:fld>
             <a:endParaRPr lang="en-US"/>
           </a:p>
@@ -3583,7 +3588,7 @@
           <a:p>
             <a:fld id="{E9175749-BE88-2442-8D84-DEA4B15C26FA}" type="datetimeFigureOut">
               <a:rPr lang="en-US" smtClean="0"/>
-              <a:t>1/8/25</a:t>
+              <a:t>2/15/25</a:t>
             </a:fld>
             <a:endParaRPr lang="en-US"/>
           </a:p>
@@ -3793,7 +3798,7 @@
           <a:p>
             <a:fld id="{E9175749-BE88-2442-8D84-DEA4B15C26FA}" type="datetimeFigureOut">
               <a:rPr lang="en-US" smtClean="0"/>
-              <a:t>1/8/25</a:t>
+              <a:t>2/15/25</a:t>
             </a:fld>
             <a:endParaRPr lang="en-US"/>
           </a:p>
@@ -3993,7 +3998,7 @@
           <a:p>
             <a:fld id="{E9175749-BE88-2442-8D84-DEA4B15C26FA}" type="datetimeFigureOut">
               <a:rPr lang="en-US" smtClean="0"/>
-              <a:t>1/8/25</a:t>
+              <a:t>2/15/25</a:t>
             </a:fld>
             <a:endParaRPr lang="en-US"/>
           </a:p>
@@ -4269,7 +4274,7 @@
           <a:p>
             <a:fld id="{E9175749-BE88-2442-8D84-DEA4B15C26FA}" type="datetimeFigureOut">
               <a:rPr lang="en-US" smtClean="0"/>
-              <a:t>1/8/25</a:t>
+              <a:t>2/15/25</a:t>
             </a:fld>
             <a:endParaRPr lang="en-US"/>
           </a:p>
@@ -4537,7 +4542,7 @@
           <a:p>
             <a:fld id="{E9175749-BE88-2442-8D84-DEA4B15C26FA}" type="datetimeFigureOut">
               <a:rPr lang="en-US" smtClean="0"/>
-              <a:t>1/8/25</a:t>
+              <a:t>2/15/25</a:t>
             </a:fld>
             <a:endParaRPr lang="en-US"/>
           </a:p>
@@ -4952,7 +4957,7 @@
           <a:p>
             <a:fld id="{E9175749-BE88-2442-8D84-DEA4B15C26FA}" type="datetimeFigureOut">
               <a:rPr lang="en-US" smtClean="0"/>
-              <a:t>1/8/25</a:t>
+              <a:t>2/15/25</a:t>
             </a:fld>
             <a:endParaRPr lang="en-US"/>
           </a:p>
@@ -5094,7 +5099,7 @@
           <a:p>
             <a:fld id="{E9175749-BE88-2442-8D84-DEA4B15C26FA}" type="datetimeFigureOut">
               <a:rPr lang="en-US" smtClean="0"/>
-              <a:t>1/8/25</a:t>
+              <a:t>2/15/25</a:t>
             </a:fld>
             <a:endParaRPr lang="en-US"/>
           </a:p>
@@ -5207,7 +5212,7 @@
           <a:p>
             <a:fld id="{E9175749-BE88-2442-8D84-DEA4B15C26FA}" type="datetimeFigureOut">
               <a:rPr lang="en-US" smtClean="0"/>
-              <a:t>1/8/25</a:t>
+              <a:t>2/15/25</a:t>
             </a:fld>
             <a:endParaRPr lang="en-US"/>
           </a:p>
@@ -5520,7 +5525,7 @@
           <a:p>
             <a:fld id="{E9175749-BE88-2442-8D84-DEA4B15C26FA}" type="datetimeFigureOut">
               <a:rPr lang="en-US" smtClean="0"/>
-              <a:t>1/8/25</a:t>
+              <a:t>2/15/25</a:t>
             </a:fld>
             <a:endParaRPr lang="en-US"/>
           </a:p>
@@ -5809,7 +5814,7 @@
           <a:p>
             <a:fld id="{E9175749-BE88-2442-8D84-DEA4B15C26FA}" type="datetimeFigureOut">
               <a:rPr lang="en-US" smtClean="0"/>
-              <a:t>1/8/25</a:t>
+              <a:t>2/15/25</a:t>
             </a:fld>
             <a:endParaRPr lang="en-US"/>
           </a:p>
@@ -6052,7 +6057,7 @@
           <a:p>
             <a:fld id="{E9175749-BE88-2442-8D84-DEA4B15C26FA}" type="datetimeFigureOut">
               <a:rPr lang="en-US" smtClean="0"/>
-              <a:t>1/8/25</a:t>
+              <a:t>2/15/25</a:t>
             </a:fld>
             <a:endParaRPr lang="en-US"/>
           </a:p>
@@ -37356,6 +37361,3082 @@
 </p:sld>
 </file>
 
+<file path=ppt/slides/slide46.xml><?xml version="1.0" encoding="utf-8"?>
+<p:sld xmlns:a="http://schemas.openxmlformats.org/drawingml/2006/main" xmlns:r="http://schemas.openxmlformats.org/officeDocument/2006/relationships" xmlns:p="http://schemas.openxmlformats.org/presentationml/2006/main">
+  <p:cSld>
+    <p:spTree>
+      <p:nvGrpSpPr>
+        <p:cNvPr id="1" name=""/>
+        <p:cNvGrpSpPr/>
+        <p:nvPr/>
+      </p:nvGrpSpPr>
+      <p:grpSpPr>
+        <a:xfrm>
+          <a:off x="0" y="0"/>
+          <a:ext cx="0" cy="0"/>
+          <a:chOff x="0" y="0"/>
+          <a:chExt cx="0" cy="0"/>
+        </a:xfrm>
+      </p:grpSpPr>
+      <p:sp>
+        <p:nvSpPr>
+          <p:cNvPr id="19" name="Pie 18">
+            <a:extLst>
+              <a:ext uri="{FF2B5EF4-FFF2-40B4-BE49-F238E27FC236}">
+                <a16:creationId xmlns:a16="http://schemas.microsoft.com/office/drawing/2014/main" id="{E1BEEB4C-DE12-E0D9-8519-1FE39FFE7E12}"/>
+              </a:ext>
+            </a:extLst>
+          </p:cNvPr>
+          <p:cNvSpPr/>
+          <p:nvPr/>
+        </p:nvSpPr>
+        <p:spPr>
+          <a:xfrm>
+            <a:off x="2142796" y="1217275"/>
+            <a:ext cx="6455979" cy="6455979"/>
+          </a:xfrm>
+          <a:prstGeom prst="pie">
+            <a:avLst>
+              <a:gd name="adj1" fmla="val 13496630"/>
+              <a:gd name="adj2" fmla="val 15299189"/>
+            </a:avLst>
+          </a:prstGeom>
+          <a:solidFill>
+            <a:schemeClr val="accent6"/>
+          </a:solidFill>
+          <a:ln>
+            <a:solidFill>
+              <a:schemeClr val="accent6"/>
+            </a:solidFill>
+          </a:ln>
+        </p:spPr>
+        <p:style>
+          <a:lnRef idx="1">
+            <a:schemeClr val="accent2"/>
+          </a:lnRef>
+          <a:fillRef idx="3">
+            <a:schemeClr val="accent2"/>
+          </a:fillRef>
+          <a:effectRef idx="2">
+            <a:schemeClr val="accent2"/>
+          </a:effectRef>
+          <a:fontRef idx="minor">
+            <a:schemeClr val="lt1"/>
+          </a:fontRef>
+        </p:style>
+        <p:txBody>
+          <a:bodyPr rtlCol="0" anchor="ctr"/>
+          <a:lstStyle/>
+          <a:p>
+            <a:pPr algn="ctr"/>
+            <a:endParaRPr lang="en-US">
+              <a:solidFill>
+                <a:schemeClr val="tx1"/>
+              </a:solidFill>
+            </a:endParaRPr>
+          </a:p>
+        </p:txBody>
+      </p:sp>
+      <p:sp>
+        <p:nvSpPr>
+          <p:cNvPr id="20" name="Pie 19">
+            <a:extLst>
+              <a:ext uri="{FF2B5EF4-FFF2-40B4-BE49-F238E27FC236}">
+                <a16:creationId xmlns:a16="http://schemas.microsoft.com/office/drawing/2014/main" id="{AF5C9C0C-3CCA-1568-1C67-AFE75A419A4A}"/>
+              </a:ext>
+            </a:extLst>
+          </p:cNvPr>
+          <p:cNvSpPr/>
+          <p:nvPr/>
+        </p:nvSpPr>
+        <p:spPr>
+          <a:xfrm rot="1812557">
+            <a:off x="2142796" y="1217274"/>
+            <a:ext cx="6455979" cy="6455979"/>
+          </a:xfrm>
+          <a:prstGeom prst="pie">
+            <a:avLst>
+              <a:gd name="adj1" fmla="val 13496630"/>
+              <a:gd name="adj2" fmla="val 15299189"/>
+            </a:avLst>
+          </a:prstGeom>
+          <a:solidFill>
+            <a:schemeClr val="accent6">
+              <a:lumMod val="60000"/>
+              <a:lumOff val="40000"/>
+            </a:schemeClr>
+          </a:solidFill>
+          <a:ln>
+            <a:solidFill>
+              <a:schemeClr val="accent6"/>
+            </a:solidFill>
+          </a:ln>
+        </p:spPr>
+        <p:style>
+          <a:lnRef idx="1">
+            <a:schemeClr val="accent2"/>
+          </a:lnRef>
+          <a:fillRef idx="3">
+            <a:schemeClr val="accent2"/>
+          </a:fillRef>
+          <a:effectRef idx="2">
+            <a:schemeClr val="accent2"/>
+          </a:effectRef>
+          <a:fontRef idx="minor">
+            <a:schemeClr val="lt1"/>
+          </a:fontRef>
+        </p:style>
+        <p:txBody>
+          <a:bodyPr rtlCol="0" anchor="ctr"/>
+          <a:lstStyle/>
+          <a:p>
+            <a:pPr algn="ctr"/>
+            <a:endParaRPr lang="en-US">
+              <a:solidFill>
+                <a:schemeClr val="tx1"/>
+              </a:solidFill>
+            </a:endParaRPr>
+          </a:p>
+        </p:txBody>
+      </p:sp>
+      <p:sp>
+        <p:nvSpPr>
+          <p:cNvPr id="21" name="Pie 20">
+            <a:extLst>
+              <a:ext uri="{FF2B5EF4-FFF2-40B4-BE49-F238E27FC236}">
+                <a16:creationId xmlns:a16="http://schemas.microsoft.com/office/drawing/2014/main" id="{9407958D-721C-E8F6-0DC5-92FA3E062AC1}"/>
+              </a:ext>
+            </a:extLst>
+          </p:cNvPr>
+          <p:cNvSpPr/>
+          <p:nvPr/>
+        </p:nvSpPr>
+        <p:spPr>
+          <a:xfrm rot="3622541">
+            <a:off x="2130667" y="1217274"/>
+            <a:ext cx="6455979" cy="6455979"/>
+          </a:xfrm>
+          <a:prstGeom prst="pie">
+            <a:avLst>
+              <a:gd name="adj1" fmla="val 13496630"/>
+              <a:gd name="adj2" fmla="val 15299189"/>
+            </a:avLst>
+          </a:prstGeom>
+          <a:solidFill>
+            <a:schemeClr val="accent6"/>
+          </a:solidFill>
+          <a:ln>
+            <a:solidFill>
+              <a:schemeClr val="accent6"/>
+            </a:solidFill>
+          </a:ln>
+        </p:spPr>
+        <p:style>
+          <a:lnRef idx="1">
+            <a:schemeClr val="accent2"/>
+          </a:lnRef>
+          <a:fillRef idx="3">
+            <a:schemeClr val="accent2"/>
+          </a:fillRef>
+          <a:effectRef idx="2">
+            <a:schemeClr val="accent2"/>
+          </a:effectRef>
+          <a:fontRef idx="minor">
+            <a:schemeClr val="lt1"/>
+          </a:fontRef>
+        </p:style>
+        <p:txBody>
+          <a:bodyPr rtlCol="0" anchor="ctr"/>
+          <a:lstStyle/>
+          <a:p>
+            <a:pPr algn="ctr"/>
+            <a:endParaRPr lang="en-US">
+              <a:solidFill>
+                <a:schemeClr val="tx1"/>
+              </a:solidFill>
+            </a:endParaRPr>
+          </a:p>
+        </p:txBody>
+      </p:sp>
+      <p:sp>
+        <p:nvSpPr>
+          <p:cNvPr id="22" name="Pie 21">
+            <a:extLst>
+              <a:ext uri="{FF2B5EF4-FFF2-40B4-BE49-F238E27FC236}">
+                <a16:creationId xmlns:a16="http://schemas.microsoft.com/office/drawing/2014/main" id="{97FEF0F6-CE83-1C9E-4B9C-92D5EF7CD33A}"/>
+              </a:ext>
+            </a:extLst>
+          </p:cNvPr>
+          <p:cNvSpPr/>
+          <p:nvPr/>
+        </p:nvSpPr>
+        <p:spPr>
+          <a:xfrm rot="5400000">
+            <a:off x="2118539" y="1205147"/>
+            <a:ext cx="6455979" cy="6455979"/>
+          </a:xfrm>
+          <a:prstGeom prst="pie">
+            <a:avLst>
+              <a:gd name="adj1" fmla="val 13496630"/>
+              <a:gd name="adj2" fmla="val 15299189"/>
+            </a:avLst>
+          </a:prstGeom>
+          <a:solidFill>
+            <a:schemeClr val="accent6">
+              <a:lumMod val="60000"/>
+              <a:lumOff val="40000"/>
+            </a:schemeClr>
+          </a:solidFill>
+          <a:ln>
+            <a:solidFill>
+              <a:schemeClr val="accent6"/>
+            </a:solidFill>
+          </a:ln>
+        </p:spPr>
+        <p:style>
+          <a:lnRef idx="1">
+            <a:schemeClr val="accent2"/>
+          </a:lnRef>
+          <a:fillRef idx="3">
+            <a:schemeClr val="accent2"/>
+          </a:fillRef>
+          <a:effectRef idx="2">
+            <a:schemeClr val="accent2"/>
+          </a:effectRef>
+          <a:fontRef idx="minor">
+            <a:schemeClr val="lt1"/>
+          </a:fontRef>
+        </p:style>
+        <p:txBody>
+          <a:bodyPr rtlCol="0" anchor="ctr"/>
+          <a:lstStyle/>
+          <a:p>
+            <a:pPr algn="ctr"/>
+            <a:endParaRPr lang="en-US">
+              <a:solidFill>
+                <a:schemeClr val="tx1"/>
+              </a:solidFill>
+            </a:endParaRPr>
+          </a:p>
+        </p:txBody>
+      </p:sp>
+      <p:sp>
+        <p:nvSpPr>
+          <p:cNvPr id="23" name="Pie 22">
+            <a:extLst>
+              <a:ext uri="{FF2B5EF4-FFF2-40B4-BE49-F238E27FC236}">
+                <a16:creationId xmlns:a16="http://schemas.microsoft.com/office/drawing/2014/main" id="{90F00601-24CD-212F-7248-BDF06E59805B}"/>
+              </a:ext>
+            </a:extLst>
+          </p:cNvPr>
+          <p:cNvSpPr/>
+          <p:nvPr/>
+        </p:nvSpPr>
+        <p:spPr>
+          <a:xfrm rot="7219556">
+            <a:off x="2116176" y="1202781"/>
+            <a:ext cx="6455979" cy="6455979"/>
+          </a:xfrm>
+          <a:prstGeom prst="pie">
+            <a:avLst>
+              <a:gd name="adj1" fmla="val 13496630"/>
+              <a:gd name="adj2" fmla="val 15299189"/>
+            </a:avLst>
+          </a:prstGeom>
+          <a:solidFill>
+            <a:schemeClr val="accent6"/>
+          </a:solidFill>
+          <a:ln>
+            <a:solidFill>
+              <a:schemeClr val="accent6"/>
+            </a:solidFill>
+          </a:ln>
+        </p:spPr>
+        <p:style>
+          <a:lnRef idx="1">
+            <a:schemeClr val="accent2"/>
+          </a:lnRef>
+          <a:fillRef idx="3">
+            <a:schemeClr val="accent2"/>
+          </a:fillRef>
+          <a:effectRef idx="2">
+            <a:schemeClr val="accent2"/>
+          </a:effectRef>
+          <a:fontRef idx="minor">
+            <a:schemeClr val="lt1"/>
+          </a:fontRef>
+        </p:style>
+        <p:txBody>
+          <a:bodyPr rtlCol="0" anchor="ctr"/>
+          <a:lstStyle/>
+          <a:p>
+            <a:pPr algn="ctr"/>
+            <a:endParaRPr lang="en-US">
+              <a:solidFill>
+                <a:schemeClr val="tx1"/>
+              </a:solidFill>
+            </a:endParaRPr>
+          </a:p>
+        </p:txBody>
+      </p:sp>
+      <p:sp>
+        <p:nvSpPr>
+          <p:cNvPr id="24" name="Pie 23">
+            <a:extLst>
+              <a:ext uri="{FF2B5EF4-FFF2-40B4-BE49-F238E27FC236}">
+                <a16:creationId xmlns:a16="http://schemas.microsoft.com/office/drawing/2014/main" id="{DFF70D07-CF55-A5C8-DCAE-272AFDD1502F}"/>
+              </a:ext>
+            </a:extLst>
+          </p:cNvPr>
+          <p:cNvSpPr/>
+          <p:nvPr/>
+        </p:nvSpPr>
+        <p:spPr>
+          <a:xfrm rot="19801887">
+            <a:off x="2176716" y="1195480"/>
+            <a:ext cx="6455979" cy="6455979"/>
+          </a:xfrm>
+          <a:prstGeom prst="pie">
+            <a:avLst>
+              <a:gd name="adj1" fmla="val 13496630"/>
+              <a:gd name="adj2" fmla="val 15299189"/>
+            </a:avLst>
+          </a:prstGeom>
+          <a:solidFill>
+            <a:schemeClr val="accent6">
+              <a:lumMod val="60000"/>
+              <a:lumOff val="40000"/>
+            </a:schemeClr>
+          </a:solidFill>
+          <a:ln>
+            <a:solidFill>
+              <a:schemeClr val="accent6"/>
+            </a:solidFill>
+          </a:ln>
+        </p:spPr>
+        <p:style>
+          <a:lnRef idx="1">
+            <a:schemeClr val="accent2"/>
+          </a:lnRef>
+          <a:fillRef idx="3">
+            <a:schemeClr val="accent2"/>
+          </a:fillRef>
+          <a:effectRef idx="2">
+            <a:schemeClr val="accent2"/>
+          </a:effectRef>
+          <a:fontRef idx="minor">
+            <a:schemeClr val="lt1"/>
+          </a:fontRef>
+        </p:style>
+        <p:txBody>
+          <a:bodyPr rtlCol="0" anchor="ctr"/>
+          <a:lstStyle/>
+          <a:p>
+            <a:pPr algn="ctr"/>
+            <a:endParaRPr lang="en-US">
+              <a:solidFill>
+                <a:schemeClr val="tx1"/>
+              </a:solidFill>
+            </a:endParaRPr>
+          </a:p>
+        </p:txBody>
+      </p:sp>
+      <p:sp>
+        <p:nvSpPr>
+          <p:cNvPr id="25" name="Pie 24">
+            <a:extLst>
+              <a:ext uri="{FF2B5EF4-FFF2-40B4-BE49-F238E27FC236}">
+                <a16:creationId xmlns:a16="http://schemas.microsoft.com/office/drawing/2014/main" id="{ED1BE790-E385-C6DC-D72B-A2AF49E31CEE}"/>
+              </a:ext>
+            </a:extLst>
+          </p:cNvPr>
+          <p:cNvSpPr/>
+          <p:nvPr/>
+        </p:nvSpPr>
+        <p:spPr>
+          <a:xfrm rot="17991081">
+            <a:off x="2176715" y="1178447"/>
+            <a:ext cx="6455979" cy="6455979"/>
+          </a:xfrm>
+          <a:prstGeom prst="pie">
+            <a:avLst>
+              <a:gd name="adj1" fmla="val 13496630"/>
+              <a:gd name="adj2" fmla="val 15299189"/>
+            </a:avLst>
+          </a:prstGeom>
+          <a:solidFill>
+            <a:schemeClr val="accent6"/>
+          </a:solidFill>
+          <a:ln>
+            <a:solidFill>
+              <a:schemeClr val="accent6"/>
+            </a:solidFill>
+          </a:ln>
+        </p:spPr>
+        <p:style>
+          <a:lnRef idx="1">
+            <a:schemeClr val="accent2"/>
+          </a:lnRef>
+          <a:fillRef idx="3">
+            <a:schemeClr val="accent2"/>
+          </a:fillRef>
+          <a:effectRef idx="2">
+            <a:schemeClr val="accent2"/>
+          </a:effectRef>
+          <a:fontRef idx="minor">
+            <a:schemeClr val="lt1"/>
+          </a:fontRef>
+        </p:style>
+        <p:txBody>
+          <a:bodyPr rtlCol="0" anchor="ctr"/>
+          <a:lstStyle/>
+          <a:p>
+            <a:pPr algn="ctr"/>
+            <a:endParaRPr lang="en-US">
+              <a:solidFill>
+                <a:schemeClr val="tx1"/>
+              </a:solidFill>
+            </a:endParaRPr>
+          </a:p>
+        </p:txBody>
+      </p:sp>
+      <p:sp>
+        <p:nvSpPr>
+          <p:cNvPr id="4" name="Pie 3">
+            <a:extLst>
+              <a:ext uri="{FF2B5EF4-FFF2-40B4-BE49-F238E27FC236}">
+                <a16:creationId xmlns:a16="http://schemas.microsoft.com/office/drawing/2014/main" id="{51EF9F9B-C802-7D74-CC69-FDF3D87132D9}"/>
+              </a:ext>
+            </a:extLst>
+          </p:cNvPr>
+          <p:cNvSpPr/>
+          <p:nvPr/>
+        </p:nvSpPr>
+        <p:spPr>
+          <a:xfrm>
+            <a:off x="3244704" y="2297253"/>
+            <a:ext cx="4320000" cy="4320000"/>
+          </a:xfrm>
+          <a:prstGeom prst="pie">
+            <a:avLst>
+              <a:gd name="adj1" fmla="val 13496630"/>
+              <a:gd name="adj2" fmla="val 15299189"/>
+            </a:avLst>
+          </a:prstGeom>
+        </p:spPr>
+        <p:style>
+          <a:lnRef idx="1">
+            <a:schemeClr val="accent2"/>
+          </a:lnRef>
+          <a:fillRef idx="3">
+            <a:schemeClr val="accent2"/>
+          </a:fillRef>
+          <a:effectRef idx="2">
+            <a:schemeClr val="accent2"/>
+          </a:effectRef>
+          <a:fontRef idx="minor">
+            <a:schemeClr val="lt1"/>
+          </a:fontRef>
+        </p:style>
+        <p:txBody>
+          <a:bodyPr rtlCol="0" anchor="ctr"/>
+          <a:lstStyle/>
+          <a:p>
+            <a:pPr algn="ctr"/>
+            <a:endParaRPr lang="en-US">
+              <a:solidFill>
+                <a:schemeClr val="tx1"/>
+              </a:solidFill>
+            </a:endParaRPr>
+          </a:p>
+        </p:txBody>
+      </p:sp>
+      <p:sp>
+        <p:nvSpPr>
+          <p:cNvPr id="5" name="Pie 4">
+            <a:extLst>
+              <a:ext uri="{FF2B5EF4-FFF2-40B4-BE49-F238E27FC236}">
+                <a16:creationId xmlns:a16="http://schemas.microsoft.com/office/drawing/2014/main" id="{23888CED-C3CD-422A-0B20-4BB995CDB545}"/>
+              </a:ext>
+            </a:extLst>
+          </p:cNvPr>
+          <p:cNvSpPr/>
+          <p:nvPr/>
+        </p:nvSpPr>
+        <p:spPr>
+          <a:xfrm rot="1812557">
+            <a:off x="3224585" y="2293812"/>
+            <a:ext cx="4320000" cy="4320000"/>
+          </a:xfrm>
+          <a:prstGeom prst="pie">
+            <a:avLst>
+              <a:gd name="adj1" fmla="val 13496630"/>
+              <a:gd name="adj2" fmla="val 15299189"/>
+            </a:avLst>
+          </a:prstGeom>
+          <a:solidFill>
+            <a:schemeClr val="accent2">
+              <a:lumMod val="60000"/>
+              <a:lumOff val="40000"/>
+            </a:schemeClr>
+          </a:solidFill>
+        </p:spPr>
+        <p:style>
+          <a:lnRef idx="1">
+            <a:schemeClr val="accent2"/>
+          </a:lnRef>
+          <a:fillRef idx="3">
+            <a:schemeClr val="accent2"/>
+          </a:fillRef>
+          <a:effectRef idx="2">
+            <a:schemeClr val="accent2"/>
+          </a:effectRef>
+          <a:fontRef idx="minor">
+            <a:schemeClr val="lt1"/>
+          </a:fontRef>
+        </p:style>
+        <p:txBody>
+          <a:bodyPr rtlCol="0" anchor="ctr"/>
+          <a:lstStyle/>
+          <a:p>
+            <a:pPr algn="ctr"/>
+            <a:endParaRPr lang="en-US">
+              <a:solidFill>
+                <a:schemeClr val="tx1"/>
+              </a:solidFill>
+            </a:endParaRPr>
+          </a:p>
+        </p:txBody>
+      </p:sp>
+      <p:sp>
+        <p:nvSpPr>
+          <p:cNvPr id="6" name="Pie 5">
+            <a:extLst>
+              <a:ext uri="{FF2B5EF4-FFF2-40B4-BE49-F238E27FC236}">
+                <a16:creationId xmlns:a16="http://schemas.microsoft.com/office/drawing/2014/main" id="{FAE3CB77-5F69-D18C-B457-8EE9B3B4FE87}"/>
+              </a:ext>
+            </a:extLst>
+          </p:cNvPr>
+          <p:cNvSpPr/>
+          <p:nvPr/>
+        </p:nvSpPr>
+        <p:spPr>
+          <a:xfrm rot="3622541">
+            <a:off x="3197120" y="2297825"/>
+            <a:ext cx="4320000" cy="4320000"/>
+          </a:xfrm>
+          <a:prstGeom prst="pie">
+            <a:avLst>
+              <a:gd name="adj1" fmla="val 13496630"/>
+              <a:gd name="adj2" fmla="val 15299189"/>
+            </a:avLst>
+          </a:prstGeom>
+          <a:solidFill>
+            <a:schemeClr val="accent2"/>
+          </a:solidFill>
+        </p:spPr>
+        <p:style>
+          <a:lnRef idx="1">
+            <a:schemeClr val="accent2"/>
+          </a:lnRef>
+          <a:fillRef idx="3">
+            <a:schemeClr val="accent2"/>
+          </a:fillRef>
+          <a:effectRef idx="2">
+            <a:schemeClr val="accent2"/>
+          </a:effectRef>
+          <a:fontRef idx="minor">
+            <a:schemeClr val="lt1"/>
+          </a:fontRef>
+        </p:style>
+        <p:txBody>
+          <a:bodyPr rtlCol="0" anchor="ctr"/>
+          <a:lstStyle/>
+          <a:p>
+            <a:pPr algn="ctr"/>
+            <a:endParaRPr lang="en-US">
+              <a:solidFill>
+                <a:schemeClr val="tx1"/>
+              </a:solidFill>
+            </a:endParaRPr>
+          </a:p>
+        </p:txBody>
+      </p:sp>
+      <p:sp>
+        <p:nvSpPr>
+          <p:cNvPr id="7" name="Pie 6">
+            <a:extLst>
+              <a:ext uri="{FF2B5EF4-FFF2-40B4-BE49-F238E27FC236}">
+                <a16:creationId xmlns:a16="http://schemas.microsoft.com/office/drawing/2014/main" id="{F220C6A6-6346-1F8C-7789-E8083713CAE1}"/>
+              </a:ext>
+            </a:extLst>
+          </p:cNvPr>
+          <p:cNvSpPr/>
+          <p:nvPr/>
+        </p:nvSpPr>
+        <p:spPr>
+          <a:xfrm rot="5400000">
+            <a:off x="3174616" y="2270770"/>
+            <a:ext cx="4320000" cy="4320000"/>
+          </a:xfrm>
+          <a:prstGeom prst="pie">
+            <a:avLst>
+              <a:gd name="adj1" fmla="val 13496630"/>
+              <a:gd name="adj2" fmla="val 15299189"/>
+            </a:avLst>
+          </a:prstGeom>
+          <a:solidFill>
+            <a:schemeClr val="accent2">
+              <a:lumMod val="60000"/>
+              <a:lumOff val="40000"/>
+            </a:schemeClr>
+          </a:solidFill>
+        </p:spPr>
+        <p:style>
+          <a:lnRef idx="1">
+            <a:schemeClr val="accent2"/>
+          </a:lnRef>
+          <a:fillRef idx="3">
+            <a:schemeClr val="accent2"/>
+          </a:fillRef>
+          <a:effectRef idx="2">
+            <a:schemeClr val="accent2"/>
+          </a:effectRef>
+          <a:fontRef idx="minor">
+            <a:schemeClr val="lt1"/>
+          </a:fontRef>
+        </p:style>
+        <p:txBody>
+          <a:bodyPr rtlCol="0" anchor="ctr"/>
+          <a:lstStyle/>
+          <a:p>
+            <a:pPr algn="ctr"/>
+            <a:endParaRPr lang="en-US">
+              <a:solidFill>
+                <a:schemeClr val="tx1"/>
+              </a:solidFill>
+            </a:endParaRPr>
+          </a:p>
+        </p:txBody>
+      </p:sp>
+      <p:sp>
+        <p:nvSpPr>
+          <p:cNvPr id="8" name="Pie 7">
+            <a:extLst>
+              <a:ext uri="{FF2B5EF4-FFF2-40B4-BE49-F238E27FC236}">
+                <a16:creationId xmlns:a16="http://schemas.microsoft.com/office/drawing/2014/main" id="{C6B4B5D4-4BB1-75F4-1C8C-5BAA4646459F}"/>
+              </a:ext>
+            </a:extLst>
+          </p:cNvPr>
+          <p:cNvSpPr/>
+          <p:nvPr/>
+        </p:nvSpPr>
+        <p:spPr>
+          <a:xfrm rot="7219556">
+            <a:off x="3174616" y="2268910"/>
+            <a:ext cx="4320000" cy="4320000"/>
+          </a:xfrm>
+          <a:prstGeom prst="pie">
+            <a:avLst>
+              <a:gd name="adj1" fmla="val 13496630"/>
+              <a:gd name="adj2" fmla="val 15299189"/>
+            </a:avLst>
+          </a:prstGeom>
+          <a:solidFill>
+            <a:schemeClr val="accent2"/>
+          </a:solidFill>
+        </p:spPr>
+        <p:style>
+          <a:lnRef idx="1">
+            <a:schemeClr val="accent2"/>
+          </a:lnRef>
+          <a:fillRef idx="3">
+            <a:schemeClr val="accent2"/>
+          </a:fillRef>
+          <a:effectRef idx="2">
+            <a:schemeClr val="accent2"/>
+          </a:effectRef>
+          <a:fontRef idx="minor">
+            <a:schemeClr val="lt1"/>
+          </a:fontRef>
+        </p:style>
+        <p:txBody>
+          <a:bodyPr rtlCol="0" anchor="ctr"/>
+          <a:lstStyle/>
+          <a:p>
+            <a:pPr algn="ctr"/>
+            <a:endParaRPr lang="en-US">
+              <a:solidFill>
+                <a:schemeClr val="tx1"/>
+              </a:solidFill>
+            </a:endParaRPr>
+          </a:p>
+        </p:txBody>
+      </p:sp>
+      <p:sp>
+        <p:nvSpPr>
+          <p:cNvPr id="9" name="Pie 8">
+            <a:extLst>
+              <a:ext uri="{FF2B5EF4-FFF2-40B4-BE49-F238E27FC236}">
+                <a16:creationId xmlns:a16="http://schemas.microsoft.com/office/drawing/2014/main" id="{83632897-B3D6-A857-A104-17452BE61520}"/>
+              </a:ext>
+            </a:extLst>
+          </p:cNvPr>
+          <p:cNvSpPr/>
+          <p:nvPr/>
+        </p:nvSpPr>
+        <p:spPr>
+          <a:xfrm rot="19801887">
+            <a:off x="3269302" y="2277881"/>
+            <a:ext cx="4320000" cy="4320000"/>
+          </a:xfrm>
+          <a:prstGeom prst="pie">
+            <a:avLst>
+              <a:gd name="adj1" fmla="val 13496630"/>
+              <a:gd name="adj2" fmla="val 15299189"/>
+            </a:avLst>
+          </a:prstGeom>
+          <a:solidFill>
+            <a:schemeClr val="accent2">
+              <a:lumMod val="60000"/>
+              <a:lumOff val="40000"/>
+            </a:schemeClr>
+          </a:solidFill>
+        </p:spPr>
+        <p:style>
+          <a:lnRef idx="1">
+            <a:schemeClr val="accent2"/>
+          </a:lnRef>
+          <a:fillRef idx="3">
+            <a:schemeClr val="accent2"/>
+          </a:fillRef>
+          <a:effectRef idx="2">
+            <a:schemeClr val="accent2"/>
+          </a:effectRef>
+          <a:fontRef idx="minor">
+            <a:schemeClr val="lt1"/>
+          </a:fontRef>
+        </p:style>
+        <p:txBody>
+          <a:bodyPr rtlCol="0" anchor="ctr"/>
+          <a:lstStyle/>
+          <a:p>
+            <a:pPr algn="ctr"/>
+            <a:endParaRPr lang="en-US">
+              <a:solidFill>
+                <a:schemeClr val="tx1"/>
+              </a:solidFill>
+            </a:endParaRPr>
+          </a:p>
+        </p:txBody>
+      </p:sp>
+      <p:sp>
+        <p:nvSpPr>
+          <p:cNvPr id="10" name="Pie 9">
+            <a:extLst>
+              <a:ext uri="{FF2B5EF4-FFF2-40B4-BE49-F238E27FC236}">
+                <a16:creationId xmlns:a16="http://schemas.microsoft.com/office/drawing/2014/main" id="{C9AB71FB-9C9E-66AB-10C3-7853830248C6}"/>
+              </a:ext>
+            </a:extLst>
+          </p:cNvPr>
+          <p:cNvSpPr/>
+          <p:nvPr/>
+        </p:nvSpPr>
+        <p:spPr>
+          <a:xfrm rot="17991081">
+            <a:off x="3273121" y="2240896"/>
+            <a:ext cx="4320000" cy="4320000"/>
+          </a:xfrm>
+          <a:prstGeom prst="pie">
+            <a:avLst>
+              <a:gd name="adj1" fmla="val 13496630"/>
+              <a:gd name="adj2" fmla="val 15299189"/>
+            </a:avLst>
+          </a:prstGeom>
+          <a:solidFill>
+            <a:schemeClr val="accent2"/>
+          </a:solidFill>
+        </p:spPr>
+        <p:style>
+          <a:lnRef idx="1">
+            <a:schemeClr val="accent2"/>
+          </a:lnRef>
+          <a:fillRef idx="3">
+            <a:schemeClr val="accent2"/>
+          </a:fillRef>
+          <a:effectRef idx="2">
+            <a:schemeClr val="accent2"/>
+          </a:effectRef>
+          <a:fontRef idx="minor">
+            <a:schemeClr val="lt1"/>
+          </a:fontRef>
+        </p:style>
+        <p:txBody>
+          <a:bodyPr rtlCol="0" anchor="ctr"/>
+          <a:lstStyle/>
+          <a:p>
+            <a:pPr algn="ctr"/>
+            <a:endParaRPr lang="en-US">
+              <a:solidFill>
+                <a:schemeClr val="tx1"/>
+              </a:solidFill>
+            </a:endParaRPr>
+          </a:p>
+        </p:txBody>
+      </p:sp>
+      <p:sp>
+        <p:nvSpPr>
+          <p:cNvPr id="26" name="Oval 25">
+            <a:extLst>
+              <a:ext uri="{FF2B5EF4-FFF2-40B4-BE49-F238E27FC236}">
+                <a16:creationId xmlns:a16="http://schemas.microsoft.com/office/drawing/2014/main" id="{3C1C1314-6FA6-3A66-EA95-B34AEC6FA0A9}"/>
+              </a:ext>
+            </a:extLst>
+          </p:cNvPr>
+          <p:cNvSpPr/>
+          <p:nvPr/>
+        </p:nvSpPr>
+        <p:spPr>
+          <a:xfrm>
+            <a:off x="4487917" y="3549843"/>
+            <a:ext cx="1707930" cy="1707930"/>
+          </a:xfrm>
+          <a:prstGeom prst="ellipse">
+            <a:avLst/>
+          </a:prstGeom>
+        </p:spPr>
+        <p:style>
+          <a:lnRef idx="2">
+            <a:schemeClr val="accent1">
+              <a:shade val="15000"/>
+            </a:schemeClr>
+          </a:lnRef>
+          <a:fillRef idx="1">
+            <a:schemeClr val="accent1"/>
+          </a:fillRef>
+          <a:effectRef idx="0">
+            <a:schemeClr val="accent1"/>
+          </a:effectRef>
+          <a:fontRef idx="minor">
+            <a:schemeClr val="lt1"/>
+          </a:fontRef>
+        </p:style>
+        <p:txBody>
+          <a:bodyPr rtlCol="0" anchor="ctr"/>
+          <a:lstStyle/>
+          <a:p>
+            <a:pPr algn="ctr"/>
+            <a:r>
+              <a:rPr lang="en-US"/>
+              <a:t>Agent</a:t>
+            </a:r>
+          </a:p>
+        </p:txBody>
+      </p:sp>
+      <p:sp>
+        <p:nvSpPr>
+          <p:cNvPr id="27" name="TextBox 26">
+            <a:extLst>
+              <a:ext uri="{FF2B5EF4-FFF2-40B4-BE49-F238E27FC236}">
+                <a16:creationId xmlns:a16="http://schemas.microsoft.com/office/drawing/2014/main" id="{C95598E1-05D1-E4CB-6EB4-3ECA92112376}"/>
+              </a:ext>
+            </a:extLst>
+          </p:cNvPr>
+          <p:cNvSpPr txBox="1"/>
+          <p:nvPr/>
+        </p:nvSpPr>
+        <p:spPr>
+          <a:xfrm>
+            <a:off x="3418917" y="4234531"/>
+            <a:ext cx="851900" cy="338554"/>
+          </a:xfrm>
+          <a:prstGeom prst="rect">
+            <a:avLst/>
+          </a:prstGeom>
+          <a:noFill/>
+        </p:spPr>
+        <p:txBody>
+          <a:bodyPr wrap="none" rtlCol="0">
+            <a:spAutoFit/>
+          </a:bodyPr>
+          <a:lstStyle/>
+          <a:p>
+            <a:r>
+              <a:rPr lang="en-US" sz="1600"/>
+              <a:t>Persona</a:t>
+            </a:r>
+          </a:p>
+        </p:txBody>
+      </p:sp>
+      <p:sp>
+        <p:nvSpPr>
+          <p:cNvPr id="28" name="TextBox 27">
+            <a:extLst>
+              <a:ext uri="{FF2B5EF4-FFF2-40B4-BE49-F238E27FC236}">
+                <a16:creationId xmlns:a16="http://schemas.microsoft.com/office/drawing/2014/main" id="{8247458B-245B-6063-DF7A-E91D013C54D3}"/>
+              </a:ext>
+            </a:extLst>
+          </p:cNvPr>
+          <p:cNvSpPr txBox="1"/>
+          <p:nvPr/>
+        </p:nvSpPr>
+        <p:spPr>
+          <a:xfrm>
+            <a:off x="3533375" y="3554723"/>
+            <a:ext cx="1088055" cy="338554"/>
+          </a:xfrm>
+          <a:prstGeom prst="rect">
+            <a:avLst/>
+          </a:prstGeom>
+          <a:noFill/>
+        </p:spPr>
+        <p:txBody>
+          <a:bodyPr wrap="none" rtlCol="0">
+            <a:spAutoFit/>
+          </a:bodyPr>
+          <a:lstStyle/>
+          <a:p>
+            <a:r>
+              <a:rPr lang="en-US" sz="1600"/>
+              <a:t>Instruction</a:t>
+            </a:r>
+          </a:p>
+        </p:txBody>
+      </p:sp>
+      <p:sp>
+        <p:nvSpPr>
+          <p:cNvPr id="29" name="TextBox 28">
+            <a:extLst>
+              <a:ext uri="{FF2B5EF4-FFF2-40B4-BE49-F238E27FC236}">
+                <a16:creationId xmlns:a16="http://schemas.microsoft.com/office/drawing/2014/main" id="{7E7D2AF1-9CB2-2952-CF7C-A350659BE89A}"/>
+              </a:ext>
+            </a:extLst>
+          </p:cNvPr>
+          <p:cNvSpPr txBox="1"/>
+          <p:nvPr/>
+        </p:nvSpPr>
+        <p:spPr>
+          <a:xfrm>
+            <a:off x="4296670" y="2937622"/>
+            <a:ext cx="538930" cy="338554"/>
+          </a:xfrm>
+          <a:prstGeom prst="rect">
+            <a:avLst/>
+          </a:prstGeom>
+          <a:noFill/>
+        </p:spPr>
+        <p:txBody>
+          <a:bodyPr wrap="none" rtlCol="0">
+            <a:spAutoFit/>
+          </a:bodyPr>
+          <a:lstStyle/>
+          <a:p>
+            <a:r>
+              <a:rPr lang="en-US" sz="1600"/>
+              <a:t>Task</a:t>
+            </a:r>
+          </a:p>
+        </p:txBody>
+      </p:sp>
+      <p:sp>
+        <p:nvSpPr>
+          <p:cNvPr id="30" name="TextBox 29">
+            <a:extLst>
+              <a:ext uri="{FF2B5EF4-FFF2-40B4-BE49-F238E27FC236}">
+                <a16:creationId xmlns:a16="http://schemas.microsoft.com/office/drawing/2014/main" id="{6C3A9295-A8B4-B9A3-7098-B66E69AE348A}"/>
+              </a:ext>
+            </a:extLst>
+          </p:cNvPr>
+          <p:cNvSpPr txBox="1"/>
+          <p:nvPr/>
+        </p:nvSpPr>
+        <p:spPr>
+          <a:xfrm>
+            <a:off x="4934782" y="2573829"/>
+            <a:ext cx="899605" cy="338554"/>
+          </a:xfrm>
+          <a:prstGeom prst="rect">
+            <a:avLst/>
+          </a:prstGeom>
+          <a:noFill/>
+        </p:spPr>
+        <p:txBody>
+          <a:bodyPr wrap="none" rtlCol="0">
+            <a:spAutoFit/>
+          </a:bodyPr>
+          <a:lstStyle/>
+          <a:p>
+            <a:r>
+              <a:rPr lang="en-US" sz="1600"/>
+              <a:t>Planning</a:t>
+            </a:r>
+          </a:p>
+        </p:txBody>
+      </p:sp>
+      <p:sp>
+        <p:nvSpPr>
+          <p:cNvPr id="31" name="TextBox 30">
+            <a:extLst>
+              <a:ext uri="{FF2B5EF4-FFF2-40B4-BE49-F238E27FC236}">
+                <a16:creationId xmlns:a16="http://schemas.microsoft.com/office/drawing/2014/main" id="{1DC885F4-A4FD-C132-2C32-0F7374E9C3D8}"/>
+              </a:ext>
+            </a:extLst>
+          </p:cNvPr>
+          <p:cNvSpPr txBox="1"/>
+          <p:nvPr/>
+        </p:nvSpPr>
+        <p:spPr>
+          <a:xfrm>
+            <a:off x="5711544" y="2917646"/>
+            <a:ext cx="900631" cy="338554"/>
+          </a:xfrm>
+          <a:prstGeom prst="rect">
+            <a:avLst/>
+          </a:prstGeom>
+          <a:noFill/>
+        </p:spPr>
+        <p:txBody>
+          <a:bodyPr wrap="none" rtlCol="0">
+            <a:spAutoFit/>
+          </a:bodyPr>
+          <a:lstStyle/>
+          <a:p>
+            <a:r>
+              <a:rPr lang="en-US" sz="1600"/>
+              <a:t>Memory</a:t>
+            </a:r>
+          </a:p>
+        </p:txBody>
+      </p:sp>
+      <p:sp>
+        <p:nvSpPr>
+          <p:cNvPr id="32" name="TextBox 31">
+            <a:extLst>
+              <a:ext uri="{FF2B5EF4-FFF2-40B4-BE49-F238E27FC236}">
+                <a16:creationId xmlns:a16="http://schemas.microsoft.com/office/drawing/2014/main" id="{F25AA1A9-1E6A-BD04-FE51-39EA8FA79D14}"/>
+              </a:ext>
+            </a:extLst>
+          </p:cNvPr>
+          <p:cNvSpPr txBox="1"/>
+          <p:nvPr/>
+        </p:nvSpPr>
+        <p:spPr>
+          <a:xfrm>
+            <a:off x="6363147" y="3554723"/>
+            <a:ext cx="610488" cy="338554"/>
+          </a:xfrm>
+          <a:prstGeom prst="rect">
+            <a:avLst/>
+          </a:prstGeom>
+          <a:noFill/>
+        </p:spPr>
+        <p:txBody>
+          <a:bodyPr wrap="none" rtlCol="0">
+            <a:spAutoFit/>
+          </a:bodyPr>
+          <a:lstStyle/>
+          <a:p>
+            <a:r>
+              <a:rPr lang="en-US" sz="1600"/>
+              <a:t>Tools</a:t>
+            </a:r>
+          </a:p>
+        </p:txBody>
+      </p:sp>
+      <p:sp>
+        <p:nvSpPr>
+          <p:cNvPr id="33" name="TextBox 32">
+            <a:extLst>
+              <a:ext uri="{FF2B5EF4-FFF2-40B4-BE49-F238E27FC236}">
+                <a16:creationId xmlns:a16="http://schemas.microsoft.com/office/drawing/2014/main" id="{66B911F1-D0E9-7506-1006-CE98677A959E}"/>
+              </a:ext>
+            </a:extLst>
+          </p:cNvPr>
+          <p:cNvSpPr txBox="1"/>
+          <p:nvPr/>
+        </p:nvSpPr>
+        <p:spPr>
+          <a:xfrm>
+            <a:off x="6303705" y="4260609"/>
+            <a:ext cx="1083053" cy="338554"/>
+          </a:xfrm>
+          <a:prstGeom prst="rect">
+            <a:avLst/>
+          </a:prstGeom>
+          <a:noFill/>
+        </p:spPr>
+        <p:txBody>
+          <a:bodyPr wrap="none" rtlCol="0">
+            <a:spAutoFit/>
+          </a:bodyPr>
+          <a:lstStyle/>
+          <a:p>
+            <a:r>
+              <a:rPr lang="en-US" sz="1600"/>
+              <a:t>Delegation</a:t>
+            </a:r>
+          </a:p>
+        </p:txBody>
+      </p:sp>
+      <p:sp>
+        <p:nvSpPr>
+          <p:cNvPr id="34" name="TextBox 33">
+            <a:extLst>
+              <a:ext uri="{FF2B5EF4-FFF2-40B4-BE49-F238E27FC236}">
+                <a16:creationId xmlns:a16="http://schemas.microsoft.com/office/drawing/2014/main" id="{4BFC009E-973E-D09D-DAF0-452EC0F8D32F}"/>
+              </a:ext>
+            </a:extLst>
+          </p:cNvPr>
+          <p:cNvSpPr txBox="1"/>
+          <p:nvPr/>
+        </p:nvSpPr>
+        <p:spPr>
+          <a:xfrm>
+            <a:off x="2236039" y="4048608"/>
+            <a:ext cx="907673" cy="584775"/>
+          </a:xfrm>
+          <a:prstGeom prst="rect">
+            <a:avLst/>
+          </a:prstGeom>
+          <a:noFill/>
+        </p:spPr>
+        <p:txBody>
+          <a:bodyPr wrap="square" rtlCol="0">
+            <a:spAutoFit/>
+          </a:bodyPr>
+          <a:lstStyle/>
+          <a:p>
+            <a:pPr algn="ctr"/>
+            <a:r>
+              <a:rPr lang="en-US" sz="1600"/>
+              <a:t>Job function</a:t>
+            </a:r>
+          </a:p>
+        </p:txBody>
+      </p:sp>
+      <p:sp>
+        <p:nvSpPr>
+          <p:cNvPr id="35" name="TextBox 34">
+            <a:extLst>
+              <a:ext uri="{FF2B5EF4-FFF2-40B4-BE49-F238E27FC236}">
+                <a16:creationId xmlns:a16="http://schemas.microsoft.com/office/drawing/2014/main" id="{F7940F5B-9055-F6AD-9B5B-306750ECE659}"/>
+              </a:ext>
+            </a:extLst>
+          </p:cNvPr>
+          <p:cNvSpPr txBox="1"/>
+          <p:nvPr/>
+        </p:nvSpPr>
+        <p:spPr>
+          <a:xfrm>
+            <a:off x="2460850" y="2772559"/>
+            <a:ext cx="1165309" cy="584775"/>
+          </a:xfrm>
+          <a:prstGeom prst="rect">
+            <a:avLst/>
+          </a:prstGeom>
+          <a:noFill/>
+        </p:spPr>
+        <p:txBody>
+          <a:bodyPr wrap="square" rtlCol="0">
+            <a:spAutoFit/>
+          </a:bodyPr>
+          <a:lstStyle/>
+          <a:p>
+            <a:pPr algn="ctr"/>
+            <a:r>
+              <a:rPr lang="en-US" sz="1600"/>
+              <a:t>Job description</a:t>
+            </a:r>
+          </a:p>
+        </p:txBody>
+      </p:sp>
+      <p:sp>
+        <p:nvSpPr>
+          <p:cNvPr id="36" name="TextBox 35">
+            <a:extLst>
+              <a:ext uri="{FF2B5EF4-FFF2-40B4-BE49-F238E27FC236}">
+                <a16:creationId xmlns:a16="http://schemas.microsoft.com/office/drawing/2014/main" id="{2BEF5B5E-C79E-6FDD-A000-77390C3DEC1C}"/>
+              </a:ext>
+            </a:extLst>
+          </p:cNvPr>
+          <p:cNvSpPr txBox="1"/>
+          <p:nvPr/>
+        </p:nvSpPr>
+        <p:spPr>
+          <a:xfrm>
+            <a:off x="3844005" y="1977424"/>
+            <a:ext cx="466794" cy="338554"/>
+          </a:xfrm>
+          <a:prstGeom prst="rect">
+            <a:avLst/>
+          </a:prstGeom>
+          <a:noFill/>
+        </p:spPr>
+        <p:txBody>
+          <a:bodyPr wrap="none" rtlCol="0">
+            <a:spAutoFit/>
+          </a:bodyPr>
+          <a:lstStyle/>
+          <a:p>
+            <a:r>
+              <a:rPr lang="en-US" sz="1600"/>
+              <a:t>Job</a:t>
+            </a:r>
+          </a:p>
+        </p:txBody>
+      </p:sp>
+      <p:sp>
+        <p:nvSpPr>
+          <p:cNvPr id="37" name="TextBox 36">
+            <a:extLst>
+              <a:ext uri="{FF2B5EF4-FFF2-40B4-BE49-F238E27FC236}">
+                <a16:creationId xmlns:a16="http://schemas.microsoft.com/office/drawing/2014/main" id="{617520E1-D2BE-E107-1418-EF16AE91E904}"/>
+              </a:ext>
+            </a:extLst>
+          </p:cNvPr>
+          <p:cNvSpPr txBox="1"/>
+          <p:nvPr/>
+        </p:nvSpPr>
+        <p:spPr>
+          <a:xfrm>
+            <a:off x="4963956" y="1569586"/>
+            <a:ext cx="870431" cy="338554"/>
+          </a:xfrm>
+          <a:prstGeom prst="rect">
+            <a:avLst/>
+          </a:prstGeom>
+          <a:noFill/>
+        </p:spPr>
+        <p:txBody>
+          <a:bodyPr wrap="none" rtlCol="0">
+            <a:spAutoFit/>
+          </a:bodyPr>
+          <a:lstStyle/>
+          <a:p>
+            <a:r>
+              <a:rPr lang="en-US" sz="1600"/>
+              <a:t>Strategy</a:t>
+            </a:r>
+          </a:p>
+        </p:txBody>
+      </p:sp>
+      <p:sp>
+        <p:nvSpPr>
+          <p:cNvPr id="38" name="TextBox 37">
+            <a:extLst>
+              <a:ext uri="{FF2B5EF4-FFF2-40B4-BE49-F238E27FC236}">
+                <a16:creationId xmlns:a16="http://schemas.microsoft.com/office/drawing/2014/main" id="{A1886BE6-3D46-45E7-9860-6B7032388506}"/>
+              </a:ext>
+            </a:extLst>
+          </p:cNvPr>
+          <p:cNvSpPr txBox="1"/>
+          <p:nvPr/>
+        </p:nvSpPr>
+        <p:spPr>
+          <a:xfrm>
+            <a:off x="6067873" y="1863801"/>
+            <a:ext cx="1262909" cy="584775"/>
+          </a:xfrm>
+          <a:prstGeom prst="rect">
+            <a:avLst/>
+          </a:prstGeom>
+          <a:noFill/>
+        </p:spPr>
+        <p:txBody>
+          <a:bodyPr wrap="square" rtlCol="0">
+            <a:spAutoFit/>
+          </a:bodyPr>
+          <a:lstStyle/>
+          <a:p>
+            <a:pPr algn="ctr"/>
+            <a:r>
+              <a:rPr lang="en-US" sz="1600"/>
+              <a:t>Historical context</a:t>
+            </a:r>
+          </a:p>
+        </p:txBody>
+      </p:sp>
+      <p:sp>
+        <p:nvSpPr>
+          <p:cNvPr id="39" name="TextBox 38">
+            <a:extLst>
+              <a:ext uri="{FF2B5EF4-FFF2-40B4-BE49-F238E27FC236}">
+                <a16:creationId xmlns:a16="http://schemas.microsoft.com/office/drawing/2014/main" id="{61480DC1-C820-34FF-A2C0-0F8BBD673707}"/>
+              </a:ext>
+            </a:extLst>
+          </p:cNvPr>
+          <p:cNvSpPr txBox="1"/>
+          <p:nvPr/>
+        </p:nvSpPr>
+        <p:spPr>
+          <a:xfrm>
+            <a:off x="7444502" y="2937622"/>
+            <a:ext cx="591829" cy="338554"/>
+          </a:xfrm>
+          <a:prstGeom prst="rect">
+            <a:avLst/>
+          </a:prstGeom>
+          <a:noFill/>
+        </p:spPr>
+        <p:txBody>
+          <a:bodyPr wrap="none" rtlCol="0">
+            <a:spAutoFit/>
+          </a:bodyPr>
+          <a:lstStyle/>
+          <a:p>
+            <a:r>
+              <a:rPr lang="en-US" sz="1600"/>
+              <a:t>Skills</a:t>
+            </a:r>
+          </a:p>
+        </p:txBody>
+      </p:sp>
+      <p:sp>
+        <p:nvSpPr>
+          <p:cNvPr id="40" name="TextBox 39">
+            <a:extLst>
+              <a:ext uri="{FF2B5EF4-FFF2-40B4-BE49-F238E27FC236}">
+                <a16:creationId xmlns:a16="http://schemas.microsoft.com/office/drawing/2014/main" id="{A6A197C1-6208-1477-F17A-D23BCAFD2073}"/>
+              </a:ext>
+            </a:extLst>
+          </p:cNvPr>
+          <p:cNvSpPr txBox="1"/>
+          <p:nvPr/>
+        </p:nvSpPr>
+        <p:spPr>
+          <a:xfrm>
+            <a:off x="7359215" y="4056310"/>
+            <a:ext cx="1340805" cy="584775"/>
+          </a:xfrm>
+          <a:prstGeom prst="rect">
+            <a:avLst/>
+          </a:prstGeom>
+          <a:noFill/>
+        </p:spPr>
+        <p:txBody>
+          <a:bodyPr wrap="square" rtlCol="0">
+            <a:spAutoFit/>
+          </a:bodyPr>
+          <a:lstStyle/>
+          <a:p>
+            <a:pPr algn="ctr"/>
+            <a:r>
+              <a:rPr lang="en-US" sz="1600"/>
+              <a:t>Team management</a:t>
+            </a:r>
+          </a:p>
+        </p:txBody>
+      </p:sp>
+    </p:spTree>
+    <p:extLst>
+      <p:ext uri="{BB962C8B-B14F-4D97-AF65-F5344CB8AC3E}">
+        <p14:creationId xmlns:p14="http://schemas.microsoft.com/office/powerpoint/2010/main" val="3099481577"/>
+      </p:ext>
+    </p:extLst>
+  </p:cSld>
+  <p:clrMapOvr>
+    <a:masterClrMapping/>
+  </p:clrMapOvr>
+</p:sld>
+</file>
+
+<file path=ppt/slides/slide47.xml><?xml version="1.0" encoding="utf-8"?>
+<p:sld xmlns:a="http://schemas.openxmlformats.org/drawingml/2006/main" xmlns:r="http://schemas.openxmlformats.org/officeDocument/2006/relationships" xmlns:p="http://schemas.openxmlformats.org/presentationml/2006/main">
+  <p:cSld>
+    <p:spTree>
+      <p:nvGrpSpPr>
+        <p:cNvPr id="1" name=""/>
+        <p:cNvGrpSpPr/>
+        <p:nvPr/>
+      </p:nvGrpSpPr>
+      <p:grpSpPr>
+        <a:xfrm>
+          <a:off x="0" y="0"/>
+          <a:ext cx="0" cy="0"/>
+          <a:chOff x="0" y="0"/>
+          <a:chExt cx="0" cy="0"/>
+        </a:xfrm>
+      </p:grpSpPr>
+      <p:sp>
+        <p:nvSpPr>
+          <p:cNvPr id="9" name="Oval 8">
+            <a:extLst>
+              <a:ext uri="{FF2B5EF4-FFF2-40B4-BE49-F238E27FC236}">
+                <a16:creationId xmlns:a16="http://schemas.microsoft.com/office/drawing/2014/main" id="{A7A17EE3-34DF-D896-0775-64004EA95482}"/>
+              </a:ext>
+            </a:extLst>
+          </p:cNvPr>
+          <p:cNvSpPr/>
+          <p:nvPr/>
+        </p:nvSpPr>
+        <p:spPr>
+          <a:xfrm>
+            <a:off x="4723891" y="2043638"/>
+            <a:ext cx="1096806" cy="1096806"/>
+          </a:xfrm>
+          <a:prstGeom prst="ellipse">
+            <a:avLst/>
+          </a:prstGeom>
+        </p:spPr>
+        <p:style>
+          <a:lnRef idx="2">
+            <a:schemeClr val="accent1">
+              <a:shade val="15000"/>
+            </a:schemeClr>
+          </a:lnRef>
+          <a:fillRef idx="1">
+            <a:schemeClr val="accent1"/>
+          </a:fillRef>
+          <a:effectRef idx="0">
+            <a:schemeClr val="accent1"/>
+          </a:effectRef>
+          <a:fontRef idx="minor">
+            <a:schemeClr val="lt1"/>
+          </a:fontRef>
+        </p:style>
+        <p:txBody>
+          <a:bodyPr rtlCol="0" anchor="ctr"/>
+          <a:lstStyle/>
+          <a:p>
+            <a:pPr algn="ctr"/>
+            <a:r>
+              <a:rPr lang="en-US"/>
+              <a:t>Agent</a:t>
+            </a:r>
+          </a:p>
+        </p:txBody>
+      </p:sp>
+      <p:pic>
+        <p:nvPicPr>
+          <p:cNvPr id="12" name="Graphic 11" descr="User outline">
+            <a:extLst>
+              <a:ext uri="{FF2B5EF4-FFF2-40B4-BE49-F238E27FC236}">
+                <a16:creationId xmlns:a16="http://schemas.microsoft.com/office/drawing/2014/main" id="{D3D3F929-778F-95FD-BADC-B11962BC50DC}"/>
+              </a:ext>
+            </a:extLst>
+          </p:cNvPr>
+          <p:cNvPicPr>
+            <a:picLocks noChangeAspect="1"/>
+          </p:cNvPicPr>
+          <p:nvPr/>
+        </p:nvPicPr>
+        <p:blipFill>
+          <a:blip r:embed="rId2">
+            <a:extLst>
+              <a:ext uri="{96DAC541-7B7A-43D3-8B79-37D633B846F1}">
+                <asvg:svgBlip xmlns:asvg="http://schemas.microsoft.com/office/drawing/2016/SVG/main" r:embed="rId3"/>
+              </a:ext>
+            </a:extLst>
+          </a:blip>
+          <a:stretch>
+            <a:fillRect/>
+          </a:stretch>
+        </p:blipFill>
+        <p:spPr>
+          <a:xfrm>
+            <a:off x="1828800" y="1837416"/>
+            <a:ext cx="1509251" cy="1509251"/>
+          </a:xfrm>
+          <a:prstGeom prst="rect">
+            <a:avLst/>
+          </a:prstGeom>
+        </p:spPr>
+      </p:pic>
+      <p:cxnSp>
+        <p:nvCxnSpPr>
+          <p:cNvPr id="14" name="Straight Arrow Connector 13">
+            <a:extLst>
+              <a:ext uri="{FF2B5EF4-FFF2-40B4-BE49-F238E27FC236}">
+                <a16:creationId xmlns:a16="http://schemas.microsoft.com/office/drawing/2014/main" id="{496136E0-F94A-812E-7311-996A588910EC}"/>
+              </a:ext>
+            </a:extLst>
+          </p:cNvPr>
+          <p:cNvCxnSpPr/>
+          <p:nvPr/>
+        </p:nvCxnSpPr>
+        <p:spPr>
+          <a:xfrm>
+            <a:off x="3338051" y="2340077"/>
+            <a:ext cx="1243781" cy="0"/>
+          </a:xfrm>
+          <a:prstGeom prst="straightConnector1">
+            <a:avLst/>
+          </a:prstGeom>
+          <a:ln w="38100" cap="flat" cmpd="sng" algn="ctr">
+            <a:solidFill>
+              <a:schemeClr val="accent2"/>
+            </a:solidFill>
+            <a:prstDash val="solid"/>
+            <a:round/>
+            <a:headEnd type="none" w="med" len="med"/>
+            <a:tailEnd type="arrow" w="med" len="med"/>
+          </a:ln>
+        </p:spPr>
+        <p:style>
+          <a:lnRef idx="0">
+            <a:scrgbClr r="0" g="0" b="0"/>
+          </a:lnRef>
+          <a:fillRef idx="0">
+            <a:scrgbClr r="0" g="0" b="0"/>
+          </a:fillRef>
+          <a:effectRef idx="0">
+            <a:scrgbClr r="0" g="0" b="0"/>
+          </a:effectRef>
+          <a:fontRef idx="minor">
+            <a:schemeClr val="tx1"/>
+          </a:fontRef>
+        </p:style>
+      </p:cxnSp>
+      <p:cxnSp>
+        <p:nvCxnSpPr>
+          <p:cNvPr id="15" name="Straight Arrow Connector 14">
+            <a:extLst>
+              <a:ext uri="{FF2B5EF4-FFF2-40B4-BE49-F238E27FC236}">
+                <a16:creationId xmlns:a16="http://schemas.microsoft.com/office/drawing/2014/main" id="{B9F83B02-755E-19B3-7866-B01DFA48A15C}"/>
+              </a:ext>
+            </a:extLst>
+          </p:cNvPr>
+          <p:cNvCxnSpPr/>
+          <p:nvPr/>
+        </p:nvCxnSpPr>
+        <p:spPr>
+          <a:xfrm>
+            <a:off x="3338050" y="2777612"/>
+            <a:ext cx="1243781" cy="0"/>
+          </a:xfrm>
+          <a:prstGeom prst="straightConnector1">
+            <a:avLst/>
+          </a:prstGeom>
+          <a:ln w="38100" cap="flat" cmpd="sng" algn="ctr">
+            <a:solidFill>
+              <a:schemeClr val="accent2"/>
+            </a:solidFill>
+            <a:prstDash val="solid"/>
+            <a:round/>
+            <a:headEnd type="arrow" w="med" len="med"/>
+            <a:tailEnd type="none" w="med" len="med"/>
+          </a:ln>
+        </p:spPr>
+        <p:style>
+          <a:lnRef idx="0">
+            <a:scrgbClr r="0" g="0" b="0"/>
+          </a:lnRef>
+          <a:fillRef idx="0">
+            <a:scrgbClr r="0" g="0" b="0"/>
+          </a:fillRef>
+          <a:effectRef idx="0">
+            <a:scrgbClr r="0" g="0" b="0"/>
+          </a:effectRef>
+          <a:fontRef idx="minor">
+            <a:schemeClr val="tx1"/>
+          </a:fontRef>
+        </p:style>
+      </p:cxnSp>
+      <p:pic>
+        <p:nvPicPr>
+          <p:cNvPr id="18" name="Graphic 17" descr="Document outline">
+            <a:extLst>
+              <a:ext uri="{FF2B5EF4-FFF2-40B4-BE49-F238E27FC236}">
+                <a16:creationId xmlns:a16="http://schemas.microsoft.com/office/drawing/2014/main" id="{E50B1D95-ABF2-3E21-451E-149AA4D2982F}"/>
+              </a:ext>
+            </a:extLst>
+          </p:cNvPr>
+          <p:cNvPicPr>
+            <a:picLocks noChangeAspect="1"/>
+          </p:cNvPicPr>
+          <p:nvPr/>
+        </p:nvPicPr>
+        <p:blipFill>
+          <a:blip r:embed="rId4">
+            <a:extLst>
+              <a:ext uri="{96DAC541-7B7A-43D3-8B79-37D633B846F1}">
+                <asvg:svgBlip xmlns:asvg="http://schemas.microsoft.com/office/drawing/2016/SVG/main" r:embed="rId5"/>
+              </a:ext>
+            </a:extLst>
+          </a:blip>
+          <a:stretch>
+            <a:fillRect/>
+          </a:stretch>
+        </p:blipFill>
+        <p:spPr>
+          <a:xfrm>
+            <a:off x="7127877" y="2153150"/>
+            <a:ext cx="737929" cy="737929"/>
+          </a:xfrm>
+          <a:prstGeom prst="rect">
+            <a:avLst/>
+          </a:prstGeom>
+        </p:spPr>
+      </p:pic>
+      <p:cxnSp>
+        <p:nvCxnSpPr>
+          <p:cNvPr id="28" name="Curved Connector 27">
+            <a:extLst>
+              <a:ext uri="{FF2B5EF4-FFF2-40B4-BE49-F238E27FC236}">
+                <a16:creationId xmlns:a16="http://schemas.microsoft.com/office/drawing/2014/main" id="{7F2C4B35-220D-E40E-354D-612C73141CF8}"/>
+              </a:ext>
+            </a:extLst>
+          </p:cNvPr>
+          <p:cNvCxnSpPr>
+            <a:cxnSpLocks/>
+            <a:stCxn id="9" idx="7"/>
+          </p:cNvCxnSpPr>
+          <p:nvPr/>
+        </p:nvCxnSpPr>
+        <p:spPr>
+          <a:xfrm rot="5400000" flipH="1" flipV="1">
+            <a:off x="6513616" y="1299607"/>
+            <a:ext cx="51112" cy="1758198"/>
+          </a:xfrm>
+          <a:prstGeom prst="curvedConnector3">
+            <a:avLst>
+              <a:gd name="adj1" fmla="val 746093"/>
+            </a:avLst>
+          </a:prstGeom>
+          <a:ln w="28575">
+            <a:prstDash val="solid"/>
+            <a:tailEnd type="triangle"/>
+          </a:ln>
+        </p:spPr>
+        <p:style>
+          <a:lnRef idx="1">
+            <a:schemeClr val="accent1"/>
+          </a:lnRef>
+          <a:fillRef idx="0">
+            <a:schemeClr val="accent1"/>
+          </a:fillRef>
+          <a:effectRef idx="0">
+            <a:schemeClr val="accent1"/>
+          </a:effectRef>
+          <a:fontRef idx="minor">
+            <a:schemeClr val="tx1"/>
+          </a:fontRef>
+        </p:style>
+      </p:cxnSp>
+      <p:cxnSp>
+        <p:nvCxnSpPr>
+          <p:cNvPr id="32" name="Curved Connector 31">
+            <a:extLst>
+              <a:ext uri="{FF2B5EF4-FFF2-40B4-BE49-F238E27FC236}">
+                <a16:creationId xmlns:a16="http://schemas.microsoft.com/office/drawing/2014/main" id="{651F89BA-F034-EB69-08AE-60C77EEFADF6}"/>
+              </a:ext>
+            </a:extLst>
+          </p:cNvPr>
+          <p:cNvCxnSpPr>
+            <a:cxnSpLocks/>
+            <a:endCxn id="9" idx="5"/>
+          </p:cNvCxnSpPr>
+          <p:nvPr/>
+        </p:nvCxnSpPr>
+        <p:spPr>
+          <a:xfrm rot="5400000">
+            <a:off x="6513616" y="2075165"/>
+            <a:ext cx="51112" cy="1758198"/>
+          </a:xfrm>
+          <a:prstGeom prst="curvedConnector3">
+            <a:avLst>
+              <a:gd name="adj1" fmla="val 861512"/>
+            </a:avLst>
+          </a:prstGeom>
+          <a:ln w="28575">
+            <a:prstDash val="solid"/>
+            <a:tailEnd type="triangle"/>
+          </a:ln>
+        </p:spPr>
+        <p:style>
+          <a:lnRef idx="1">
+            <a:schemeClr val="accent1"/>
+          </a:lnRef>
+          <a:fillRef idx="0">
+            <a:schemeClr val="accent1"/>
+          </a:fillRef>
+          <a:effectRef idx="0">
+            <a:schemeClr val="accent1"/>
+          </a:effectRef>
+          <a:fontRef idx="minor">
+            <a:schemeClr val="tx1"/>
+          </a:fontRef>
+        </p:style>
+      </p:cxnSp>
+      <p:sp>
+        <p:nvSpPr>
+          <p:cNvPr id="36" name="TextBox 35">
+            <a:extLst>
+              <a:ext uri="{FF2B5EF4-FFF2-40B4-BE49-F238E27FC236}">
+                <a16:creationId xmlns:a16="http://schemas.microsoft.com/office/drawing/2014/main" id="{210B0A49-ACA4-6210-4C37-A98E6C0E6C7E}"/>
+              </a:ext>
+            </a:extLst>
+          </p:cNvPr>
+          <p:cNvSpPr txBox="1"/>
+          <p:nvPr/>
+        </p:nvSpPr>
+        <p:spPr>
+          <a:xfrm>
+            <a:off x="6210952" y="2397208"/>
+            <a:ext cx="738407" cy="338554"/>
+          </a:xfrm>
+          <a:prstGeom prst="rect">
+            <a:avLst/>
+          </a:prstGeom>
+          <a:noFill/>
+        </p:spPr>
+        <p:txBody>
+          <a:bodyPr wrap="none" rtlCol="0">
+            <a:spAutoFit/>
+          </a:bodyPr>
+          <a:lstStyle/>
+          <a:p>
+            <a:r>
+              <a:rPr lang="en-US" sz="1600"/>
+              <a:t>Iterate</a:t>
+            </a:r>
+          </a:p>
+        </p:txBody>
+      </p:sp>
+      <p:sp>
+        <p:nvSpPr>
+          <p:cNvPr id="37" name="TextBox 36">
+            <a:extLst>
+              <a:ext uri="{FF2B5EF4-FFF2-40B4-BE49-F238E27FC236}">
+                <a16:creationId xmlns:a16="http://schemas.microsoft.com/office/drawing/2014/main" id="{612EBB3F-87D7-E34E-A201-69F0F49E5A44}"/>
+              </a:ext>
+            </a:extLst>
+          </p:cNvPr>
+          <p:cNvSpPr txBox="1"/>
+          <p:nvPr/>
+        </p:nvSpPr>
+        <p:spPr>
+          <a:xfrm>
+            <a:off x="3629260" y="1885544"/>
+            <a:ext cx="860044" cy="338554"/>
+          </a:xfrm>
+          <a:prstGeom prst="rect">
+            <a:avLst/>
+          </a:prstGeom>
+          <a:noFill/>
+        </p:spPr>
+        <p:txBody>
+          <a:bodyPr wrap="none" rtlCol="0">
+            <a:spAutoFit/>
+          </a:bodyPr>
+          <a:lstStyle/>
+          <a:p>
+            <a:r>
+              <a:rPr lang="en-US" sz="1600"/>
+              <a:t>Request</a:t>
+            </a:r>
+          </a:p>
+        </p:txBody>
+      </p:sp>
+      <p:sp>
+        <p:nvSpPr>
+          <p:cNvPr id="38" name="TextBox 37">
+            <a:extLst>
+              <a:ext uri="{FF2B5EF4-FFF2-40B4-BE49-F238E27FC236}">
+                <a16:creationId xmlns:a16="http://schemas.microsoft.com/office/drawing/2014/main" id="{97929C9C-7F8A-B0F9-0ED5-7D22B78A9C86}"/>
+              </a:ext>
+            </a:extLst>
+          </p:cNvPr>
+          <p:cNvSpPr txBox="1"/>
+          <p:nvPr/>
+        </p:nvSpPr>
+        <p:spPr>
+          <a:xfrm>
+            <a:off x="3567994" y="2891079"/>
+            <a:ext cx="982577" cy="338554"/>
+          </a:xfrm>
+          <a:prstGeom prst="rect">
+            <a:avLst/>
+          </a:prstGeom>
+          <a:noFill/>
+        </p:spPr>
+        <p:txBody>
+          <a:bodyPr wrap="none" rtlCol="0">
+            <a:spAutoFit/>
+          </a:bodyPr>
+          <a:lstStyle/>
+          <a:p>
+            <a:r>
+              <a:rPr lang="en-US" sz="1600"/>
+              <a:t>Response</a:t>
+            </a:r>
+          </a:p>
+        </p:txBody>
+      </p:sp>
+    </p:spTree>
+    <p:extLst>
+      <p:ext uri="{BB962C8B-B14F-4D97-AF65-F5344CB8AC3E}">
+        <p14:creationId xmlns:p14="http://schemas.microsoft.com/office/powerpoint/2010/main" val="1780893209"/>
+      </p:ext>
+    </p:extLst>
+  </p:cSld>
+  <p:clrMapOvr>
+    <a:masterClrMapping/>
+  </p:clrMapOvr>
+</p:sld>
+</file>
+
+<file path=ppt/slides/slide48.xml><?xml version="1.0" encoding="utf-8"?>
+<p:sld xmlns:a="http://schemas.openxmlformats.org/drawingml/2006/main" xmlns:r="http://schemas.openxmlformats.org/officeDocument/2006/relationships" xmlns:p="http://schemas.openxmlformats.org/presentationml/2006/main">
+  <p:cSld>
+    <p:spTree>
+      <p:nvGrpSpPr>
+        <p:cNvPr id="1" name="">
+          <a:extLst>
+            <a:ext uri="{FF2B5EF4-FFF2-40B4-BE49-F238E27FC236}">
+              <a16:creationId xmlns:a16="http://schemas.microsoft.com/office/drawing/2014/main" id="{1C57C049-E22E-B24C-34B6-072707CD0A6E}"/>
+            </a:ext>
+          </a:extLst>
+        </p:cNvPr>
+        <p:cNvGrpSpPr/>
+        <p:nvPr/>
+      </p:nvGrpSpPr>
+      <p:grpSpPr>
+        <a:xfrm>
+          <a:off x="0" y="0"/>
+          <a:ext cx="0" cy="0"/>
+          <a:chOff x="0" y="0"/>
+          <a:chExt cx="0" cy="0"/>
+        </a:xfrm>
+      </p:grpSpPr>
+      <p:sp>
+        <p:nvSpPr>
+          <p:cNvPr id="9" name="Oval 8">
+            <a:extLst>
+              <a:ext uri="{FF2B5EF4-FFF2-40B4-BE49-F238E27FC236}">
+                <a16:creationId xmlns:a16="http://schemas.microsoft.com/office/drawing/2014/main" id="{555AB0E1-1A39-7E21-01C6-C22361C56467}"/>
+              </a:ext>
+            </a:extLst>
+          </p:cNvPr>
+          <p:cNvSpPr/>
+          <p:nvPr/>
+        </p:nvSpPr>
+        <p:spPr>
+          <a:xfrm>
+            <a:off x="4487917" y="2613909"/>
+            <a:ext cx="1096806" cy="1096806"/>
+          </a:xfrm>
+          <a:prstGeom prst="ellipse">
+            <a:avLst/>
+          </a:prstGeom>
+        </p:spPr>
+        <p:style>
+          <a:lnRef idx="2">
+            <a:schemeClr val="accent1">
+              <a:shade val="15000"/>
+            </a:schemeClr>
+          </a:lnRef>
+          <a:fillRef idx="1">
+            <a:schemeClr val="accent1"/>
+          </a:fillRef>
+          <a:effectRef idx="0">
+            <a:schemeClr val="accent1"/>
+          </a:effectRef>
+          <a:fontRef idx="minor">
+            <a:schemeClr val="lt1"/>
+          </a:fontRef>
+        </p:style>
+        <p:txBody>
+          <a:bodyPr rtlCol="0" anchor="ctr"/>
+          <a:lstStyle/>
+          <a:p>
+            <a:pPr algn="ctr"/>
+            <a:r>
+              <a:rPr lang="en-US"/>
+              <a:t>Agent</a:t>
+            </a:r>
+          </a:p>
+        </p:txBody>
+      </p:sp>
+      <p:pic>
+        <p:nvPicPr>
+          <p:cNvPr id="12" name="Graphic 11" descr="User outline">
+            <a:extLst>
+              <a:ext uri="{FF2B5EF4-FFF2-40B4-BE49-F238E27FC236}">
+                <a16:creationId xmlns:a16="http://schemas.microsoft.com/office/drawing/2014/main" id="{A00C6838-A13C-5B0C-C17B-092D16F0CA17}"/>
+              </a:ext>
+            </a:extLst>
+          </p:cNvPr>
+          <p:cNvPicPr>
+            <a:picLocks noChangeAspect="1"/>
+          </p:cNvPicPr>
+          <p:nvPr/>
+        </p:nvPicPr>
+        <p:blipFill>
+          <a:blip r:embed="rId2">
+            <a:extLst>
+              <a:ext uri="{96DAC541-7B7A-43D3-8B79-37D633B846F1}">
+                <asvg:svgBlip xmlns:asvg="http://schemas.microsoft.com/office/drawing/2016/SVG/main" r:embed="rId3"/>
+              </a:ext>
+            </a:extLst>
+          </a:blip>
+          <a:stretch>
+            <a:fillRect/>
+          </a:stretch>
+        </p:blipFill>
+        <p:spPr>
+          <a:xfrm>
+            <a:off x="1592826" y="2407687"/>
+            <a:ext cx="1509251" cy="1509251"/>
+          </a:xfrm>
+          <a:prstGeom prst="rect">
+            <a:avLst/>
+          </a:prstGeom>
+        </p:spPr>
+      </p:pic>
+      <p:cxnSp>
+        <p:nvCxnSpPr>
+          <p:cNvPr id="14" name="Straight Arrow Connector 13">
+            <a:extLst>
+              <a:ext uri="{FF2B5EF4-FFF2-40B4-BE49-F238E27FC236}">
+                <a16:creationId xmlns:a16="http://schemas.microsoft.com/office/drawing/2014/main" id="{F97EB0C7-CE5D-AD0A-5FCA-E3E272428D57}"/>
+              </a:ext>
+            </a:extLst>
+          </p:cNvPr>
+          <p:cNvCxnSpPr/>
+          <p:nvPr/>
+        </p:nvCxnSpPr>
+        <p:spPr>
+          <a:xfrm>
+            <a:off x="3102077" y="2910348"/>
+            <a:ext cx="1243781" cy="0"/>
+          </a:xfrm>
+          <a:prstGeom prst="straightConnector1">
+            <a:avLst/>
+          </a:prstGeom>
+          <a:ln w="38100" cap="flat" cmpd="sng" algn="ctr">
+            <a:solidFill>
+              <a:schemeClr val="accent2"/>
+            </a:solidFill>
+            <a:prstDash val="solid"/>
+            <a:round/>
+            <a:headEnd type="none" w="med" len="med"/>
+            <a:tailEnd type="arrow" w="med" len="med"/>
+          </a:ln>
+        </p:spPr>
+        <p:style>
+          <a:lnRef idx="0">
+            <a:scrgbClr r="0" g="0" b="0"/>
+          </a:lnRef>
+          <a:fillRef idx="0">
+            <a:scrgbClr r="0" g="0" b="0"/>
+          </a:fillRef>
+          <a:effectRef idx="0">
+            <a:scrgbClr r="0" g="0" b="0"/>
+          </a:effectRef>
+          <a:fontRef idx="minor">
+            <a:schemeClr val="tx1"/>
+          </a:fontRef>
+        </p:style>
+      </p:cxnSp>
+      <p:cxnSp>
+        <p:nvCxnSpPr>
+          <p:cNvPr id="15" name="Straight Arrow Connector 14">
+            <a:extLst>
+              <a:ext uri="{FF2B5EF4-FFF2-40B4-BE49-F238E27FC236}">
+                <a16:creationId xmlns:a16="http://schemas.microsoft.com/office/drawing/2014/main" id="{C08AE9CD-B9E4-2432-B071-86DA42D0E70B}"/>
+              </a:ext>
+            </a:extLst>
+          </p:cNvPr>
+          <p:cNvCxnSpPr/>
+          <p:nvPr/>
+        </p:nvCxnSpPr>
+        <p:spPr>
+          <a:xfrm>
+            <a:off x="3102076" y="3347883"/>
+            <a:ext cx="1243781" cy="0"/>
+          </a:xfrm>
+          <a:prstGeom prst="straightConnector1">
+            <a:avLst/>
+          </a:prstGeom>
+          <a:ln w="38100" cap="flat" cmpd="sng" algn="ctr">
+            <a:solidFill>
+              <a:schemeClr val="accent2"/>
+            </a:solidFill>
+            <a:prstDash val="solid"/>
+            <a:round/>
+            <a:headEnd type="arrow" w="med" len="med"/>
+            <a:tailEnd type="none" w="med" len="med"/>
+          </a:ln>
+        </p:spPr>
+        <p:style>
+          <a:lnRef idx="0">
+            <a:scrgbClr r="0" g="0" b="0"/>
+          </a:lnRef>
+          <a:fillRef idx="0">
+            <a:scrgbClr r="0" g="0" b="0"/>
+          </a:fillRef>
+          <a:effectRef idx="0">
+            <a:scrgbClr r="0" g="0" b="0"/>
+          </a:effectRef>
+          <a:fontRef idx="minor">
+            <a:schemeClr val="tx1"/>
+          </a:fontRef>
+        </p:style>
+      </p:cxnSp>
+      <p:sp>
+        <p:nvSpPr>
+          <p:cNvPr id="37" name="TextBox 36">
+            <a:extLst>
+              <a:ext uri="{FF2B5EF4-FFF2-40B4-BE49-F238E27FC236}">
+                <a16:creationId xmlns:a16="http://schemas.microsoft.com/office/drawing/2014/main" id="{33C8355B-3F51-8C32-FF18-98E98B6356BB}"/>
+              </a:ext>
+            </a:extLst>
+          </p:cNvPr>
+          <p:cNvSpPr txBox="1"/>
+          <p:nvPr/>
+        </p:nvSpPr>
+        <p:spPr>
+          <a:xfrm>
+            <a:off x="3393286" y="2455815"/>
+            <a:ext cx="860044" cy="338554"/>
+          </a:xfrm>
+          <a:prstGeom prst="rect">
+            <a:avLst/>
+          </a:prstGeom>
+          <a:noFill/>
+        </p:spPr>
+        <p:txBody>
+          <a:bodyPr wrap="none" rtlCol="0">
+            <a:spAutoFit/>
+          </a:bodyPr>
+          <a:lstStyle/>
+          <a:p>
+            <a:r>
+              <a:rPr lang="en-US" sz="1600"/>
+              <a:t>Request</a:t>
+            </a:r>
+          </a:p>
+        </p:txBody>
+      </p:sp>
+      <p:sp>
+        <p:nvSpPr>
+          <p:cNvPr id="38" name="TextBox 37">
+            <a:extLst>
+              <a:ext uri="{FF2B5EF4-FFF2-40B4-BE49-F238E27FC236}">
+                <a16:creationId xmlns:a16="http://schemas.microsoft.com/office/drawing/2014/main" id="{EDFD8205-FDAF-D8E2-5B44-4B6ADFBF76DE}"/>
+              </a:ext>
+            </a:extLst>
+          </p:cNvPr>
+          <p:cNvSpPr txBox="1"/>
+          <p:nvPr/>
+        </p:nvSpPr>
+        <p:spPr>
+          <a:xfrm>
+            <a:off x="3332020" y="3461350"/>
+            <a:ext cx="982577" cy="338554"/>
+          </a:xfrm>
+          <a:prstGeom prst="rect">
+            <a:avLst/>
+          </a:prstGeom>
+          <a:noFill/>
+        </p:spPr>
+        <p:txBody>
+          <a:bodyPr wrap="none" rtlCol="0">
+            <a:spAutoFit/>
+          </a:bodyPr>
+          <a:lstStyle/>
+          <a:p>
+            <a:r>
+              <a:rPr lang="en-US" sz="1600"/>
+              <a:t>Response</a:t>
+            </a:r>
+          </a:p>
+        </p:txBody>
+      </p:sp>
+      <p:sp>
+        <p:nvSpPr>
+          <p:cNvPr id="2" name="Oval 1">
+            <a:extLst>
+              <a:ext uri="{FF2B5EF4-FFF2-40B4-BE49-F238E27FC236}">
+                <a16:creationId xmlns:a16="http://schemas.microsoft.com/office/drawing/2014/main" id="{7A2DECD8-BA52-10F1-7B83-2B3218CB3634}"/>
+              </a:ext>
+            </a:extLst>
+          </p:cNvPr>
+          <p:cNvSpPr/>
+          <p:nvPr/>
+        </p:nvSpPr>
+        <p:spPr>
+          <a:xfrm>
+            <a:off x="5810353" y="1422835"/>
+            <a:ext cx="983735" cy="952135"/>
+          </a:xfrm>
+          <a:prstGeom prst="ellipse">
+            <a:avLst/>
+          </a:prstGeom>
+        </p:spPr>
+        <p:style>
+          <a:lnRef idx="1">
+            <a:schemeClr val="accent6"/>
+          </a:lnRef>
+          <a:fillRef idx="3">
+            <a:schemeClr val="accent6"/>
+          </a:fillRef>
+          <a:effectRef idx="2">
+            <a:schemeClr val="accent6"/>
+          </a:effectRef>
+          <a:fontRef idx="minor">
+            <a:schemeClr val="lt1"/>
+          </a:fontRef>
+        </p:style>
+        <p:txBody>
+          <a:bodyPr rtlCol="0" anchor="ctr"/>
+          <a:lstStyle/>
+          <a:p>
+            <a:pPr algn="ctr"/>
+            <a:r>
+              <a:rPr lang="en-US" sz="1600"/>
+              <a:t>Tool 1</a:t>
+            </a:r>
+          </a:p>
+        </p:txBody>
+      </p:sp>
+      <p:sp>
+        <p:nvSpPr>
+          <p:cNvPr id="3" name="Oval 2">
+            <a:extLst>
+              <a:ext uri="{FF2B5EF4-FFF2-40B4-BE49-F238E27FC236}">
+                <a16:creationId xmlns:a16="http://schemas.microsoft.com/office/drawing/2014/main" id="{B692F6DB-35B0-D5E2-C39B-A631CF347161}"/>
+              </a:ext>
+            </a:extLst>
+          </p:cNvPr>
+          <p:cNvSpPr/>
+          <p:nvPr/>
+        </p:nvSpPr>
+        <p:spPr>
+          <a:xfrm>
+            <a:off x="6607279" y="2686244"/>
+            <a:ext cx="983735" cy="952135"/>
+          </a:xfrm>
+          <a:prstGeom prst="ellipse">
+            <a:avLst/>
+          </a:prstGeom>
+        </p:spPr>
+        <p:style>
+          <a:lnRef idx="1">
+            <a:schemeClr val="accent6"/>
+          </a:lnRef>
+          <a:fillRef idx="3">
+            <a:schemeClr val="accent6"/>
+          </a:fillRef>
+          <a:effectRef idx="2">
+            <a:schemeClr val="accent6"/>
+          </a:effectRef>
+          <a:fontRef idx="minor">
+            <a:schemeClr val="lt1"/>
+          </a:fontRef>
+        </p:style>
+        <p:txBody>
+          <a:bodyPr rtlCol="0" anchor="ctr"/>
+          <a:lstStyle/>
+          <a:p>
+            <a:pPr algn="ctr"/>
+            <a:r>
+              <a:rPr lang="en-US" sz="1600"/>
+              <a:t>Tool 1</a:t>
+            </a:r>
+          </a:p>
+        </p:txBody>
+      </p:sp>
+      <p:sp>
+        <p:nvSpPr>
+          <p:cNvPr id="4" name="Oval 3">
+            <a:extLst>
+              <a:ext uri="{FF2B5EF4-FFF2-40B4-BE49-F238E27FC236}">
+                <a16:creationId xmlns:a16="http://schemas.microsoft.com/office/drawing/2014/main" id="{BAF1B5A3-5303-DE95-EE5F-E058CB57269B}"/>
+              </a:ext>
+            </a:extLst>
+          </p:cNvPr>
+          <p:cNvSpPr/>
+          <p:nvPr/>
+        </p:nvSpPr>
+        <p:spPr>
+          <a:xfrm>
+            <a:off x="5810353" y="3916938"/>
+            <a:ext cx="983735" cy="952135"/>
+          </a:xfrm>
+          <a:prstGeom prst="ellipse">
+            <a:avLst/>
+          </a:prstGeom>
+        </p:spPr>
+        <p:style>
+          <a:lnRef idx="1">
+            <a:schemeClr val="accent6"/>
+          </a:lnRef>
+          <a:fillRef idx="3">
+            <a:schemeClr val="accent6"/>
+          </a:fillRef>
+          <a:effectRef idx="2">
+            <a:schemeClr val="accent6"/>
+          </a:effectRef>
+          <a:fontRef idx="minor">
+            <a:schemeClr val="lt1"/>
+          </a:fontRef>
+        </p:style>
+        <p:txBody>
+          <a:bodyPr rtlCol="0" anchor="ctr"/>
+          <a:lstStyle/>
+          <a:p>
+            <a:pPr algn="ctr"/>
+            <a:r>
+              <a:rPr lang="en-US" sz="1600"/>
+              <a:t>Tool 1</a:t>
+            </a:r>
+          </a:p>
+        </p:txBody>
+      </p:sp>
+      <p:cxnSp>
+        <p:nvCxnSpPr>
+          <p:cNvPr id="6" name="Straight Arrow Connector 5">
+            <a:extLst>
+              <a:ext uri="{FF2B5EF4-FFF2-40B4-BE49-F238E27FC236}">
+                <a16:creationId xmlns:a16="http://schemas.microsoft.com/office/drawing/2014/main" id="{52A70052-AC0B-B4DC-948A-67C09EB90F59}"/>
+              </a:ext>
+            </a:extLst>
+          </p:cNvPr>
+          <p:cNvCxnSpPr>
+            <a:stCxn id="9" idx="7"/>
+            <a:endCxn id="2" idx="3"/>
+          </p:cNvCxnSpPr>
+          <p:nvPr/>
+        </p:nvCxnSpPr>
+        <p:spPr>
+          <a:xfrm flipV="1">
+            <a:off x="5424099" y="2235533"/>
+            <a:ext cx="530319" cy="539000"/>
+          </a:xfrm>
+          <a:prstGeom prst="straightConnector1">
+            <a:avLst/>
+          </a:prstGeom>
+          <a:ln w="28575" cap="flat" cmpd="sng" algn="ctr">
+            <a:solidFill>
+              <a:schemeClr val="accent6"/>
+            </a:solidFill>
+            <a:prstDash val="solid"/>
+            <a:round/>
+            <a:headEnd type="arrow" w="med" len="med"/>
+            <a:tailEnd type="arrow" w="med" len="med"/>
+          </a:ln>
+        </p:spPr>
+        <p:style>
+          <a:lnRef idx="0">
+            <a:scrgbClr r="0" g="0" b="0"/>
+          </a:lnRef>
+          <a:fillRef idx="0">
+            <a:scrgbClr r="0" g="0" b="0"/>
+          </a:fillRef>
+          <a:effectRef idx="0">
+            <a:scrgbClr r="0" g="0" b="0"/>
+          </a:effectRef>
+          <a:fontRef idx="minor">
+            <a:schemeClr val="tx1"/>
+          </a:fontRef>
+        </p:style>
+      </p:cxnSp>
+      <p:cxnSp>
+        <p:nvCxnSpPr>
+          <p:cNvPr id="7" name="Straight Arrow Connector 6">
+            <a:extLst>
+              <a:ext uri="{FF2B5EF4-FFF2-40B4-BE49-F238E27FC236}">
+                <a16:creationId xmlns:a16="http://schemas.microsoft.com/office/drawing/2014/main" id="{A1A8E5CD-0FE1-CE67-B80E-924DCDFDF9F4}"/>
+              </a:ext>
+            </a:extLst>
+          </p:cNvPr>
+          <p:cNvCxnSpPr>
+            <a:cxnSpLocks/>
+            <a:stCxn id="9" idx="6"/>
+            <a:endCxn id="3" idx="2"/>
+          </p:cNvCxnSpPr>
+          <p:nvPr/>
+        </p:nvCxnSpPr>
+        <p:spPr>
+          <a:xfrm>
+            <a:off x="5584723" y="3162312"/>
+            <a:ext cx="1022556" cy="0"/>
+          </a:xfrm>
+          <a:prstGeom prst="straightConnector1">
+            <a:avLst/>
+          </a:prstGeom>
+          <a:ln w="28575" cap="flat" cmpd="sng" algn="ctr">
+            <a:solidFill>
+              <a:schemeClr val="accent6"/>
+            </a:solidFill>
+            <a:prstDash val="solid"/>
+            <a:round/>
+            <a:headEnd type="arrow" w="med" len="med"/>
+            <a:tailEnd type="arrow" w="med" len="med"/>
+          </a:ln>
+        </p:spPr>
+        <p:style>
+          <a:lnRef idx="0">
+            <a:scrgbClr r="0" g="0" b="0"/>
+          </a:lnRef>
+          <a:fillRef idx="0">
+            <a:scrgbClr r="0" g="0" b="0"/>
+          </a:fillRef>
+          <a:effectRef idx="0">
+            <a:scrgbClr r="0" g="0" b="0"/>
+          </a:effectRef>
+          <a:fontRef idx="minor">
+            <a:schemeClr val="tx1"/>
+          </a:fontRef>
+        </p:style>
+      </p:cxnSp>
+      <p:cxnSp>
+        <p:nvCxnSpPr>
+          <p:cNvPr id="11" name="Straight Arrow Connector 10">
+            <a:extLst>
+              <a:ext uri="{FF2B5EF4-FFF2-40B4-BE49-F238E27FC236}">
+                <a16:creationId xmlns:a16="http://schemas.microsoft.com/office/drawing/2014/main" id="{0B024EE0-7C93-704F-674F-C0BF91157895}"/>
+              </a:ext>
+            </a:extLst>
+          </p:cNvPr>
+          <p:cNvCxnSpPr>
+            <a:cxnSpLocks/>
+            <a:stCxn id="9" idx="5"/>
+            <a:endCxn id="4" idx="1"/>
+          </p:cNvCxnSpPr>
+          <p:nvPr/>
+        </p:nvCxnSpPr>
+        <p:spPr>
+          <a:xfrm>
+            <a:off x="5424099" y="3550091"/>
+            <a:ext cx="530319" cy="506284"/>
+          </a:xfrm>
+          <a:prstGeom prst="straightConnector1">
+            <a:avLst/>
+          </a:prstGeom>
+          <a:ln w="28575" cap="flat" cmpd="sng" algn="ctr">
+            <a:solidFill>
+              <a:schemeClr val="accent6"/>
+            </a:solidFill>
+            <a:prstDash val="solid"/>
+            <a:round/>
+            <a:headEnd type="arrow" w="med" len="med"/>
+            <a:tailEnd type="arrow" w="med" len="med"/>
+          </a:ln>
+        </p:spPr>
+        <p:style>
+          <a:lnRef idx="0">
+            <a:scrgbClr r="0" g="0" b="0"/>
+          </a:lnRef>
+          <a:fillRef idx="0">
+            <a:scrgbClr r="0" g="0" b="0"/>
+          </a:fillRef>
+          <a:effectRef idx="0">
+            <a:scrgbClr r="0" g="0" b="0"/>
+          </a:effectRef>
+          <a:fontRef idx="minor">
+            <a:schemeClr val="tx1"/>
+          </a:fontRef>
+        </p:style>
+      </p:cxnSp>
+    </p:spTree>
+    <p:extLst>
+      <p:ext uri="{BB962C8B-B14F-4D97-AF65-F5344CB8AC3E}">
+        <p14:creationId xmlns:p14="http://schemas.microsoft.com/office/powerpoint/2010/main" val="2461463909"/>
+      </p:ext>
+    </p:extLst>
+  </p:cSld>
+  <p:clrMapOvr>
+    <a:masterClrMapping/>
+  </p:clrMapOvr>
+</p:sld>
+</file>
+
+<file path=ppt/slides/slide49.xml><?xml version="1.0" encoding="utf-8"?>
+<p:sld xmlns:a="http://schemas.openxmlformats.org/drawingml/2006/main" xmlns:r="http://schemas.openxmlformats.org/officeDocument/2006/relationships" xmlns:p="http://schemas.openxmlformats.org/presentationml/2006/main">
+  <p:cSld>
+    <p:spTree>
+      <p:nvGrpSpPr>
+        <p:cNvPr id="1" name="">
+          <a:extLst>
+            <a:ext uri="{FF2B5EF4-FFF2-40B4-BE49-F238E27FC236}">
+              <a16:creationId xmlns:a16="http://schemas.microsoft.com/office/drawing/2014/main" id="{C4301CF0-89C9-714E-6147-BF7C22AEBA99}"/>
+            </a:ext>
+          </a:extLst>
+        </p:cNvPr>
+        <p:cNvGrpSpPr/>
+        <p:nvPr/>
+      </p:nvGrpSpPr>
+      <p:grpSpPr>
+        <a:xfrm>
+          <a:off x="0" y="0"/>
+          <a:ext cx="0" cy="0"/>
+          <a:chOff x="0" y="0"/>
+          <a:chExt cx="0" cy="0"/>
+        </a:xfrm>
+      </p:grpSpPr>
+      <p:sp>
+        <p:nvSpPr>
+          <p:cNvPr id="9" name="Oval 8">
+            <a:extLst>
+              <a:ext uri="{FF2B5EF4-FFF2-40B4-BE49-F238E27FC236}">
+                <a16:creationId xmlns:a16="http://schemas.microsoft.com/office/drawing/2014/main" id="{635612FE-80D9-DDBA-B13E-C3D9E921C944}"/>
+              </a:ext>
+            </a:extLst>
+          </p:cNvPr>
+          <p:cNvSpPr/>
+          <p:nvPr/>
+        </p:nvSpPr>
+        <p:spPr>
+          <a:xfrm>
+            <a:off x="3976640" y="2584412"/>
+            <a:ext cx="1096806" cy="1096806"/>
+          </a:xfrm>
+          <a:prstGeom prst="ellipse">
+            <a:avLst/>
+          </a:prstGeom>
+        </p:spPr>
+        <p:style>
+          <a:lnRef idx="2">
+            <a:schemeClr val="accent1">
+              <a:shade val="15000"/>
+            </a:schemeClr>
+          </a:lnRef>
+          <a:fillRef idx="1">
+            <a:schemeClr val="accent1"/>
+          </a:fillRef>
+          <a:effectRef idx="0">
+            <a:schemeClr val="accent1"/>
+          </a:effectRef>
+          <a:fontRef idx="minor">
+            <a:schemeClr val="lt1"/>
+          </a:fontRef>
+        </p:style>
+        <p:txBody>
+          <a:bodyPr rtlCol="0" anchor="ctr"/>
+          <a:lstStyle/>
+          <a:p>
+            <a:pPr algn="ctr"/>
+            <a:r>
+              <a:rPr lang="en-US"/>
+              <a:t>Agent</a:t>
+            </a:r>
+          </a:p>
+        </p:txBody>
+      </p:sp>
+      <p:pic>
+        <p:nvPicPr>
+          <p:cNvPr id="12" name="Graphic 11" descr="User outline">
+            <a:extLst>
+              <a:ext uri="{FF2B5EF4-FFF2-40B4-BE49-F238E27FC236}">
+                <a16:creationId xmlns:a16="http://schemas.microsoft.com/office/drawing/2014/main" id="{4532E271-1E77-555D-F93D-16FD2753AAF5}"/>
+              </a:ext>
+            </a:extLst>
+          </p:cNvPr>
+          <p:cNvPicPr>
+            <a:picLocks noChangeAspect="1"/>
+          </p:cNvPicPr>
+          <p:nvPr/>
+        </p:nvPicPr>
+        <p:blipFill>
+          <a:blip r:embed="rId2">
+            <a:extLst>
+              <a:ext uri="{96DAC541-7B7A-43D3-8B79-37D633B846F1}">
+                <asvg:svgBlip xmlns:asvg="http://schemas.microsoft.com/office/drawing/2016/SVG/main" r:embed="rId3"/>
+              </a:ext>
+            </a:extLst>
+          </a:blip>
+          <a:stretch>
+            <a:fillRect/>
+          </a:stretch>
+        </p:blipFill>
+        <p:spPr>
+          <a:xfrm>
+            <a:off x="1081549" y="2378190"/>
+            <a:ext cx="1509251" cy="1509251"/>
+          </a:xfrm>
+          <a:prstGeom prst="rect">
+            <a:avLst/>
+          </a:prstGeom>
+        </p:spPr>
+      </p:pic>
+      <p:cxnSp>
+        <p:nvCxnSpPr>
+          <p:cNvPr id="14" name="Straight Arrow Connector 13">
+            <a:extLst>
+              <a:ext uri="{FF2B5EF4-FFF2-40B4-BE49-F238E27FC236}">
+                <a16:creationId xmlns:a16="http://schemas.microsoft.com/office/drawing/2014/main" id="{5F9293BA-58AC-1D5E-5709-24C84D4DAC24}"/>
+              </a:ext>
+            </a:extLst>
+          </p:cNvPr>
+          <p:cNvCxnSpPr/>
+          <p:nvPr/>
+        </p:nvCxnSpPr>
+        <p:spPr>
+          <a:xfrm>
+            <a:off x="2590800" y="2880851"/>
+            <a:ext cx="1243781" cy="0"/>
+          </a:xfrm>
+          <a:prstGeom prst="straightConnector1">
+            <a:avLst/>
+          </a:prstGeom>
+          <a:ln w="38100" cap="flat" cmpd="sng" algn="ctr">
+            <a:solidFill>
+              <a:schemeClr val="accent2"/>
+            </a:solidFill>
+            <a:prstDash val="solid"/>
+            <a:round/>
+            <a:headEnd type="none" w="med" len="med"/>
+            <a:tailEnd type="arrow" w="med" len="med"/>
+          </a:ln>
+        </p:spPr>
+        <p:style>
+          <a:lnRef idx="0">
+            <a:scrgbClr r="0" g="0" b="0"/>
+          </a:lnRef>
+          <a:fillRef idx="0">
+            <a:scrgbClr r="0" g="0" b="0"/>
+          </a:fillRef>
+          <a:effectRef idx="0">
+            <a:scrgbClr r="0" g="0" b="0"/>
+          </a:effectRef>
+          <a:fontRef idx="minor">
+            <a:schemeClr val="tx1"/>
+          </a:fontRef>
+        </p:style>
+      </p:cxnSp>
+      <p:cxnSp>
+        <p:nvCxnSpPr>
+          <p:cNvPr id="15" name="Straight Arrow Connector 14">
+            <a:extLst>
+              <a:ext uri="{FF2B5EF4-FFF2-40B4-BE49-F238E27FC236}">
+                <a16:creationId xmlns:a16="http://schemas.microsoft.com/office/drawing/2014/main" id="{E4CE3F3E-7558-D734-9641-9C6AFC496C30}"/>
+              </a:ext>
+            </a:extLst>
+          </p:cNvPr>
+          <p:cNvCxnSpPr/>
+          <p:nvPr/>
+        </p:nvCxnSpPr>
+        <p:spPr>
+          <a:xfrm>
+            <a:off x="2590799" y="3318386"/>
+            <a:ext cx="1243781" cy="0"/>
+          </a:xfrm>
+          <a:prstGeom prst="straightConnector1">
+            <a:avLst/>
+          </a:prstGeom>
+          <a:ln w="38100" cap="flat" cmpd="sng" algn="ctr">
+            <a:solidFill>
+              <a:schemeClr val="accent2"/>
+            </a:solidFill>
+            <a:prstDash val="solid"/>
+            <a:round/>
+            <a:headEnd type="arrow" w="med" len="med"/>
+            <a:tailEnd type="none" w="med" len="med"/>
+          </a:ln>
+        </p:spPr>
+        <p:style>
+          <a:lnRef idx="0">
+            <a:scrgbClr r="0" g="0" b="0"/>
+          </a:lnRef>
+          <a:fillRef idx="0">
+            <a:scrgbClr r="0" g="0" b="0"/>
+          </a:fillRef>
+          <a:effectRef idx="0">
+            <a:scrgbClr r="0" g="0" b="0"/>
+          </a:effectRef>
+          <a:fontRef idx="minor">
+            <a:schemeClr val="tx1"/>
+          </a:fontRef>
+        </p:style>
+      </p:cxnSp>
+      <p:sp>
+        <p:nvSpPr>
+          <p:cNvPr id="37" name="TextBox 36">
+            <a:extLst>
+              <a:ext uri="{FF2B5EF4-FFF2-40B4-BE49-F238E27FC236}">
+                <a16:creationId xmlns:a16="http://schemas.microsoft.com/office/drawing/2014/main" id="{F79BBF56-464B-AF8C-FE07-A232B4A5FD19}"/>
+              </a:ext>
+            </a:extLst>
+          </p:cNvPr>
+          <p:cNvSpPr txBox="1"/>
+          <p:nvPr/>
+        </p:nvSpPr>
+        <p:spPr>
+          <a:xfrm>
+            <a:off x="2882009" y="2426318"/>
+            <a:ext cx="860044" cy="338554"/>
+          </a:xfrm>
+          <a:prstGeom prst="rect">
+            <a:avLst/>
+          </a:prstGeom>
+          <a:noFill/>
+        </p:spPr>
+        <p:txBody>
+          <a:bodyPr wrap="none" rtlCol="0">
+            <a:spAutoFit/>
+          </a:bodyPr>
+          <a:lstStyle/>
+          <a:p>
+            <a:r>
+              <a:rPr lang="en-US" sz="1600"/>
+              <a:t>Request</a:t>
+            </a:r>
+          </a:p>
+        </p:txBody>
+      </p:sp>
+      <p:sp>
+        <p:nvSpPr>
+          <p:cNvPr id="38" name="TextBox 37">
+            <a:extLst>
+              <a:ext uri="{FF2B5EF4-FFF2-40B4-BE49-F238E27FC236}">
+                <a16:creationId xmlns:a16="http://schemas.microsoft.com/office/drawing/2014/main" id="{B959F6B2-D4F0-7097-6C42-880EBECFF960}"/>
+              </a:ext>
+            </a:extLst>
+          </p:cNvPr>
+          <p:cNvSpPr txBox="1"/>
+          <p:nvPr/>
+        </p:nvSpPr>
+        <p:spPr>
+          <a:xfrm>
+            <a:off x="2820743" y="3431853"/>
+            <a:ext cx="982577" cy="338554"/>
+          </a:xfrm>
+          <a:prstGeom prst="rect">
+            <a:avLst/>
+          </a:prstGeom>
+          <a:noFill/>
+        </p:spPr>
+        <p:txBody>
+          <a:bodyPr wrap="none" rtlCol="0">
+            <a:spAutoFit/>
+          </a:bodyPr>
+          <a:lstStyle/>
+          <a:p>
+            <a:r>
+              <a:rPr lang="en-US" sz="1600"/>
+              <a:t>Response</a:t>
+            </a:r>
+          </a:p>
+        </p:txBody>
+      </p:sp>
+      <p:sp>
+        <p:nvSpPr>
+          <p:cNvPr id="16" name="TextBox 15">
+            <a:extLst>
+              <a:ext uri="{FF2B5EF4-FFF2-40B4-BE49-F238E27FC236}">
+                <a16:creationId xmlns:a16="http://schemas.microsoft.com/office/drawing/2014/main" id="{E3E9D815-6CBA-1B9C-E97C-14CD6DF32DDD}"/>
+              </a:ext>
+            </a:extLst>
+          </p:cNvPr>
+          <p:cNvSpPr txBox="1"/>
+          <p:nvPr/>
+        </p:nvSpPr>
+        <p:spPr>
+          <a:xfrm>
+            <a:off x="6469118" y="2530050"/>
+            <a:ext cx="973393" cy="1200329"/>
+          </a:xfrm>
+          <a:prstGeom prst="rect">
+            <a:avLst/>
+          </a:prstGeom>
+          <a:noFill/>
+          <a:ln>
+            <a:solidFill>
+              <a:schemeClr val="accent2">
+                <a:lumMod val="75000"/>
+              </a:schemeClr>
+            </a:solidFill>
+          </a:ln>
+        </p:spPr>
+        <p:txBody>
+          <a:bodyPr wrap="square" rtlCol="0">
+            <a:spAutoFit/>
+          </a:bodyPr>
+          <a:lstStyle/>
+          <a:p>
+            <a:pPr marL="342900" indent="-342900">
+              <a:buFont typeface="+mj-lt"/>
+              <a:buAutoNum type="arabicPeriod"/>
+            </a:pPr>
+            <a:r>
+              <a:rPr lang="en-US"/>
+              <a:t>xxx</a:t>
+            </a:r>
+          </a:p>
+          <a:p>
+            <a:pPr marL="342900" indent="-342900">
+              <a:buFont typeface="+mj-lt"/>
+              <a:buAutoNum type="arabicPeriod"/>
+            </a:pPr>
+            <a:r>
+              <a:rPr lang="en-US"/>
+              <a:t>xxx</a:t>
+            </a:r>
+          </a:p>
+          <a:p>
+            <a:pPr marL="342900" indent="-342900">
+              <a:buFont typeface="+mj-lt"/>
+              <a:buAutoNum type="arabicPeriod"/>
+            </a:pPr>
+            <a:r>
+              <a:rPr lang="en-US"/>
+              <a:t>xxx</a:t>
+            </a:r>
+          </a:p>
+          <a:p>
+            <a:pPr marL="342900" indent="-342900">
+              <a:buFont typeface="+mj-lt"/>
+              <a:buAutoNum type="arabicPeriod"/>
+            </a:pPr>
+            <a:r>
+              <a:rPr lang="en-US"/>
+              <a:t>xxx</a:t>
+            </a:r>
+          </a:p>
+        </p:txBody>
+      </p:sp>
+      <p:cxnSp>
+        <p:nvCxnSpPr>
+          <p:cNvPr id="17" name="Curved Connector 16">
+            <a:extLst>
+              <a:ext uri="{FF2B5EF4-FFF2-40B4-BE49-F238E27FC236}">
+                <a16:creationId xmlns:a16="http://schemas.microsoft.com/office/drawing/2014/main" id="{2C01271E-FB59-8A51-E500-5EF4B358C255}"/>
+              </a:ext>
+            </a:extLst>
+          </p:cNvPr>
+          <p:cNvCxnSpPr>
+            <a:cxnSpLocks/>
+            <a:stCxn id="9" idx="7"/>
+          </p:cNvCxnSpPr>
+          <p:nvPr/>
+        </p:nvCxnSpPr>
+        <p:spPr>
+          <a:xfrm rot="5400000" flipH="1" flipV="1">
+            <a:off x="5783051" y="1665255"/>
+            <a:ext cx="209552" cy="1950011"/>
+          </a:xfrm>
+          <a:prstGeom prst="curvedConnector3">
+            <a:avLst>
+              <a:gd name="adj1" fmla="val 326135"/>
+            </a:avLst>
+          </a:prstGeom>
+          <a:ln w="28575">
+            <a:prstDash val="solid"/>
+            <a:tailEnd type="triangle"/>
+          </a:ln>
+        </p:spPr>
+        <p:style>
+          <a:lnRef idx="1">
+            <a:schemeClr val="accent1"/>
+          </a:lnRef>
+          <a:fillRef idx="0">
+            <a:schemeClr val="accent1"/>
+          </a:fillRef>
+          <a:effectRef idx="0">
+            <a:schemeClr val="accent1"/>
+          </a:effectRef>
+          <a:fontRef idx="minor">
+            <a:schemeClr val="tx1"/>
+          </a:fontRef>
+        </p:style>
+      </p:cxnSp>
+      <p:cxnSp>
+        <p:nvCxnSpPr>
+          <p:cNvPr id="27" name="Curved Connector 26">
+            <a:extLst>
+              <a:ext uri="{FF2B5EF4-FFF2-40B4-BE49-F238E27FC236}">
+                <a16:creationId xmlns:a16="http://schemas.microsoft.com/office/drawing/2014/main" id="{63099A86-B1AC-2F6F-179E-6F5C7BCFA3E2}"/>
+              </a:ext>
+            </a:extLst>
+          </p:cNvPr>
+          <p:cNvCxnSpPr>
+            <a:cxnSpLocks/>
+            <a:endCxn id="9" idx="5"/>
+          </p:cNvCxnSpPr>
+          <p:nvPr/>
+        </p:nvCxnSpPr>
+        <p:spPr>
+          <a:xfrm rot="5400000" flipH="1">
+            <a:off x="5788246" y="2645171"/>
+            <a:ext cx="199164" cy="1950011"/>
+          </a:xfrm>
+          <a:prstGeom prst="curvedConnector3">
+            <a:avLst>
+              <a:gd name="adj1" fmla="val -237930"/>
+            </a:avLst>
+          </a:prstGeom>
+          <a:ln w="28575">
+            <a:prstDash val="solid"/>
+            <a:tailEnd type="triangle"/>
+          </a:ln>
+        </p:spPr>
+        <p:style>
+          <a:lnRef idx="1">
+            <a:schemeClr val="accent1"/>
+          </a:lnRef>
+          <a:fillRef idx="0">
+            <a:schemeClr val="accent1"/>
+          </a:fillRef>
+          <a:effectRef idx="0">
+            <a:schemeClr val="accent1"/>
+          </a:effectRef>
+          <a:fontRef idx="minor">
+            <a:schemeClr val="tx1"/>
+          </a:fontRef>
+        </p:style>
+      </p:cxnSp>
+      <p:sp>
+        <p:nvSpPr>
+          <p:cNvPr id="34" name="TextBox 33">
+            <a:extLst>
+              <a:ext uri="{FF2B5EF4-FFF2-40B4-BE49-F238E27FC236}">
+                <a16:creationId xmlns:a16="http://schemas.microsoft.com/office/drawing/2014/main" id="{2B062E0F-87D4-07CE-405F-7CD087F2D7F9}"/>
+              </a:ext>
+            </a:extLst>
+          </p:cNvPr>
+          <p:cNvSpPr txBox="1"/>
+          <p:nvPr/>
+        </p:nvSpPr>
+        <p:spPr>
+          <a:xfrm>
+            <a:off x="5402078" y="2960937"/>
+            <a:ext cx="738407" cy="338554"/>
+          </a:xfrm>
+          <a:prstGeom prst="rect">
+            <a:avLst/>
+          </a:prstGeom>
+          <a:noFill/>
+        </p:spPr>
+        <p:txBody>
+          <a:bodyPr wrap="none" rtlCol="0">
+            <a:spAutoFit/>
+          </a:bodyPr>
+          <a:lstStyle/>
+          <a:p>
+            <a:r>
+              <a:rPr lang="en-US" sz="1600"/>
+              <a:t>Iterate</a:t>
+            </a:r>
+          </a:p>
+        </p:txBody>
+      </p:sp>
+      <p:sp>
+        <p:nvSpPr>
+          <p:cNvPr id="35" name="TextBox 34">
+            <a:extLst>
+              <a:ext uri="{FF2B5EF4-FFF2-40B4-BE49-F238E27FC236}">
+                <a16:creationId xmlns:a16="http://schemas.microsoft.com/office/drawing/2014/main" id="{62EF615E-32B3-D7D2-6784-1BC821477CF4}"/>
+              </a:ext>
+            </a:extLst>
+          </p:cNvPr>
+          <p:cNvSpPr txBox="1"/>
+          <p:nvPr/>
+        </p:nvSpPr>
+        <p:spPr>
+          <a:xfrm>
+            <a:off x="5518623" y="1737804"/>
+            <a:ext cx="542136" cy="338554"/>
+          </a:xfrm>
+          <a:prstGeom prst="rect">
+            <a:avLst/>
+          </a:prstGeom>
+          <a:noFill/>
+        </p:spPr>
+        <p:txBody>
+          <a:bodyPr wrap="none" rtlCol="0">
+            <a:spAutoFit/>
+          </a:bodyPr>
+          <a:lstStyle/>
+          <a:p>
+            <a:r>
+              <a:rPr lang="en-US" sz="1600"/>
+              <a:t>Plan</a:t>
+            </a:r>
+          </a:p>
+        </p:txBody>
+      </p:sp>
+      <p:sp>
+        <p:nvSpPr>
+          <p:cNvPr id="36" name="TextBox 35">
+            <a:extLst>
+              <a:ext uri="{FF2B5EF4-FFF2-40B4-BE49-F238E27FC236}">
+                <a16:creationId xmlns:a16="http://schemas.microsoft.com/office/drawing/2014/main" id="{449AE4DD-4DAA-118D-1633-6EAED9893FB3}"/>
+              </a:ext>
+            </a:extLst>
+          </p:cNvPr>
+          <p:cNvSpPr txBox="1"/>
+          <p:nvPr/>
+        </p:nvSpPr>
+        <p:spPr>
+          <a:xfrm>
+            <a:off x="5616759" y="4206446"/>
+            <a:ext cx="887679" cy="338554"/>
+          </a:xfrm>
+          <a:prstGeom prst="rect">
+            <a:avLst/>
+          </a:prstGeom>
+          <a:noFill/>
+        </p:spPr>
+        <p:txBody>
+          <a:bodyPr wrap="none" rtlCol="0">
+            <a:spAutoFit/>
+          </a:bodyPr>
+          <a:lstStyle/>
+          <a:p>
+            <a:r>
+              <a:rPr lang="en-US" sz="1600"/>
+              <a:t>Evaluate</a:t>
+            </a:r>
+          </a:p>
+        </p:txBody>
+      </p:sp>
+      <p:sp>
+        <p:nvSpPr>
+          <p:cNvPr id="39" name="Cloud 38">
+            <a:extLst>
+              <a:ext uri="{FF2B5EF4-FFF2-40B4-BE49-F238E27FC236}">
+                <a16:creationId xmlns:a16="http://schemas.microsoft.com/office/drawing/2014/main" id="{196FE293-98D4-C3CB-8BE4-B79A25E2A482}"/>
+              </a:ext>
+            </a:extLst>
+          </p:cNvPr>
+          <p:cNvSpPr/>
+          <p:nvPr/>
+        </p:nvSpPr>
+        <p:spPr>
+          <a:xfrm>
+            <a:off x="2931169" y="422795"/>
+            <a:ext cx="3180482" cy="1419180"/>
+          </a:xfrm>
+          <a:prstGeom prst="cloud">
+            <a:avLst/>
+          </a:prstGeom>
+        </p:spPr>
+        <p:style>
+          <a:lnRef idx="2">
+            <a:schemeClr val="accent1"/>
+          </a:lnRef>
+          <a:fillRef idx="1">
+            <a:schemeClr val="lt1"/>
+          </a:fillRef>
+          <a:effectRef idx="0">
+            <a:schemeClr val="accent1"/>
+          </a:effectRef>
+          <a:fontRef idx="minor">
+            <a:schemeClr val="dk1"/>
+          </a:fontRef>
+        </p:style>
+        <p:txBody>
+          <a:bodyPr rtlCol="0" anchor="ctr"/>
+          <a:lstStyle/>
+          <a:p>
+            <a:pPr algn="ctr"/>
+            <a:r>
+              <a:rPr lang="en-US"/>
+              <a:t>Information sources</a:t>
+            </a:r>
+          </a:p>
+        </p:txBody>
+      </p:sp>
+      <p:sp>
+        <p:nvSpPr>
+          <p:cNvPr id="40" name="Rectangle 39">
+            <a:extLst>
+              <a:ext uri="{FF2B5EF4-FFF2-40B4-BE49-F238E27FC236}">
+                <a16:creationId xmlns:a16="http://schemas.microsoft.com/office/drawing/2014/main" id="{672116DD-5613-95E0-1E5C-EDC2B23921F5}"/>
+              </a:ext>
+            </a:extLst>
+          </p:cNvPr>
+          <p:cNvSpPr/>
+          <p:nvPr/>
+        </p:nvSpPr>
+        <p:spPr>
+          <a:xfrm>
+            <a:off x="2359741" y="157316"/>
+            <a:ext cx="4645233" cy="859352"/>
+          </a:xfrm>
+          <a:prstGeom prst="rect">
+            <a:avLst/>
+          </a:prstGeom>
+          <a:solidFill>
+            <a:schemeClr val="bg1"/>
+          </a:solidFill>
+          <a:ln>
+            <a:noFill/>
+          </a:ln>
+        </p:spPr>
+        <p:style>
+          <a:lnRef idx="2">
+            <a:schemeClr val="accent1">
+              <a:shade val="15000"/>
+            </a:schemeClr>
+          </a:lnRef>
+          <a:fillRef idx="1">
+            <a:schemeClr val="accent1"/>
+          </a:fillRef>
+          <a:effectRef idx="0">
+            <a:schemeClr val="accent1"/>
+          </a:effectRef>
+          <a:fontRef idx="minor">
+            <a:schemeClr val="lt1"/>
+          </a:fontRef>
+        </p:style>
+        <p:txBody>
+          <a:bodyPr rtlCol="0" anchor="ctr"/>
+          <a:lstStyle/>
+          <a:p>
+            <a:pPr algn="ctr"/>
+            <a:endParaRPr lang="en-US"/>
+          </a:p>
+        </p:txBody>
+      </p:sp>
+      <p:cxnSp>
+        <p:nvCxnSpPr>
+          <p:cNvPr id="42" name="Straight Arrow Connector 41">
+            <a:extLst>
+              <a:ext uri="{FF2B5EF4-FFF2-40B4-BE49-F238E27FC236}">
+                <a16:creationId xmlns:a16="http://schemas.microsoft.com/office/drawing/2014/main" id="{742FC7E8-215D-B6A6-697A-67093E397646}"/>
+              </a:ext>
+            </a:extLst>
+          </p:cNvPr>
+          <p:cNvCxnSpPr>
+            <a:stCxn id="39" idx="1"/>
+            <a:endCxn id="9" idx="0"/>
+          </p:cNvCxnSpPr>
+          <p:nvPr/>
+        </p:nvCxnSpPr>
+        <p:spPr>
+          <a:xfrm>
+            <a:off x="4521410" y="1840464"/>
+            <a:ext cx="3633" cy="743948"/>
+          </a:xfrm>
+          <a:prstGeom prst="straightConnector1">
+            <a:avLst/>
+          </a:prstGeom>
+          <a:ln w="28575">
+            <a:tailEnd type="triangle"/>
+          </a:ln>
+        </p:spPr>
+        <p:style>
+          <a:lnRef idx="1">
+            <a:schemeClr val="accent1"/>
+          </a:lnRef>
+          <a:fillRef idx="0">
+            <a:schemeClr val="accent1"/>
+          </a:fillRef>
+          <a:effectRef idx="0">
+            <a:schemeClr val="accent1"/>
+          </a:effectRef>
+          <a:fontRef idx="minor">
+            <a:schemeClr val="tx1"/>
+          </a:fontRef>
+        </p:style>
+      </p:cxnSp>
+    </p:spTree>
+    <p:extLst>
+      <p:ext uri="{BB962C8B-B14F-4D97-AF65-F5344CB8AC3E}">
+        <p14:creationId xmlns:p14="http://schemas.microsoft.com/office/powerpoint/2010/main" val="266477990"/>
+      </p:ext>
+    </p:extLst>
+  </p:cSld>
+  <p:clrMapOvr>
+    <a:masterClrMapping/>
+  </p:clrMapOvr>
+</p:sld>
+</file>
+
 <file path=ppt/slides/slide5.xml><?xml version="1.0" encoding="utf-8"?>
 <p:sld xmlns:a="http://schemas.openxmlformats.org/drawingml/2006/main" xmlns:r="http://schemas.openxmlformats.org/officeDocument/2006/relationships" xmlns:p="http://schemas.openxmlformats.org/presentationml/2006/main">
   <p:cSld>
@@ -37787,13 +40868,7 @@
           <p:nvPr/>
         </p:nvPicPr>
         <p:blipFill>
-          <a:blip r:embed="rId3">
-            <a:extLst>
-              <a:ext uri="{96DAC541-7B7A-43D3-8B79-37D633B846F1}">
-                <asvg:svgBlip xmlns:asvg="http://schemas.microsoft.com/office/drawing/2016/SVG/main"/>
-              </a:ext>
-            </a:extLst>
-          </a:blip>
+          <a:blip/>
           <a:stretch>
             <a:fillRect/>
           </a:stretch>
@@ -37823,13 +40898,7 @@
           <p:nvPr/>
         </p:nvPicPr>
         <p:blipFill>
-          <a:blip r:embed="rId5">
-            <a:extLst>
-              <a:ext uri="{96DAC541-7B7A-43D3-8B79-37D633B846F1}">
-                <asvg:svgBlip xmlns:asvg="http://schemas.microsoft.com/office/drawing/2016/SVG/main"/>
-              </a:ext>
-            </a:extLst>
-          </a:blip>
+          <a:blip/>
           <a:stretch>
             <a:fillRect/>
           </a:stretch>
@@ -37859,13 +40928,7 @@
           <p:nvPr/>
         </p:nvPicPr>
         <p:blipFill>
-          <a:blip r:embed="rId7">
-            <a:extLst>
-              <a:ext uri="{96DAC541-7B7A-43D3-8B79-37D633B846F1}">
-                <asvg:svgBlip xmlns:asvg="http://schemas.microsoft.com/office/drawing/2016/SVG/main"/>
-              </a:ext>
-            </a:extLst>
-          </a:blip>
+          <a:blip/>
           <a:stretch>
             <a:fillRect/>
           </a:stretch>
@@ -38686,13 +41749,7 @@
           <p:nvPr/>
         </p:nvPicPr>
         <p:blipFill>
-          <a:blip r:embed="rId9">
-            <a:extLst>
-              <a:ext uri="{96DAC541-7B7A-43D3-8B79-37D633B846F1}">
-                <asvg:svgBlip xmlns:asvg="http://schemas.microsoft.com/office/drawing/2016/SVG/main"/>
-              </a:ext>
-            </a:extLst>
-          </a:blip>
+          <a:blip/>
           <a:stretch>
             <a:fillRect/>
           </a:stretch>
@@ -39067,6 +42124,698 @@
     <p:extLst>
       <p:ext uri="{BB962C8B-B14F-4D97-AF65-F5344CB8AC3E}">
         <p14:creationId xmlns:p14="http://schemas.microsoft.com/office/powerpoint/2010/main" val="3605297162"/>
+      </p:ext>
+    </p:extLst>
+  </p:cSld>
+  <p:clrMapOvr>
+    <a:masterClrMapping/>
+  </p:clrMapOvr>
+</p:sld>
+</file>
+
+<file path=ppt/slides/slide50.xml><?xml version="1.0" encoding="utf-8"?>
+<p:sld xmlns:a="http://schemas.openxmlformats.org/drawingml/2006/main" xmlns:r="http://schemas.openxmlformats.org/officeDocument/2006/relationships" xmlns:p="http://schemas.openxmlformats.org/presentationml/2006/main">
+  <p:cSld>
+    <p:spTree>
+      <p:nvGrpSpPr>
+        <p:cNvPr id="1" name="">
+          <a:extLst>
+            <a:ext uri="{FF2B5EF4-FFF2-40B4-BE49-F238E27FC236}">
+              <a16:creationId xmlns:a16="http://schemas.microsoft.com/office/drawing/2014/main" id="{5C9E15D9-C8FE-F2C5-FBCA-1DFA53077778}"/>
+            </a:ext>
+          </a:extLst>
+        </p:cNvPr>
+        <p:cNvGrpSpPr/>
+        <p:nvPr/>
+      </p:nvGrpSpPr>
+      <p:grpSpPr>
+        <a:xfrm>
+          <a:off x="0" y="0"/>
+          <a:ext cx="0" cy="0"/>
+          <a:chOff x="0" y="0"/>
+          <a:chExt cx="0" cy="0"/>
+        </a:xfrm>
+      </p:grpSpPr>
+      <p:sp>
+        <p:nvSpPr>
+          <p:cNvPr id="9" name="Oval 8">
+            <a:extLst>
+              <a:ext uri="{FF2B5EF4-FFF2-40B4-BE49-F238E27FC236}">
+                <a16:creationId xmlns:a16="http://schemas.microsoft.com/office/drawing/2014/main" id="{62CE4083-4943-FE5A-F518-7520DA83A1B9}"/>
+              </a:ext>
+            </a:extLst>
+          </p:cNvPr>
+          <p:cNvSpPr/>
+          <p:nvPr/>
+        </p:nvSpPr>
+        <p:spPr>
+          <a:xfrm>
+            <a:off x="3976640" y="2584412"/>
+            <a:ext cx="1096806" cy="1096806"/>
+          </a:xfrm>
+          <a:prstGeom prst="ellipse">
+            <a:avLst/>
+          </a:prstGeom>
+        </p:spPr>
+        <p:style>
+          <a:lnRef idx="2">
+            <a:schemeClr val="accent1">
+              <a:shade val="15000"/>
+            </a:schemeClr>
+          </a:lnRef>
+          <a:fillRef idx="1">
+            <a:schemeClr val="accent1"/>
+          </a:fillRef>
+          <a:effectRef idx="0">
+            <a:schemeClr val="accent1"/>
+          </a:effectRef>
+          <a:fontRef idx="minor">
+            <a:schemeClr val="lt1"/>
+          </a:fontRef>
+        </p:style>
+        <p:txBody>
+          <a:bodyPr rtlCol="0" anchor="ctr"/>
+          <a:lstStyle/>
+          <a:p>
+            <a:pPr algn="ctr"/>
+            <a:r>
+              <a:rPr lang="en-US"/>
+              <a:t>Agent</a:t>
+            </a:r>
+          </a:p>
+        </p:txBody>
+      </p:sp>
+      <p:pic>
+        <p:nvPicPr>
+          <p:cNvPr id="12" name="Graphic 11" descr="User outline">
+            <a:extLst>
+              <a:ext uri="{FF2B5EF4-FFF2-40B4-BE49-F238E27FC236}">
+                <a16:creationId xmlns:a16="http://schemas.microsoft.com/office/drawing/2014/main" id="{19FDE0AB-B71A-7623-1348-9960BDB73966}"/>
+              </a:ext>
+            </a:extLst>
+          </p:cNvPr>
+          <p:cNvPicPr>
+            <a:picLocks noChangeAspect="1"/>
+          </p:cNvPicPr>
+          <p:nvPr/>
+        </p:nvPicPr>
+        <p:blipFill>
+          <a:blip r:embed="rId2">
+            <a:extLst>
+              <a:ext uri="{96DAC541-7B7A-43D3-8B79-37D633B846F1}">
+                <asvg:svgBlip xmlns:asvg="http://schemas.microsoft.com/office/drawing/2016/SVG/main" r:embed="rId3"/>
+              </a:ext>
+            </a:extLst>
+          </a:blip>
+          <a:stretch>
+            <a:fillRect/>
+          </a:stretch>
+        </p:blipFill>
+        <p:spPr>
+          <a:xfrm>
+            <a:off x="1081549" y="2378190"/>
+            <a:ext cx="1509251" cy="1509251"/>
+          </a:xfrm>
+          <a:prstGeom prst="rect">
+            <a:avLst/>
+          </a:prstGeom>
+        </p:spPr>
+      </p:pic>
+      <p:cxnSp>
+        <p:nvCxnSpPr>
+          <p:cNvPr id="14" name="Straight Arrow Connector 13">
+            <a:extLst>
+              <a:ext uri="{FF2B5EF4-FFF2-40B4-BE49-F238E27FC236}">
+                <a16:creationId xmlns:a16="http://schemas.microsoft.com/office/drawing/2014/main" id="{73FD95F6-17C6-6A22-90CA-8D967CE4757B}"/>
+              </a:ext>
+            </a:extLst>
+          </p:cNvPr>
+          <p:cNvCxnSpPr/>
+          <p:nvPr/>
+        </p:nvCxnSpPr>
+        <p:spPr>
+          <a:xfrm>
+            <a:off x="2590800" y="2880851"/>
+            <a:ext cx="1243781" cy="0"/>
+          </a:xfrm>
+          <a:prstGeom prst="straightConnector1">
+            <a:avLst/>
+          </a:prstGeom>
+          <a:ln w="38100" cap="flat" cmpd="sng" algn="ctr">
+            <a:solidFill>
+              <a:schemeClr val="accent2"/>
+            </a:solidFill>
+            <a:prstDash val="solid"/>
+            <a:round/>
+            <a:headEnd type="none" w="med" len="med"/>
+            <a:tailEnd type="arrow" w="med" len="med"/>
+          </a:ln>
+        </p:spPr>
+        <p:style>
+          <a:lnRef idx="0">
+            <a:scrgbClr r="0" g="0" b="0"/>
+          </a:lnRef>
+          <a:fillRef idx="0">
+            <a:scrgbClr r="0" g="0" b="0"/>
+          </a:fillRef>
+          <a:effectRef idx="0">
+            <a:scrgbClr r="0" g="0" b="0"/>
+          </a:effectRef>
+          <a:fontRef idx="minor">
+            <a:schemeClr val="tx1"/>
+          </a:fontRef>
+        </p:style>
+      </p:cxnSp>
+      <p:cxnSp>
+        <p:nvCxnSpPr>
+          <p:cNvPr id="15" name="Straight Arrow Connector 14">
+            <a:extLst>
+              <a:ext uri="{FF2B5EF4-FFF2-40B4-BE49-F238E27FC236}">
+                <a16:creationId xmlns:a16="http://schemas.microsoft.com/office/drawing/2014/main" id="{A5FD8664-D943-F3CE-5DF3-F0597C81BC97}"/>
+              </a:ext>
+            </a:extLst>
+          </p:cNvPr>
+          <p:cNvCxnSpPr/>
+          <p:nvPr/>
+        </p:nvCxnSpPr>
+        <p:spPr>
+          <a:xfrm>
+            <a:off x="2590799" y="3318386"/>
+            <a:ext cx="1243781" cy="0"/>
+          </a:xfrm>
+          <a:prstGeom prst="straightConnector1">
+            <a:avLst/>
+          </a:prstGeom>
+          <a:ln w="38100" cap="flat" cmpd="sng" algn="ctr">
+            <a:solidFill>
+              <a:schemeClr val="accent2"/>
+            </a:solidFill>
+            <a:prstDash val="solid"/>
+            <a:round/>
+            <a:headEnd type="arrow" w="med" len="med"/>
+            <a:tailEnd type="none" w="med" len="med"/>
+          </a:ln>
+        </p:spPr>
+        <p:style>
+          <a:lnRef idx="0">
+            <a:scrgbClr r="0" g="0" b="0"/>
+          </a:lnRef>
+          <a:fillRef idx="0">
+            <a:scrgbClr r="0" g="0" b="0"/>
+          </a:fillRef>
+          <a:effectRef idx="0">
+            <a:scrgbClr r="0" g="0" b="0"/>
+          </a:effectRef>
+          <a:fontRef idx="minor">
+            <a:schemeClr val="tx1"/>
+          </a:fontRef>
+        </p:style>
+      </p:cxnSp>
+      <p:sp>
+        <p:nvSpPr>
+          <p:cNvPr id="37" name="TextBox 36">
+            <a:extLst>
+              <a:ext uri="{FF2B5EF4-FFF2-40B4-BE49-F238E27FC236}">
+                <a16:creationId xmlns:a16="http://schemas.microsoft.com/office/drawing/2014/main" id="{CA2B2DE1-A82D-D2A5-996E-C5C68E636A3F}"/>
+              </a:ext>
+            </a:extLst>
+          </p:cNvPr>
+          <p:cNvSpPr txBox="1"/>
+          <p:nvPr/>
+        </p:nvSpPr>
+        <p:spPr>
+          <a:xfrm>
+            <a:off x="2882009" y="2426318"/>
+            <a:ext cx="860044" cy="338554"/>
+          </a:xfrm>
+          <a:prstGeom prst="rect">
+            <a:avLst/>
+          </a:prstGeom>
+          <a:noFill/>
+        </p:spPr>
+        <p:txBody>
+          <a:bodyPr wrap="none" rtlCol="0">
+            <a:spAutoFit/>
+          </a:bodyPr>
+          <a:lstStyle/>
+          <a:p>
+            <a:r>
+              <a:rPr lang="en-US" sz="1600"/>
+              <a:t>Request</a:t>
+            </a:r>
+          </a:p>
+        </p:txBody>
+      </p:sp>
+      <p:sp>
+        <p:nvSpPr>
+          <p:cNvPr id="38" name="TextBox 37">
+            <a:extLst>
+              <a:ext uri="{FF2B5EF4-FFF2-40B4-BE49-F238E27FC236}">
+                <a16:creationId xmlns:a16="http://schemas.microsoft.com/office/drawing/2014/main" id="{632900D4-853E-754B-6B07-44D3DE8ED0F4}"/>
+              </a:ext>
+            </a:extLst>
+          </p:cNvPr>
+          <p:cNvSpPr txBox="1"/>
+          <p:nvPr/>
+        </p:nvSpPr>
+        <p:spPr>
+          <a:xfrm>
+            <a:off x="2820743" y="3431853"/>
+            <a:ext cx="982577" cy="338554"/>
+          </a:xfrm>
+          <a:prstGeom prst="rect">
+            <a:avLst/>
+          </a:prstGeom>
+          <a:noFill/>
+        </p:spPr>
+        <p:txBody>
+          <a:bodyPr wrap="none" rtlCol="0">
+            <a:spAutoFit/>
+          </a:bodyPr>
+          <a:lstStyle/>
+          <a:p>
+            <a:r>
+              <a:rPr lang="en-US" sz="1600"/>
+              <a:t>Response</a:t>
+            </a:r>
+          </a:p>
+        </p:txBody>
+      </p:sp>
+      <p:cxnSp>
+        <p:nvCxnSpPr>
+          <p:cNvPr id="42" name="Straight Arrow Connector 41">
+            <a:extLst>
+              <a:ext uri="{FF2B5EF4-FFF2-40B4-BE49-F238E27FC236}">
+                <a16:creationId xmlns:a16="http://schemas.microsoft.com/office/drawing/2014/main" id="{92CD5D5A-1386-A2F3-B15E-FCB62A9A6F3F}"/>
+              </a:ext>
+            </a:extLst>
+          </p:cNvPr>
+          <p:cNvCxnSpPr>
+            <a:cxnSpLocks/>
+            <a:stCxn id="2" idx="3"/>
+            <a:endCxn id="9" idx="7"/>
+          </p:cNvCxnSpPr>
+          <p:nvPr/>
+        </p:nvCxnSpPr>
+        <p:spPr>
+          <a:xfrm flipH="1">
+            <a:off x="4912822" y="2217566"/>
+            <a:ext cx="959835" cy="527470"/>
+          </a:xfrm>
+          <a:prstGeom prst="straightConnector1">
+            <a:avLst/>
+          </a:prstGeom>
+          <a:ln w="28575">
+            <a:headEnd type="arrow"/>
+            <a:tailEnd type="arrow"/>
+          </a:ln>
+        </p:spPr>
+        <p:style>
+          <a:lnRef idx="1">
+            <a:schemeClr val="accent1"/>
+          </a:lnRef>
+          <a:fillRef idx="0">
+            <a:schemeClr val="accent1"/>
+          </a:fillRef>
+          <a:effectRef idx="0">
+            <a:schemeClr val="accent1"/>
+          </a:effectRef>
+          <a:fontRef idx="minor">
+            <a:schemeClr val="tx1"/>
+          </a:fontRef>
+        </p:style>
+      </p:cxnSp>
+      <p:sp>
+        <p:nvSpPr>
+          <p:cNvPr id="2" name="Oval 1">
+            <a:extLst>
+              <a:ext uri="{FF2B5EF4-FFF2-40B4-BE49-F238E27FC236}">
+                <a16:creationId xmlns:a16="http://schemas.microsoft.com/office/drawing/2014/main" id="{A5D6F4B5-F903-E4C6-1434-070CA5E09567}"/>
+              </a:ext>
+            </a:extLst>
+          </p:cNvPr>
+          <p:cNvSpPr/>
+          <p:nvPr/>
+        </p:nvSpPr>
+        <p:spPr>
+          <a:xfrm>
+            <a:off x="5712033" y="1281384"/>
+            <a:ext cx="1096806" cy="1096806"/>
+          </a:xfrm>
+          <a:prstGeom prst="ellipse">
+            <a:avLst/>
+          </a:prstGeom>
+        </p:spPr>
+        <p:style>
+          <a:lnRef idx="2">
+            <a:schemeClr val="accent1">
+              <a:shade val="15000"/>
+            </a:schemeClr>
+          </a:lnRef>
+          <a:fillRef idx="1">
+            <a:schemeClr val="accent1"/>
+          </a:fillRef>
+          <a:effectRef idx="0">
+            <a:schemeClr val="accent1"/>
+          </a:effectRef>
+          <a:fontRef idx="minor">
+            <a:schemeClr val="lt1"/>
+          </a:fontRef>
+        </p:style>
+        <p:txBody>
+          <a:bodyPr rtlCol="0" anchor="ctr"/>
+          <a:lstStyle/>
+          <a:p>
+            <a:pPr algn="ctr"/>
+            <a:r>
+              <a:rPr lang="en-US"/>
+              <a:t>Agent</a:t>
+            </a:r>
+          </a:p>
+        </p:txBody>
+      </p:sp>
+      <p:sp>
+        <p:nvSpPr>
+          <p:cNvPr id="3" name="Oval 2">
+            <a:extLst>
+              <a:ext uri="{FF2B5EF4-FFF2-40B4-BE49-F238E27FC236}">
+                <a16:creationId xmlns:a16="http://schemas.microsoft.com/office/drawing/2014/main" id="{C06596FF-5A71-1207-31AE-09A6FC2A9E1F}"/>
+              </a:ext>
+            </a:extLst>
+          </p:cNvPr>
+          <p:cNvSpPr/>
+          <p:nvPr/>
+        </p:nvSpPr>
+        <p:spPr>
+          <a:xfrm>
+            <a:off x="5712033" y="3931408"/>
+            <a:ext cx="1096806" cy="1096806"/>
+          </a:xfrm>
+          <a:prstGeom prst="ellipse">
+            <a:avLst/>
+          </a:prstGeom>
+        </p:spPr>
+        <p:style>
+          <a:lnRef idx="2">
+            <a:schemeClr val="accent1">
+              <a:shade val="15000"/>
+            </a:schemeClr>
+          </a:lnRef>
+          <a:fillRef idx="1">
+            <a:schemeClr val="accent1"/>
+          </a:fillRef>
+          <a:effectRef idx="0">
+            <a:schemeClr val="accent1"/>
+          </a:effectRef>
+          <a:fontRef idx="minor">
+            <a:schemeClr val="lt1"/>
+          </a:fontRef>
+        </p:style>
+        <p:txBody>
+          <a:bodyPr rtlCol="0" anchor="ctr"/>
+          <a:lstStyle/>
+          <a:p>
+            <a:pPr algn="ctr"/>
+            <a:r>
+              <a:rPr lang="en-US"/>
+              <a:t>Agent</a:t>
+            </a:r>
+          </a:p>
+        </p:txBody>
+      </p:sp>
+      <p:sp>
+        <p:nvSpPr>
+          <p:cNvPr id="4" name="Oval 3">
+            <a:extLst>
+              <a:ext uri="{FF2B5EF4-FFF2-40B4-BE49-F238E27FC236}">
+                <a16:creationId xmlns:a16="http://schemas.microsoft.com/office/drawing/2014/main" id="{6B6D68E7-3145-3815-C033-FF0612A06A69}"/>
+              </a:ext>
+            </a:extLst>
+          </p:cNvPr>
+          <p:cNvSpPr/>
+          <p:nvPr/>
+        </p:nvSpPr>
+        <p:spPr>
+          <a:xfrm>
+            <a:off x="7481840" y="2584412"/>
+            <a:ext cx="1096806" cy="1096806"/>
+          </a:xfrm>
+          <a:prstGeom prst="ellipse">
+            <a:avLst/>
+          </a:prstGeom>
+        </p:spPr>
+        <p:style>
+          <a:lnRef idx="2">
+            <a:schemeClr val="accent1">
+              <a:shade val="15000"/>
+            </a:schemeClr>
+          </a:lnRef>
+          <a:fillRef idx="1">
+            <a:schemeClr val="accent1"/>
+          </a:fillRef>
+          <a:effectRef idx="0">
+            <a:schemeClr val="accent1"/>
+          </a:effectRef>
+          <a:fontRef idx="minor">
+            <a:schemeClr val="lt1"/>
+          </a:fontRef>
+        </p:style>
+        <p:txBody>
+          <a:bodyPr rtlCol="0" anchor="ctr"/>
+          <a:lstStyle/>
+          <a:p>
+            <a:pPr algn="ctr"/>
+            <a:r>
+              <a:rPr lang="en-US"/>
+              <a:t>Agent</a:t>
+            </a:r>
+          </a:p>
+        </p:txBody>
+      </p:sp>
+      <p:cxnSp>
+        <p:nvCxnSpPr>
+          <p:cNvPr id="7" name="Straight Arrow Connector 6">
+            <a:extLst>
+              <a:ext uri="{FF2B5EF4-FFF2-40B4-BE49-F238E27FC236}">
+                <a16:creationId xmlns:a16="http://schemas.microsoft.com/office/drawing/2014/main" id="{C2A8B516-E3FF-4546-B47C-55AFBE5922B9}"/>
+              </a:ext>
+            </a:extLst>
+          </p:cNvPr>
+          <p:cNvCxnSpPr>
+            <a:cxnSpLocks/>
+            <a:stCxn id="4" idx="2"/>
+            <a:endCxn id="9" idx="6"/>
+          </p:cNvCxnSpPr>
+          <p:nvPr/>
+        </p:nvCxnSpPr>
+        <p:spPr>
+          <a:xfrm flipH="1">
+            <a:off x="5073446" y="3132815"/>
+            <a:ext cx="2408394" cy="0"/>
+          </a:xfrm>
+          <a:prstGeom prst="straightConnector1">
+            <a:avLst/>
+          </a:prstGeom>
+          <a:ln w="28575">
+            <a:headEnd type="arrow"/>
+            <a:tailEnd type="arrow"/>
+          </a:ln>
+        </p:spPr>
+        <p:style>
+          <a:lnRef idx="1">
+            <a:schemeClr val="accent1"/>
+          </a:lnRef>
+          <a:fillRef idx="0">
+            <a:schemeClr val="accent1"/>
+          </a:fillRef>
+          <a:effectRef idx="0">
+            <a:schemeClr val="accent1"/>
+          </a:effectRef>
+          <a:fontRef idx="minor">
+            <a:schemeClr val="tx1"/>
+          </a:fontRef>
+        </p:style>
+      </p:cxnSp>
+      <p:cxnSp>
+        <p:nvCxnSpPr>
+          <p:cNvPr id="11" name="Straight Arrow Connector 10">
+            <a:extLst>
+              <a:ext uri="{FF2B5EF4-FFF2-40B4-BE49-F238E27FC236}">
+                <a16:creationId xmlns:a16="http://schemas.microsoft.com/office/drawing/2014/main" id="{D8C16D3E-1A6E-3787-8069-947E970CBB07}"/>
+              </a:ext>
+            </a:extLst>
+          </p:cNvPr>
+          <p:cNvCxnSpPr>
+            <a:cxnSpLocks/>
+            <a:stCxn id="3" idx="1"/>
+            <a:endCxn id="9" idx="5"/>
+          </p:cNvCxnSpPr>
+          <p:nvPr/>
+        </p:nvCxnSpPr>
+        <p:spPr>
+          <a:xfrm flipH="1" flipV="1">
+            <a:off x="4912822" y="3520594"/>
+            <a:ext cx="959835" cy="571438"/>
+          </a:xfrm>
+          <a:prstGeom prst="straightConnector1">
+            <a:avLst/>
+          </a:prstGeom>
+          <a:ln w="28575">
+            <a:headEnd type="arrow"/>
+            <a:tailEnd type="arrow"/>
+          </a:ln>
+        </p:spPr>
+        <p:style>
+          <a:lnRef idx="1">
+            <a:schemeClr val="accent1"/>
+          </a:lnRef>
+          <a:fillRef idx="0">
+            <a:schemeClr val="accent1"/>
+          </a:fillRef>
+          <a:effectRef idx="0">
+            <a:schemeClr val="accent1"/>
+          </a:effectRef>
+          <a:fontRef idx="minor">
+            <a:schemeClr val="tx1"/>
+          </a:fontRef>
+        </p:style>
+      </p:cxnSp>
+      <p:cxnSp>
+        <p:nvCxnSpPr>
+          <p:cNvPr id="19" name="Straight Arrow Connector 18">
+            <a:extLst>
+              <a:ext uri="{FF2B5EF4-FFF2-40B4-BE49-F238E27FC236}">
+                <a16:creationId xmlns:a16="http://schemas.microsoft.com/office/drawing/2014/main" id="{E5F46F47-8860-9F22-EA1E-0A374FFEB423}"/>
+              </a:ext>
+            </a:extLst>
+          </p:cNvPr>
+          <p:cNvCxnSpPr>
+            <a:cxnSpLocks/>
+            <a:stCxn id="4" idx="1"/>
+            <a:endCxn id="2" idx="5"/>
+          </p:cNvCxnSpPr>
+          <p:nvPr/>
+        </p:nvCxnSpPr>
+        <p:spPr>
+          <a:xfrm flipH="1" flipV="1">
+            <a:off x="6648215" y="2217566"/>
+            <a:ext cx="994249" cy="527470"/>
+          </a:xfrm>
+          <a:prstGeom prst="straightConnector1">
+            <a:avLst/>
+          </a:prstGeom>
+          <a:ln w="28575">
+            <a:headEnd type="arrow"/>
+            <a:tailEnd type="arrow"/>
+          </a:ln>
+        </p:spPr>
+        <p:style>
+          <a:lnRef idx="1">
+            <a:schemeClr val="accent1"/>
+          </a:lnRef>
+          <a:fillRef idx="0">
+            <a:schemeClr val="accent1"/>
+          </a:fillRef>
+          <a:effectRef idx="0">
+            <a:schemeClr val="accent1"/>
+          </a:effectRef>
+          <a:fontRef idx="minor">
+            <a:schemeClr val="tx1"/>
+          </a:fontRef>
+        </p:style>
+      </p:cxnSp>
+      <p:cxnSp>
+        <p:nvCxnSpPr>
+          <p:cNvPr id="22" name="Straight Arrow Connector 21">
+            <a:extLst>
+              <a:ext uri="{FF2B5EF4-FFF2-40B4-BE49-F238E27FC236}">
+                <a16:creationId xmlns:a16="http://schemas.microsoft.com/office/drawing/2014/main" id="{D5B2B313-B90C-4671-D3D1-9E87ADDA5BF4}"/>
+              </a:ext>
+            </a:extLst>
+          </p:cNvPr>
+          <p:cNvCxnSpPr>
+            <a:cxnSpLocks/>
+            <a:stCxn id="4" idx="3"/>
+            <a:endCxn id="3" idx="7"/>
+          </p:cNvCxnSpPr>
+          <p:nvPr/>
+        </p:nvCxnSpPr>
+        <p:spPr>
+          <a:xfrm flipH="1">
+            <a:off x="6648215" y="3520594"/>
+            <a:ext cx="994249" cy="571438"/>
+          </a:xfrm>
+          <a:prstGeom prst="straightConnector1">
+            <a:avLst/>
+          </a:prstGeom>
+          <a:ln w="28575">
+            <a:headEnd type="arrow"/>
+            <a:tailEnd type="arrow"/>
+          </a:ln>
+        </p:spPr>
+        <p:style>
+          <a:lnRef idx="1">
+            <a:schemeClr val="accent1"/>
+          </a:lnRef>
+          <a:fillRef idx="0">
+            <a:schemeClr val="accent1"/>
+          </a:fillRef>
+          <a:effectRef idx="0">
+            <a:schemeClr val="accent1"/>
+          </a:effectRef>
+          <a:fontRef idx="minor">
+            <a:schemeClr val="tx1"/>
+          </a:fontRef>
+        </p:style>
+      </p:cxnSp>
+      <p:cxnSp>
+        <p:nvCxnSpPr>
+          <p:cNvPr id="26" name="Straight Arrow Connector 25">
+            <a:extLst>
+              <a:ext uri="{FF2B5EF4-FFF2-40B4-BE49-F238E27FC236}">
+                <a16:creationId xmlns:a16="http://schemas.microsoft.com/office/drawing/2014/main" id="{E64D953C-8B21-F2FD-6160-95B86F04FA92}"/>
+              </a:ext>
+            </a:extLst>
+          </p:cNvPr>
+          <p:cNvCxnSpPr>
+            <a:cxnSpLocks/>
+            <a:stCxn id="2" idx="4"/>
+            <a:endCxn id="3" idx="0"/>
+          </p:cNvCxnSpPr>
+          <p:nvPr/>
+        </p:nvCxnSpPr>
+        <p:spPr>
+          <a:xfrm>
+            <a:off x="6260436" y="2378190"/>
+            <a:ext cx="0" cy="1553218"/>
+          </a:xfrm>
+          <a:prstGeom prst="straightConnector1">
+            <a:avLst/>
+          </a:prstGeom>
+          <a:ln w="28575">
+            <a:headEnd type="arrow"/>
+            <a:tailEnd type="arrow"/>
+          </a:ln>
+        </p:spPr>
+        <p:style>
+          <a:lnRef idx="1">
+            <a:schemeClr val="accent1"/>
+          </a:lnRef>
+          <a:fillRef idx="0">
+            <a:schemeClr val="accent1"/>
+          </a:fillRef>
+          <a:effectRef idx="0">
+            <a:schemeClr val="accent1"/>
+          </a:effectRef>
+          <a:fontRef idx="minor">
+            <a:schemeClr val="tx1"/>
+          </a:fontRef>
+        </p:style>
+      </p:cxnSp>
+    </p:spTree>
+    <p:extLst>
+      <p:ext uri="{BB962C8B-B14F-4D97-AF65-F5344CB8AC3E}">
+        <p14:creationId xmlns:p14="http://schemas.microsoft.com/office/powerpoint/2010/main" val="2983258615"/>
       </p:ext>
     </p:extLst>
   </p:cSld>
@@ -39411,13 +43160,7 @@
           <p:nvPr/>
         </p:nvPicPr>
         <p:blipFill>
-          <a:blip r:embed="rId2">
-            <a:extLst>
-              <a:ext uri="{96DAC541-7B7A-43D3-8B79-37D633B846F1}">
-                <asvg:svgBlip xmlns:asvg="http://schemas.microsoft.com/office/drawing/2016/SVG/main"/>
-              </a:ext>
-            </a:extLst>
-          </a:blip>
+          <a:blip/>
           <a:stretch>
             <a:fillRect/>
           </a:stretch>
@@ -39447,13 +43190,7 @@
           <p:nvPr/>
         </p:nvPicPr>
         <p:blipFill>
-          <a:blip r:embed="rId4">
-            <a:extLst>
-              <a:ext uri="{96DAC541-7B7A-43D3-8B79-37D633B846F1}">
-                <asvg:svgBlip xmlns:asvg="http://schemas.microsoft.com/office/drawing/2016/SVG/main"/>
-              </a:ext>
-            </a:extLst>
-          </a:blip>
+          <a:blip/>
           <a:stretch>
             <a:fillRect/>
           </a:stretch>
@@ -39483,13 +43220,7 @@
           <p:nvPr/>
         </p:nvPicPr>
         <p:blipFill>
-          <a:blip r:embed="rId6">
-            <a:extLst>
-              <a:ext uri="{96DAC541-7B7A-43D3-8B79-37D633B846F1}">
-                <asvg:svgBlip xmlns:asvg="http://schemas.microsoft.com/office/drawing/2016/SVG/main"/>
-              </a:ext>
-            </a:extLst>
-          </a:blip>
+          <a:blip/>
           <a:stretch>
             <a:fillRect/>
           </a:stretch>

</xml_diff>

<commit_message>
Modified Tutorials directory structure
</commit_message>
<xml_diff>
--- a/images/graphics.pptx
+++ b/images/graphics.pptx
@@ -55,6 +55,8 @@
     <p:sldId id="305" r:id="rId49"/>
     <p:sldId id="306" r:id="rId50"/>
     <p:sldId id="307" r:id="rId51"/>
+    <p:sldId id="308" r:id="rId52"/>
+    <p:sldId id="309" r:id="rId53"/>
   </p:sldIdLst>
   <p:sldSz cx="12192000" cy="6858000"/>
   <p:notesSz cx="6858000" cy="9144000"/>
@@ -3388,7 +3390,7 @@
           <a:p>
             <a:fld id="{E9175749-BE88-2442-8D84-DEA4B15C26FA}" type="datetimeFigureOut">
               <a:rPr lang="en-US" smtClean="0"/>
-              <a:t>2/15/25</a:t>
+              <a:t>1/23/26</a:t>
             </a:fld>
             <a:endParaRPr lang="en-US"/>
           </a:p>
@@ -3588,7 +3590,7 @@
           <a:p>
             <a:fld id="{E9175749-BE88-2442-8D84-DEA4B15C26FA}" type="datetimeFigureOut">
               <a:rPr lang="en-US" smtClean="0"/>
-              <a:t>2/15/25</a:t>
+              <a:t>1/23/26</a:t>
             </a:fld>
             <a:endParaRPr lang="en-US"/>
           </a:p>
@@ -3798,7 +3800,7 @@
           <a:p>
             <a:fld id="{E9175749-BE88-2442-8D84-DEA4B15C26FA}" type="datetimeFigureOut">
               <a:rPr lang="en-US" smtClean="0"/>
-              <a:t>2/15/25</a:t>
+              <a:t>1/23/26</a:t>
             </a:fld>
             <a:endParaRPr lang="en-US"/>
           </a:p>
@@ -3998,7 +4000,7 @@
           <a:p>
             <a:fld id="{E9175749-BE88-2442-8D84-DEA4B15C26FA}" type="datetimeFigureOut">
               <a:rPr lang="en-US" smtClean="0"/>
-              <a:t>2/15/25</a:t>
+              <a:t>1/23/26</a:t>
             </a:fld>
             <a:endParaRPr lang="en-US"/>
           </a:p>
@@ -4274,7 +4276,7 @@
           <a:p>
             <a:fld id="{E9175749-BE88-2442-8D84-DEA4B15C26FA}" type="datetimeFigureOut">
               <a:rPr lang="en-US" smtClean="0"/>
-              <a:t>2/15/25</a:t>
+              <a:t>1/23/26</a:t>
             </a:fld>
             <a:endParaRPr lang="en-US"/>
           </a:p>
@@ -4542,7 +4544,7 @@
           <a:p>
             <a:fld id="{E9175749-BE88-2442-8D84-DEA4B15C26FA}" type="datetimeFigureOut">
               <a:rPr lang="en-US" smtClean="0"/>
-              <a:t>2/15/25</a:t>
+              <a:t>1/23/26</a:t>
             </a:fld>
             <a:endParaRPr lang="en-US"/>
           </a:p>
@@ -4957,7 +4959,7 @@
           <a:p>
             <a:fld id="{E9175749-BE88-2442-8D84-DEA4B15C26FA}" type="datetimeFigureOut">
               <a:rPr lang="en-US" smtClean="0"/>
-              <a:t>2/15/25</a:t>
+              <a:t>1/23/26</a:t>
             </a:fld>
             <a:endParaRPr lang="en-US"/>
           </a:p>
@@ -5099,7 +5101,7 @@
           <a:p>
             <a:fld id="{E9175749-BE88-2442-8D84-DEA4B15C26FA}" type="datetimeFigureOut">
               <a:rPr lang="en-US" smtClean="0"/>
-              <a:t>2/15/25</a:t>
+              <a:t>1/23/26</a:t>
             </a:fld>
             <a:endParaRPr lang="en-US"/>
           </a:p>
@@ -5212,7 +5214,7 @@
           <a:p>
             <a:fld id="{E9175749-BE88-2442-8D84-DEA4B15C26FA}" type="datetimeFigureOut">
               <a:rPr lang="en-US" smtClean="0"/>
-              <a:t>2/15/25</a:t>
+              <a:t>1/23/26</a:t>
             </a:fld>
             <a:endParaRPr lang="en-US"/>
           </a:p>
@@ -5525,7 +5527,7 @@
           <a:p>
             <a:fld id="{E9175749-BE88-2442-8D84-DEA4B15C26FA}" type="datetimeFigureOut">
               <a:rPr lang="en-US" smtClean="0"/>
-              <a:t>2/15/25</a:t>
+              <a:t>1/23/26</a:t>
             </a:fld>
             <a:endParaRPr lang="en-US"/>
           </a:p>
@@ -5814,7 +5816,7 @@
           <a:p>
             <a:fld id="{E9175749-BE88-2442-8D84-DEA4B15C26FA}" type="datetimeFigureOut">
               <a:rPr lang="en-US" smtClean="0"/>
-              <a:t>2/15/25</a:t>
+              <a:t>1/23/26</a:t>
             </a:fld>
             <a:endParaRPr lang="en-US"/>
           </a:p>
@@ -6057,7 +6059,7 @@
           <a:p>
             <a:fld id="{E9175749-BE88-2442-8D84-DEA4B15C26FA}" type="datetimeFigureOut">
               <a:rPr lang="en-US" smtClean="0"/>
-              <a:t>2/15/25</a:t>
+              <a:t>1/23/26</a:t>
             </a:fld>
             <a:endParaRPr lang="en-US"/>
           </a:p>
@@ -42825,6 +42827,2002 @@
 </p:sld>
 </file>
 
+<file path=ppt/slides/slide51.xml><?xml version="1.0" encoding="utf-8"?>
+<p:sld xmlns:a="http://schemas.openxmlformats.org/drawingml/2006/main" xmlns:r="http://schemas.openxmlformats.org/officeDocument/2006/relationships" xmlns:p="http://schemas.openxmlformats.org/presentationml/2006/main">
+  <p:cSld>
+    <p:spTree>
+      <p:nvGrpSpPr>
+        <p:cNvPr id="1" name=""/>
+        <p:cNvGrpSpPr/>
+        <p:nvPr/>
+      </p:nvGrpSpPr>
+      <p:grpSpPr>
+        <a:xfrm>
+          <a:off x="0" y="0"/>
+          <a:ext cx="0" cy="0"/>
+          <a:chOff x="0" y="0"/>
+          <a:chExt cx="0" cy="0"/>
+        </a:xfrm>
+      </p:grpSpPr>
+      <p:sp>
+        <p:nvSpPr>
+          <p:cNvPr id="3" name="Rounded Rectangle 2">
+            <a:extLst>
+              <a:ext uri="{FF2B5EF4-FFF2-40B4-BE49-F238E27FC236}">
+                <a16:creationId xmlns:a16="http://schemas.microsoft.com/office/drawing/2014/main" id="{AEF014C2-B267-AF29-FCDE-2406579950FB}"/>
+              </a:ext>
+            </a:extLst>
+          </p:cNvPr>
+          <p:cNvSpPr/>
+          <p:nvPr/>
+        </p:nvSpPr>
+        <p:spPr>
+          <a:xfrm>
+            <a:off x="2610079" y="623027"/>
+            <a:ext cx="1965434" cy="725213"/>
+          </a:xfrm>
+          <a:prstGeom prst="roundRect">
+            <a:avLst/>
+          </a:prstGeom>
+        </p:spPr>
+        <p:style>
+          <a:lnRef idx="2">
+            <a:schemeClr val="accent1"/>
+          </a:lnRef>
+          <a:fillRef idx="1">
+            <a:schemeClr val="lt1"/>
+          </a:fillRef>
+          <a:effectRef idx="0">
+            <a:schemeClr val="accent1"/>
+          </a:effectRef>
+          <a:fontRef idx="minor">
+            <a:schemeClr val="dk1"/>
+          </a:fontRef>
+        </p:style>
+        <p:txBody>
+          <a:bodyPr rtlCol="0" anchor="ctr"/>
+          <a:lstStyle/>
+          <a:p>
+            <a:pPr algn="ctr"/>
+            <a:r>
+              <a:rPr lang="en-US" sz="1600"/>
+              <a:t>docker-compose.yml</a:t>
+            </a:r>
+          </a:p>
+        </p:txBody>
+      </p:sp>
+      <p:pic>
+        <p:nvPicPr>
+          <p:cNvPr id="4" name="Picture 3" descr="image source : https://quintagroup.com">
+            <a:extLst>
+              <a:ext uri="{FF2B5EF4-FFF2-40B4-BE49-F238E27FC236}">
+                <a16:creationId xmlns:a16="http://schemas.microsoft.com/office/drawing/2014/main" id="{7A68E974-03FA-3E12-B04C-DC5B09D3BBC2}"/>
+              </a:ext>
+            </a:extLst>
+          </p:cNvPr>
+          <p:cNvPicPr>
+            <a:picLocks noChangeAspect="1"/>
+          </p:cNvPicPr>
+          <p:nvPr/>
+        </p:nvPicPr>
+        <p:blipFill>
+          <a:blip r:embed="rId2"/>
+          <a:stretch>
+            <a:fillRect/>
+          </a:stretch>
+        </p:blipFill>
+        <p:spPr>
+          <a:xfrm>
+            <a:off x="2610079" y="2350047"/>
+            <a:ext cx="1965434" cy="943960"/>
+          </a:xfrm>
+          <a:prstGeom prst="rect">
+            <a:avLst/>
+          </a:prstGeom>
+          <a:ln w="12700">
+            <a:solidFill>
+              <a:schemeClr val="accent5"/>
+            </a:solidFill>
+          </a:ln>
+        </p:spPr>
+      </p:pic>
+      <p:sp>
+        <p:nvSpPr>
+          <p:cNvPr id="5" name="Rounded Rectangle 4">
+            <a:extLst>
+              <a:ext uri="{FF2B5EF4-FFF2-40B4-BE49-F238E27FC236}">
+                <a16:creationId xmlns:a16="http://schemas.microsoft.com/office/drawing/2014/main" id="{BAE44B42-2F0D-7AD1-16FF-FBD16EA4F350}"/>
+              </a:ext>
+            </a:extLst>
+          </p:cNvPr>
+          <p:cNvSpPr/>
+          <p:nvPr/>
+        </p:nvSpPr>
+        <p:spPr>
+          <a:xfrm>
+            <a:off x="5142463" y="1830402"/>
+            <a:ext cx="1618807" cy="903797"/>
+          </a:xfrm>
+          <a:prstGeom prst="roundRect">
+            <a:avLst/>
+          </a:prstGeom>
+        </p:spPr>
+        <p:style>
+          <a:lnRef idx="2">
+            <a:schemeClr val="accent1"/>
+          </a:lnRef>
+          <a:fillRef idx="1">
+            <a:schemeClr val="lt1"/>
+          </a:fillRef>
+          <a:effectRef idx="0">
+            <a:schemeClr val="accent1"/>
+          </a:effectRef>
+          <a:fontRef idx="minor">
+            <a:schemeClr val="dk1"/>
+          </a:fontRef>
+        </p:style>
+        <p:txBody>
+          <a:bodyPr rtlCol="0" anchor="b" anchorCtr="0"/>
+          <a:lstStyle/>
+          <a:p>
+            <a:pPr algn="ctr"/>
+            <a:r>
+              <a:rPr lang="en-US" sz="1600"/>
+              <a:t>postgres image</a:t>
+            </a:r>
+          </a:p>
+        </p:txBody>
+      </p:sp>
+      <p:pic>
+        <p:nvPicPr>
+          <p:cNvPr id="6" name="Picture 5">
+            <a:extLst>
+              <a:ext uri="{FF2B5EF4-FFF2-40B4-BE49-F238E27FC236}">
+                <a16:creationId xmlns:a16="http://schemas.microsoft.com/office/drawing/2014/main" id="{AA795E55-938C-72A6-E222-826EE0985CC4}"/>
+              </a:ext>
+            </a:extLst>
+          </p:cNvPr>
+          <p:cNvPicPr>
+            <a:picLocks noChangeAspect="1"/>
+          </p:cNvPicPr>
+          <p:nvPr/>
+        </p:nvPicPr>
+        <p:blipFill>
+          <a:blip r:embed="rId3"/>
+          <a:stretch>
+            <a:fillRect/>
+          </a:stretch>
+        </p:blipFill>
+        <p:spPr>
+          <a:xfrm>
+            <a:off x="5333398" y="1830403"/>
+            <a:ext cx="1222703" cy="687770"/>
+          </a:xfrm>
+          <a:prstGeom prst="rect">
+            <a:avLst/>
+          </a:prstGeom>
+        </p:spPr>
+      </p:pic>
+      <p:sp>
+        <p:nvSpPr>
+          <p:cNvPr id="9" name="Rounded Rectangle 8">
+            <a:extLst>
+              <a:ext uri="{FF2B5EF4-FFF2-40B4-BE49-F238E27FC236}">
+                <a16:creationId xmlns:a16="http://schemas.microsoft.com/office/drawing/2014/main" id="{DE5CB6C8-DB2A-C05C-1F83-079C88563CDB}"/>
+              </a:ext>
+            </a:extLst>
+          </p:cNvPr>
+          <p:cNvSpPr/>
+          <p:nvPr/>
+        </p:nvSpPr>
+        <p:spPr>
+          <a:xfrm>
+            <a:off x="5142463" y="3092379"/>
+            <a:ext cx="1618807" cy="725213"/>
+          </a:xfrm>
+          <a:prstGeom prst="roundRect">
+            <a:avLst/>
+          </a:prstGeom>
+        </p:spPr>
+        <p:style>
+          <a:lnRef idx="2">
+            <a:schemeClr val="accent1"/>
+          </a:lnRef>
+          <a:fillRef idx="1">
+            <a:schemeClr val="lt1"/>
+          </a:fillRef>
+          <a:effectRef idx="0">
+            <a:schemeClr val="accent1"/>
+          </a:effectRef>
+          <a:fontRef idx="minor">
+            <a:schemeClr val="dk1"/>
+          </a:fontRef>
+        </p:style>
+        <p:txBody>
+          <a:bodyPr rtlCol="0" anchor="ctr"/>
+          <a:lstStyle/>
+          <a:p>
+            <a:pPr algn="ctr"/>
+            <a:r>
+              <a:rPr lang="en-US" sz="1600"/>
+              <a:t>DockerFile</a:t>
+            </a:r>
+          </a:p>
+        </p:txBody>
+      </p:sp>
+      <p:sp>
+        <p:nvSpPr>
+          <p:cNvPr id="10" name="Rounded Rectangle 9">
+            <a:extLst>
+              <a:ext uri="{FF2B5EF4-FFF2-40B4-BE49-F238E27FC236}">
+                <a16:creationId xmlns:a16="http://schemas.microsoft.com/office/drawing/2014/main" id="{ED33D9A1-95D5-F194-0E04-391B6BBA3B76}"/>
+              </a:ext>
+            </a:extLst>
+          </p:cNvPr>
+          <p:cNvSpPr/>
+          <p:nvPr/>
+        </p:nvSpPr>
+        <p:spPr>
+          <a:xfrm>
+            <a:off x="5142463" y="4307550"/>
+            <a:ext cx="1618807" cy="903797"/>
+          </a:xfrm>
+          <a:prstGeom prst="roundRect">
+            <a:avLst/>
+          </a:prstGeom>
+        </p:spPr>
+        <p:style>
+          <a:lnRef idx="2">
+            <a:schemeClr val="accent1"/>
+          </a:lnRef>
+          <a:fillRef idx="1">
+            <a:schemeClr val="lt1"/>
+          </a:fillRef>
+          <a:effectRef idx="0">
+            <a:schemeClr val="accent1"/>
+          </a:effectRef>
+          <a:fontRef idx="minor">
+            <a:schemeClr val="dk1"/>
+          </a:fontRef>
+        </p:style>
+        <p:txBody>
+          <a:bodyPr rtlCol="0" anchor="b" anchorCtr="0"/>
+          <a:lstStyle/>
+          <a:p>
+            <a:pPr algn="ctr"/>
+            <a:r>
+              <a:rPr lang="en-US" sz="1600"/>
+              <a:t>built image</a:t>
+            </a:r>
+          </a:p>
+        </p:txBody>
+      </p:sp>
+      <p:pic>
+        <p:nvPicPr>
+          <p:cNvPr id="11" name="Picture 10">
+            <a:extLst>
+              <a:ext uri="{FF2B5EF4-FFF2-40B4-BE49-F238E27FC236}">
+                <a16:creationId xmlns:a16="http://schemas.microsoft.com/office/drawing/2014/main" id="{5BB6D539-79E0-69FC-2C06-2883FE8F3B1D}"/>
+              </a:ext>
+            </a:extLst>
+          </p:cNvPr>
+          <p:cNvPicPr>
+            <a:picLocks noChangeAspect="1"/>
+          </p:cNvPicPr>
+          <p:nvPr/>
+        </p:nvPicPr>
+        <p:blipFill>
+          <a:blip r:embed="rId3"/>
+          <a:stretch>
+            <a:fillRect/>
+          </a:stretch>
+        </p:blipFill>
+        <p:spPr>
+          <a:xfrm>
+            <a:off x="5333398" y="4281298"/>
+            <a:ext cx="1222703" cy="687770"/>
+          </a:xfrm>
+          <a:prstGeom prst="rect">
+            <a:avLst/>
+          </a:prstGeom>
+        </p:spPr>
+      </p:pic>
+      <p:sp>
+        <p:nvSpPr>
+          <p:cNvPr id="21" name="Rounded Rectangle 20">
+            <a:extLst>
+              <a:ext uri="{FF2B5EF4-FFF2-40B4-BE49-F238E27FC236}">
+                <a16:creationId xmlns:a16="http://schemas.microsoft.com/office/drawing/2014/main" id="{A988A322-E12B-6BFA-31AB-4CCA4547329D}"/>
+              </a:ext>
+            </a:extLst>
+          </p:cNvPr>
+          <p:cNvSpPr/>
+          <p:nvPr/>
+        </p:nvSpPr>
+        <p:spPr>
+          <a:xfrm>
+            <a:off x="7241901" y="1763272"/>
+            <a:ext cx="2281399" cy="1038058"/>
+          </a:xfrm>
+          <a:prstGeom prst="roundRect">
+            <a:avLst/>
+          </a:prstGeom>
+        </p:spPr>
+        <p:style>
+          <a:lnRef idx="2">
+            <a:schemeClr val="accent1"/>
+          </a:lnRef>
+          <a:fillRef idx="1">
+            <a:schemeClr val="lt1"/>
+          </a:fillRef>
+          <a:effectRef idx="0">
+            <a:schemeClr val="accent1"/>
+          </a:effectRef>
+          <a:fontRef idx="minor">
+            <a:schemeClr val="dk1"/>
+          </a:fontRef>
+        </p:style>
+        <p:txBody>
+          <a:bodyPr rtlCol="0" anchor="ctr"/>
+          <a:lstStyle/>
+          <a:p>
+            <a:pPr algn="r"/>
+            <a:r>
+              <a:rPr lang="en-US" sz="1600"/>
+              <a:t>Docker container</a:t>
+            </a:r>
+          </a:p>
+        </p:txBody>
+      </p:sp>
+      <p:grpSp>
+        <p:nvGrpSpPr>
+          <p:cNvPr id="16" name="Graphic 12" descr="Box with solid fill">
+            <a:extLst>
+              <a:ext uri="{FF2B5EF4-FFF2-40B4-BE49-F238E27FC236}">
+                <a16:creationId xmlns:a16="http://schemas.microsoft.com/office/drawing/2014/main" id="{1A1296F2-34A1-CC51-4A83-D1C860DDCF23}"/>
+              </a:ext>
+            </a:extLst>
+          </p:cNvPr>
+          <p:cNvGrpSpPr/>
+          <p:nvPr/>
+        </p:nvGrpSpPr>
+        <p:grpSpPr>
+          <a:xfrm>
+            <a:off x="7398492" y="1998535"/>
+            <a:ext cx="429547" cy="512853"/>
+            <a:chOff x="9377321" y="1183646"/>
+            <a:chExt cx="628650" cy="750570"/>
+          </a:xfrm>
+          <a:solidFill>
+            <a:schemeClr val="accent5"/>
+          </a:solidFill>
+        </p:grpSpPr>
+        <p:sp>
+          <p:nvSpPr>
+            <p:cNvPr id="17" name="Freeform 16">
+              <a:extLst>
+                <a:ext uri="{FF2B5EF4-FFF2-40B4-BE49-F238E27FC236}">
+                  <a16:creationId xmlns:a16="http://schemas.microsoft.com/office/drawing/2014/main" id="{2D93BF13-FBFA-147C-EF42-26B81686753A}"/>
+                </a:ext>
+              </a:extLst>
+            </p:cNvPr>
+            <p:cNvSpPr/>
+            <p:nvPr/>
+          </p:nvSpPr>
+          <p:spPr>
+            <a:xfrm>
+              <a:off x="9377321" y="1287468"/>
+              <a:ext cx="457200" cy="277177"/>
+            </a:xfrm>
+            <a:custGeom>
+              <a:avLst/>
+              <a:gdLst>
+                <a:gd name="csX0" fmla="*/ 142875 w 457200"/>
+                <a:gd name="csY0" fmla="*/ 0 h 277177"/>
+                <a:gd name="csX1" fmla="*/ 0 w 457200"/>
+                <a:gd name="csY1" fmla="*/ 86678 h 277177"/>
+                <a:gd name="csX2" fmla="*/ 314325 w 457200"/>
+                <a:gd name="csY2" fmla="*/ 277178 h 277177"/>
+                <a:gd name="csX3" fmla="*/ 457200 w 457200"/>
+                <a:gd name="csY3" fmla="*/ 190500 h 277177"/>
+              </a:gdLst>
+              <a:ahLst/>
+              <a:cxnLst>
+                <a:cxn ang="0">
+                  <a:pos x="csX0" y="csY0"/>
+                </a:cxn>
+                <a:cxn ang="0">
+                  <a:pos x="csX1" y="csY1"/>
+                </a:cxn>
+                <a:cxn ang="0">
+                  <a:pos x="csX2" y="csY2"/>
+                </a:cxn>
+                <a:cxn ang="0">
+                  <a:pos x="csX3" y="csY3"/>
+                </a:cxn>
+              </a:cxnLst>
+              <a:rect l="l" t="t" r="r" b="b"/>
+              <a:pathLst>
+                <a:path w="457200" h="277177">
+                  <a:moveTo>
+                    <a:pt x="142875" y="0"/>
+                  </a:moveTo>
+                  <a:lnTo>
+                    <a:pt x="0" y="86678"/>
+                  </a:lnTo>
+                  <a:lnTo>
+                    <a:pt x="314325" y="277178"/>
+                  </a:lnTo>
+                  <a:lnTo>
+                    <a:pt x="457200" y="190500"/>
+                  </a:lnTo>
+                  <a:close/>
+                </a:path>
+              </a:pathLst>
+            </a:custGeom>
+            <a:grpFill/>
+            <a:ln w="9525" cap="flat">
+              <a:noFill/>
+              <a:prstDash val="solid"/>
+              <a:miter/>
+            </a:ln>
+          </p:spPr>
+          <p:txBody>
+            <a:bodyPr/>
+            <a:lstStyle/>
+            <a:p>
+              <a:endParaRPr lang="en-US"/>
+            </a:p>
+          </p:txBody>
+        </p:sp>
+        <p:sp>
+          <p:nvSpPr>
+            <p:cNvPr id="18" name="Freeform 17">
+              <a:extLst>
+                <a:ext uri="{FF2B5EF4-FFF2-40B4-BE49-F238E27FC236}">
+                  <a16:creationId xmlns:a16="http://schemas.microsoft.com/office/drawing/2014/main" id="{C579C7EB-2DA1-82A4-243F-AE1FC7D552A0}"/>
+                </a:ext>
+              </a:extLst>
+            </p:cNvPr>
+            <p:cNvSpPr/>
+            <p:nvPr/>
+          </p:nvSpPr>
+          <p:spPr>
+            <a:xfrm>
+              <a:off x="9556390" y="1183646"/>
+              <a:ext cx="449580" cy="272415"/>
+            </a:xfrm>
+            <a:custGeom>
+              <a:avLst/>
+              <a:gdLst>
+                <a:gd name="csX0" fmla="*/ 449580 w 449580"/>
+                <a:gd name="csY0" fmla="*/ 190500 h 272415"/>
+                <a:gd name="csX1" fmla="*/ 135255 w 449580"/>
+                <a:gd name="csY1" fmla="*/ 0 h 272415"/>
+                <a:gd name="csX2" fmla="*/ 0 w 449580"/>
+                <a:gd name="csY2" fmla="*/ 81915 h 272415"/>
+                <a:gd name="csX3" fmla="*/ 314325 w 449580"/>
+                <a:gd name="csY3" fmla="*/ 272415 h 272415"/>
+              </a:gdLst>
+              <a:ahLst/>
+              <a:cxnLst>
+                <a:cxn ang="0">
+                  <a:pos x="csX0" y="csY0"/>
+                </a:cxn>
+                <a:cxn ang="0">
+                  <a:pos x="csX1" y="csY1"/>
+                </a:cxn>
+                <a:cxn ang="0">
+                  <a:pos x="csX2" y="csY2"/>
+                </a:cxn>
+                <a:cxn ang="0">
+                  <a:pos x="csX3" y="csY3"/>
+                </a:cxn>
+              </a:cxnLst>
+              <a:rect l="l" t="t" r="r" b="b"/>
+              <a:pathLst>
+                <a:path w="449580" h="272415">
+                  <a:moveTo>
+                    <a:pt x="449580" y="190500"/>
+                  </a:moveTo>
+                  <a:lnTo>
+                    <a:pt x="135255" y="0"/>
+                  </a:lnTo>
+                  <a:lnTo>
+                    <a:pt x="0" y="81915"/>
+                  </a:lnTo>
+                  <a:lnTo>
+                    <a:pt x="314325" y="272415"/>
+                  </a:lnTo>
+                  <a:close/>
+                </a:path>
+              </a:pathLst>
+            </a:custGeom>
+            <a:grpFill/>
+            <a:ln w="9525" cap="flat">
+              <a:noFill/>
+              <a:prstDash val="solid"/>
+              <a:miter/>
+            </a:ln>
+          </p:spPr>
+          <p:txBody>
+            <a:bodyPr/>
+            <a:lstStyle/>
+            <a:p>
+              <a:endParaRPr lang="en-US"/>
+            </a:p>
+          </p:txBody>
+        </p:sp>
+        <p:sp>
+          <p:nvSpPr>
+            <p:cNvPr id="19" name="Freeform 18">
+              <a:extLst>
+                <a:ext uri="{FF2B5EF4-FFF2-40B4-BE49-F238E27FC236}">
+                  <a16:creationId xmlns:a16="http://schemas.microsoft.com/office/drawing/2014/main" id="{4FD790D8-0D3A-24C1-402C-8F5B86BE762F}"/>
+                </a:ext>
+              </a:extLst>
+            </p:cNvPr>
+            <p:cNvSpPr/>
+            <p:nvPr/>
+          </p:nvSpPr>
+          <p:spPr>
+            <a:xfrm>
+              <a:off x="9377321" y="1418913"/>
+              <a:ext cx="295275" cy="515302"/>
+            </a:xfrm>
+            <a:custGeom>
+              <a:avLst/>
+              <a:gdLst>
+                <a:gd name="csX0" fmla="*/ 0 w 295275"/>
+                <a:gd name="csY0" fmla="*/ 31432 h 515302"/>
+                <a:gd name="csX1" fmla="*/ 0 w 295275"/>
+                <a:gd name="csY1" fmla="*/ 336233 h 515302"/>
+                <a:gd name="csX2" fmla="*/ 295275 w 295275"/>
+                <a:gd name="csY2" fmla="*/ 515303 h 515302"/>
+                <a:gd name="csX3" fmla="*/ 295275 w 295275"/>
+                <a:gd name="csY3" fmla="*/ 179070 h 515302"/>
+                <a:gd name="csX4" fmla="*/ 0 w 295275"/>
+                <a:gd name="csY4" fmla="*/ 0 h 515302"/>
+              </a:gdLst>
+              <a:ahLst/>
+              <a:cxnLst>
+                <a:cxn ang="0">
+                  <a:pos x="csX0" y="csY0"/>
+                </a:cxn>
+                <a:cxn ang="0">
+                  <a:pos x="csX1" y="csY1"/>
+                </a:cxn>
+                <a:cxn ang="0">
+                  <a:pos x="csX2" y="csY2"/>
+                </a:cxn>
+                <a:cxn ang="0">
+                  <a:pos x="csX3" y="csY3"/>
+                </a:cxn>
+                <a:cxn ang="0">
+                  <a:pos x="csX4" y="csY4"/>
+                </a:cxn>
+              </a:cxnLst>
+              <a:rect l="l" t="t" r="r" b="b"/>
+              <a:pathLst>
+                <a:path w="295275" h="515302">
+                  <a:moveTo>
+                    <a:pt x="0" y="31432"/>
+                  </a:moveTo>
+                  <a:lnTo>
+                    <a:pt x="0" y="336233"/>
+                  </a:lnTo>
+                  <a:lnTo>
+                    <a:pt x="295275" y="515303"/>
+                  </a:lnTo>
+                  <a:lnTo>
+                    <a:pt x="295275" y="179070"/>
+                  </a:lnTo>
+                  <a:lnTo>
+                    <a:pt x="0" y="0"/>
+                  </a:lnTo>
+                  <a:close/>
+                </a:path>
+              </a:pathLst>
+            </a:custGeom>
+            <a:grpFill/>
+            <a:ln w="9525" cap="flat">
+              <a:noFill/>
+              <a:prstDash val="solid"/>
+              <a:miter/>
+            </a:ln>
+          </p:spPr>
+          <p:txBody>
+            <a:bodyPr/>
+            <a:lstStyle/>
+            <a:p>
+              <a:endParaRPr lang="en-US"/>
+            </a:p>
+          </p:txBody>
+        </p:sp>
+        <p:sp>
+          <p:nvSpPr>
+            <p:cNvPr id="20" name="Freeform 19">
+              <a:extLst>
+                <a:ext uri="{FF2B5EF4-FFF2-40B4-BE49-F238E27FC236}">
+                  <a16:creationId xmlns:a16="http://schemas.microsoft.com/office/drawing/2014/main" id="{05C443B9-D637-4190-FEDF-34EF568FE695}"/>
+                </a:ext>
+              </a:extLst>
+            </p:cNvPr>
+            <p:cNvSpPr/>
+            <p:nvPr/>
+          </p:nvSpPr>
+          <p:spPr>
+            <a:xfrm>
+              <a:off x="9710696" y="1418913"/>
+              <a:ext cx="295275" cy="515302"/>
+            </a:xfrm>
+            <a:custGeom>
+              <a:avLst/>
+              <a:gdLst>
+                <a:gd name="csX0" fmla="*/ 104775 w 295275"/>
+                <a:gd name="csY0" fmla="*/ 231458 h 515302"/>
+                <a:gd name="csX1" fmla="*/ 38100 w 295275"/>
+                <a:gd name="csY1" fmla="*/ 269558 h 515302"/>
+                <a:gd name="csX2" fmla="*/ 38100 w 295275"/>
+                <a:gd name="csY2" fmla="*/ 202883 h 515302"/>
+                <a:gd name="csX3" fmla="*/ 104775 w 295275"/>
+                <a:gd name="csY3" fmla="*/ 164783 h 515302"/>
+                <a:gd name="csX4" fmla="*/ 104775 w 295275"/>
+                <a:gd name="csY4" fmla="*/ 231458 h 515302"/>
+                <a:gd name="csX5" fmla="*/ 0 w 295275"/>
+                <a:gd name="csY5" fmla="*/ 179070 h 515302"/>
+                <a:gd name="csX6" fmla="*/ 0 w 295275"/>
+                <a:gd name="csY6" fmla="*/ 515303 h 515302"/>
+                <a:gd name="csX7" fmla="*/ 295275 w 295275"/>
+                <a:gd name="csY7" fmla="*/ 336233 h 515302"/>
+                <a:gd name="csX8" fmla="*/ 295275 w 295275"/>
+                <a:gd name="csY8" fmla="*/ 0 h 515302"/>
+                <a:gd name="csX9" fmla="*/ 0 w 295275"/>
+                <a:gd name="csY9" fmla="*/ 179070 h 515302"/>
+              </a:gdLst>
+              <a:ahLst/>
+              <a:cxnLst>
+                <a:cxn ang="0">
+                  <a:pos x="csX0" y="csY0"/>
+                </a:cxn>
+                <a:cxn ang="0">
+                  <a:pos x="csX1" y="csY1"/>
+                </a:cxn>
+                <a:cxn ang="0">
+                  <a:pos x="csX2" y="csY2"/>
+                </a:cxn>
+                <a:cxn ang="0">
+                  <a:pos x="csX3" y="csY3"/>
+                </a:cxn>
+                <a:cxn ang="0">
+                  <a:pos x="csX4" y="csY4"/>
+                </a:cxn>
+                <a:cxn ang="0">
+                  <a:pos x="csX5" y="csY5"/>
+                </a:cxn>
+                <a:cxn ang="0">
+                  <a:pos x="csX6" y="csY6"/>
+                </a:cxn>
+                <a:cxn ang="0">
+                  <a:pos x="csX7" y="csY7"/>
+                </a:cxn>
+                <a:cxn ang="0">
+                  <a:pos x="csX8" y="csY8"/>
+                </a:cxn>
+                <a:cxn ang="0">
+                  <a:pos x="csX9" y="csY9"/>
+                </a:cxn>
+              </a:cxnLst>
+              <a:rect l="l" t="t" r="r" b="b"/>
+              <a:pathLst>
+                <a:path w="295275" h="515302">
+                  <a:moveTo>
+                    <a:pt x="104775" y="231458"/>
+                  </a:moveTo>
+                  <a:lnTo>
+                    <a:pt x="38100" y="269558"/>
+                  </a:lnTo>
+                  <a:lnTo>
+                    <a:pt x="38100" y="202883"/>
+                  </a:lnTo>
+                  <a:lnTo>
+                    <a:pt x="104775" y="164783"/>
+                  </a:lnTo>
+                  <a:lnTo>
+                    <a:pt x="104775" y="231458"/>
+                  </a:lnTo>
+                  <a:close/>
+                  <a:moveTo>
+                    <a:pt x="0" y="179070"/>
+                  </a:moveTo>
+                  <a:lnTo>
+                    <a:pt x="0" y="515303"/>
+                  </a:lnTo>
+                  <a:lnTo>
+                    <a:pt x="295275" y="336233"/>
+                  </a:lnTo>
+                  <a:lnTo>
+                    <a:pt x="295275" y="0"/>
+                  </a:lnTo>
+                  <a:lnTo>
+                    <a:pt x="0" y="179070"/>
+                  </a:lnTo>
+                  <a:close/>
+                </a:path>
+              </a:pathLst>
+            </a:custGeom>
+            <a:grpFill/>
+            <a:ln w="9525" cap="flat">
+              <a:noFill/>
+              <a:prstDash val="solid"/>
+              <a:miter/>
+            </a:ln>
+          </p:spPr>
+          <p:txBody>
+            <a:bodyPr/>
+            <a:lstStyle/>
+            <a:p>
+              <a:endParaRPr lang="en-US"/>
+            </a:p>
+          </p:txBody>
+        </p:sp>
+      </p:grpSp>
+      <p:sp>
+        <p:nvSpPr>
+          <p:cNvPr id="22" name="Rounded Rectangle 21">
+            <a:extLst>
+              <a:ext uri="{FF2B5EF4-FFF2-40B4-BE49-F238E27FC236}">
+                <a16:creationId xmlns:a16="http://schemas.microsoft.com/office/drawing/2014/main" id="{97967A1D-0E27-05AF-538E-C0428D345A66}"/>
+              </a:ext>
+            </a:extLst>
+          </p:cNvPr>
+          <p:cNvSpPr/>
+          <p:nvPr/>
+        </p:nvSpPr>
+        <p:spPr>
+          <a:xfrm>
+            <a:off x="7241901" y="4237844"/>
+            <a:ext cx="2281399" cy="1038058"/>
+          </a:xfrm>
+          <a:prstGeom prst="roundRect">
+            <a:avLst/>
+          </a:prstGeom>
+        </p:spPr>
+        <p:style>
+          <a:lnRef idx="2">
+            <a:schemeClr val="accent1"/>
+          </a:lnRef>
+          <a:fillRef idx="1">
+            <a:schemeClr val="lt1"/>
+          </a:fillRef>
+          <a:effectRef idx="0">
+            <a:schemeClr val="accent1"/>
+          </a:effectRef>
+          <a:fontRef idx="minor">
+            <a:schemeClr val="dk1"/>
+          </a:fontRef>
+        </p:style>
+        <p:txBody>
+          <a:bodyPr rtlCol="0" anchor="ctr"/>
+          <a:lstStyle/>
+          <a:p>
+            <a:pPr algn="r"/>
+            <a:r>
+              <a:rPr lang="en-US" sz="1600"/>
+              <a:t>Docker container</a:t>
+            </a:r>
+          </a:p>
+        </p:txBody>
+      </p:sp>
+      <p:grpSp>
+        <p:nvGrpSpPr>
+          <p:cNvPr id="23" name="Graphic 12" descr="Box with solid fill">
+            <a:extLst>
+              <a:ext uri="{FF2B5EF4-FFF2-40B4-BE49-F238E27FC236}">
+                <a16:creationId xmlns:a16="http://schemas.microsoft.com/office/drawing/2014/main" id="{0BCF22AA-12AB-7948-4BB9-F0A103CF4802}"/>
+              </a:ext>
+            </a:extLst>
+          </p:cNvPr>
+          <p:cNvGrpSpPr/>
+          <p:nvPr/>
+        </p:nvGrpSpPr>
+        <p:grpSpPr>
+          <a:xfrm>
+            <a:off x="7398492" y="4473107"/>
+            <a:ext cx="429547" cy="512853"/>
+            <a:chOff x="9377321" y="1183646"/>
+            <a:chExt cx="628650" cy="750570"/>
+          </a:xfrm>
+          <a:solidFill>
+            <a:schemeClr val="accent5"/>
+          </a:solidFill>
+        </p:grpSpPr>
+        <p:sp>
+          <p:nvSpPr>
+            <p:cNvPr id="24" name="Freeform 23">
+              <a:extLst>
+                <a:ext uri="{FF2B5EF4-FFF2-40B4-BE49-F238E27FC236}">
+                  <a16:creationId xmlns:a16="http://schemas.microsoft.com/office/drawing/2014/main" id="{7484FE36-D212-092B-7F3D-BFA988CB1A7B}"/>
+                </a:ext>
+              </a:extLst>
+            </p:cNvPr>
+            <p:cNvSpPr/>
+            <p:nvPr/>
+          </p:nvSpPr>
+          <p:spPr>
+            <a:xfrm>
+              <a:off x="9377321" y="1287468"/>
+              <a:ext cx="457200" cy="277177"/>
+            </a:xfrm>
+            <a:custGeom>
+              <a:avLst/>
+              <a:gdLst>
+                <a:gd name="csX0" fmla="*/ 142875 w 457200"/>
+                <a:gd name="csY0" fmla="*/ 0 h 277177"/>
+                <a:gd name="csX1" fmla="*/ 0 w 457200"/>
+                <a:gd name="csY1" fmla="*/ 86678 h 277177"/>
+                <a:gd name="csX2" fmla="*/ 314325 w 457200"/>
+                <a:gd name="csY2" fmla="*/ 277178 h 277177"/>
+                <a:gd name="csX3" fmla="*/ 457200 w 457200"/>
+                <a:gd name="csY3" fmla="*/ 190500 h 277177"/>
+              </a:gdLst>
+              <a:ahLst/>
+              <a:cxnLst>
+                <a:cxn ang="0">
+                  <a:pos x="csX0" y="csY0"/>
+                </a:cxn>
+                <a:cxn ang="0">
+                  <a:pos x="csX1" y="csY1"/>
+                </a:cxn>
+                <a:cxn ang="0">
+                  <a:pos x="csX2" y="csY2"/>
+                </a:cxn>
+                <a:cxn ang="0">
+                  <a:pos x="csX3" y="csY3"/>
+                </a:cxn>
+              </a:cxnLst>
+              <a:rect l="l" t="t" r="r" b="b"/>
+              <a:pathLst>
+                <a:path w="457200" h="277177">
+                  <a:moveTo>
+                    <a:pt x="142875" y="0"/>
+                  </a:moveTo>
+                  <a:lnTo>
+                    <a:pt x="0" y="86678"/>
+                  </a:lnTo>
+                  <a:lnTo>
+                    <a:pt x="314325" y="277178"/>
+                  </a:lnTo>
+                  <a:lnTo>
+                    <a:pt x="457200" y="190500"/>
+                  </a:lnTo>
+                  <a:close/>
+                </a:path>
+              </a:pathLst>
+            </a:custGeom>
+            <a:grpFill/>
+            <a:ln w="9525" cap="flat">
+              <a:noFill/>
+              <a:prstDash val="solid"/>
+              <a:miter/>
+            </a:ln>
+          </p:spPr>
+          <p:txBody>
+            <a:bodyPr/>
+            <a:lstStyle/>
+            <a:p>
+              <a:endParaRPr lang="en-US"/>
+            </a:p>
+          </p:txBody>
+        </p:sp>
+        <p:sp>
+          <p:nvSpPr>
+            <p:cNvPr id="25" name="Freeform 24">
+              <a:extLst>
+                <a:ext uri="{FF2B5EF4-FFF2-40B4-BE49-F238E27FC236}">
+                  <a16:creationId xmlns:a16="http://schemas.microsoft.com/office/drawing/2014/main" id="{2FB332AF-5A16-A140-94D9-54FED4B0B0C7}"/>
+                </a:ext>
+              </a:extLst>
+            </p:cNvPr>
+            <p:cNvSpPr/>
+            <p:nvPr/>
+          </p:nvSpPr>
+          <p:spPr>
+            <a:xfrm>
+              <a:off x="9556390" y="1183646"/>
+              <a:ext cx="449580" cy="272415"/>
+            </a:xfrm>
+            <a:custGeom>
+              <a:avLst/>
+              <a:gdLst>
+                <a:gd name="csX0" fmla="*/ 449580 w 449580"/>
+                <a:gd name="csY0" fmla="*/ 190500 h 272415"/>
+                <a:gd name="csX1" fmla="*/ 135255 w 449580"/>
+                <a:gd name="csY1" fmla="*/ 0 h 272415"/>
+                <a:gd name="csX2" fmla="*/ 0 w 449580"/>
+                <a:gd name="csY2" fmla="*/ 81915 h 272415"/>
+                <a:gd name="csX3" fmla="*/ 314325 w 449580"/>
+                <a:gd name="csY3" fmla="*/ 272415 h 272415"/>
+              </a:gdLst>
+              <a:ahLst/>
+              <a:cxnLst>
+                <a:cxn ang="0">
+                  <a:pos x="csX0" y="csY0"/>
+                </a:cxn>
+                <a:cxn ang="0">
+                  <a:pos x="csX1" y="csY1"/>
+                </a:cxn>
+                <a:cxn ang="0">
+                  <a:pos x="csX2" y="csY2"/>
+                </a:cxn>
+                <a:cxn ang="0">
+                  <a:pos x="csX3" y="csY3"/>
+                </a:cxn>
+              </a:cxnLst>
+              <a:rect l="l" t="t" r="r" b="b"/>
+              <a:pathLst>
+                <a:path w="449580" h="272415">
+                  <a:moveTo>
+                    <a:pt x="449580" y="190500"/>
+                  </a:moveTo>
+                  <a:lnTo>
+                    <a:pt x="135255" y="0"/>
+                  </a:lnTo>
+                  <a:lnTo>
+                    <a:pt x="0" y="81915"/>
+                  </a:lnTo>
+                  <a:lnTo>
+                    <a:pt x="314325" y="272415"/>
+                  </a:lnTo>
+                  <a:close/>
+                </a:path>
+              </a:pathLst>
+            </a:custGeom>
+            <a:grpFill/>
+            <a:ln w="9525" cap="flat">
+              <a:noFill/>
+              <a:prstDash val="solid"/>
+              <a:miter/>
+            </a:ln>
+          </p:spPr>
+          <p:txBody>
+            <a:bodyPr/>
+            <a:lstStyle/>
+            <a:p>
+              <a:endParaRPr lang="en-US"/>
+            </a:p>
+          </p:txBody>
+        </p:sp>
+        <p:sp>
+          <p:nvSpPr>
+            <p:cNvPr id="26" name="Freeform 25">
+              <a:extLst>
+                <a:ext uri="{FF2B5EF4-FFF2-40B4-BE49-F238E27FC236}">
+                  <a16:creationId xmlns:a16="http://schemas.microsoft.com/office/drawing/2014/main" id="{B9F2DA4F-5DC1-7829-E1DF-453461FBCD9F}"/>
+                </a:ext>
+              </a:extLst>
+            </p:cNvPr>
+            <p:cNvSpPr/>
+            <p:nvPr/>
+          </p:nvSpPr>
+          <p:spPr>
+            <a:xfrm>
+              <a:off x="9377321" y="1418913"/>
+              <a:ext cx="295275" cy="515302"/>
+            </a:xfrm>
+            <a:custGeom>
+              <a:avLst/>
+              <a:gdLst>
+                <a:gd name="csX0" fmla="*/ 0 w 295275"/>
+                <a:gd name="csY0" fmla="*/ 31432 h 515302"/>
+                <a:gd name="csX1" fmla="*/ 0 w 295275"/>
+                <a:gd name="csY1" fmla="*/ 336233 h 515302"/>
+                <a:gd name="csX2" fmla="*/ 295275 w 295275"/>
+                <a:gd name="csY2" fmla="*/ 515303 h 515302"/>
+                <a:gd name="csX3" fmla="*/ 295275 w 295275"/>
+                <a:gd name="csY3" fmla="*/ 179070 h 515302"/>
+                <a:gd name="csX4" fmla="*/ 0 w 295275"/>
+                <a:gd name="csY4" fmla="*/ 0 h 515302"/>
+              </a:gdLst>
+              <a:ahLst/>
+              <a:cxnLst>
+                <a:cxn ang="0">
+                  <a:pos x="csX0" y="csY0"/>
+                </a:cxn>
+                <a:cxn ang="0">
+                  <a:pos x="csX1" y="csY1"/>
+                </a:cxn>
+                <a:cxn ang="0">
+                  <a:pos x="csX2" y="csY2"/>
+                </a:cxn>
+                <a:cxn ang="0">
+                  <a:pos x="csX3" y="csY3"/>
+                </a:cxn>
+                <a:cxn ang="0">
+                  <a:pos x="csX4" y="csY4"/>
+                </a:cxn>
+              </a:cxnLst>
+              <a:rect l="l" t="t" r="r" b="b"/>
+              <a:pathLst>
+                <a:path w="295275" h="515302">
+                  <a:moveTo>
+                    <a:pt x="0" y="31432"/>
+                  </a:moveTo>
+                  <a:lnTo>
+                    <a:pt x="0" y="336233"/>
+                  </a:lnTo>
+                  <a:lnTo>
+                    <a:pt x="295275" y="515303"/>
+                  </a:lnTo>
+                  <a:lnTo>
+                    <a:pt x="295275" y="179070"/>
+                  </a:lnTo>
+                  <a:lnTo>
+                    <a:pt x="0" y="0"/>
+                  </a:lnTo>
+                  <a:close/>
+                </a:path>
+              </a:pathLst>
+            </a:custGeom>
+            <a:grpFill/>
+            <a:ln w="9525" cap="flat">
+              <a:noFill/>
+              <a:prstDash val="solid"/>
+              <a:miter/>
+            </a:ln>
+          </p:spPr>
+          <p:txBody>
+            <a:bodyPr/>
+            <a:lstStyle/>
+            <a:p>
+              <a:endParaRPr lang="en-US"/>
+            </a:p>
+          </p:txBody>
+        </p:sp>
+        <p:sp>
+          <p:nvSpPr>
+            <p:cNvPr id="27" name="Freeform 26">
+              <a:extLst>
+                <a:ext uri="{FF2B5EF4-FFF2-40B4-BE49-F238E27FC236}">
+                  <a16:creationId xmlns:a16="http://schemas.microsoft.com/office/drawing/2014/main" id="{D4088669-DB50-9D08-0769-E09F69B28B30}"/>
+                </a:ext>
+              </a:extLst>
+            </p:cNvPr>
+            <p:cNvSpPr/>
+            <p:nvPr/>
+          </p:nvSpPr>
+          <p:spPr>
+            <a:xfrm>
+              <a:off x="9710696" y="1418913"/>
+              <a:ext cx="295275" cy="515302"/>
+            </a:xfrm>
+            <a:custGeom>
+              <a:avLst/>
+              <a:gdLst>
+                <a:gd name="csX0" fmla="*/ 104775 w 295275"/>
+                <a:gd name="csY0" fmla="*/ 231458 h 515302"/>
+                <a:gd name="csX1" fmla="*/ 38100 w 295275"/>
+                <a:gd name="csY1" fmla="*/ 269558 h 515302"/>
+                <a:gd name="csX2" fmla="*/ 38100 w 295275"/>
+                <a:gd name="csY2" fmla="*/ 202883 h 515302"/>
+                <a:gd name="csX3" fmla="*/ 104775 w 295275"/>
+                <a:gd name="csY3" fmla="*/ 164783 h 515302"/>
+                <a:gd name="csX4" fmla="*/ 104775 w 295275"/>
+                <a:gd name="csY4" fmla="*/ 231458 h 515302"/>
+                <a:gd name="csX5" fmla="*/ 0 w 295275"/>
+                <a:gd name="csY5" fmla="*/ 179070 h 515302"/>
+                <a:gd name="csX6" fmla="*/ 0 w 295275"/>
+                <a:gd name="csY6" fmla="*/ 515303 h 515302"/>
+                <a:gd name="csX7" fmla="*/ 295275 w 295275"/>
+                <a:gd name="csY7" fmla="*/ 336233 h 515302"/>
+                <a:gd name="csX8" fmla="*/ 295275 w 295275"/>
+                <a:gd name="csY8" fmla="*/ 0 h 515302"/>
+                <a:gd name="csX9" fmla="*/ 0 w 295275"/>
+                <a:gd name="csY9" fmla="*/ 179070 h 515302"/>
+              </a:gdLst>
+              <a:ahLst/>
+              <a:cxnLst>
+                <a:cxn ang="0">
+                  <a:pos x="csX0" y="csY0"/>
+                </a:cxn>
+                <a:cxn ang="0">
+                  <a:pos x="csX1" y="csY1"/>
+                </a:cxn>
+                <a:cxn ang="0">
+                  <a:pos x="csX2" y="csY2"/>
+                </a:cxn>
+                <a:cxn ang="0">
+                  <a:pos x="csX3" y="csY3"/>
+                </a:cxn>
+                <a:cxn ang="0">
+                  <a:pos x="csX4" y="csY4"/>
+                </a:cxn>
+                <a:cxn ang="0">
+                  <a:pos x="csX5" y="csY5"/>
+                </a:cxn>
+                <a:cxn ang="0">
+                  <a:pos x="csX6" y="csY6"/>
+                </a:cxn>
+                <a:cxn ang="0">
+                  <a:pos x="csX7" y="csY7"/>
+                </a:cxn>
+                <a:cxn ang="0">
+                  <a:pos x="csX8" y="csY8"/>
+                </a:cxn>
+                <a:cxn ang="0">
+                  <a:pos x="csX9" y="csY9"/>
+                </a:cxn>
+              </a:cxnLst>
+              <a:rect l="l" t="t" r="r" b="b"/>
+              <a:pathLst>
+                <a:path w="295275" h="515302">
+                  <a:moveTo>
+                    <a:pt x="104775" y="231458"/>
+                  </a:moveTo>
+                  <a:lnTo>
+                    <a:pt x="38100" y="269558"/>
+                  </a:lnTo>
+                  <a:lnTo>
+                    <a:pt x="38100" y="202883"/>
+                  </a:lnTo>
+                  <a:lnTo>
+                    <a:pt x="104775" y="164783"/>
+                  </a:lnTo>
+                  <a:lnTo>
+                    <a:pt x="104775" y="231458"/>
+                  </a:lnTo>
+                  <a:close/>
+                  <a:moveTo>
+                    <a:pt x="0" y="179070"/>
+                  </a:moveTo>
+                  <a:lnTo>
+                    <a:pt x="0" y="515303"/>
+                  </a:lnTo>
+                  <a:lnTo>
+                    <a:pt x="295275" y="336233"/>
+                  </a:lnTo>
+                  <a:lnTo>
+                    <a:pt x="295275" y="0"/>
+                  </a:lnTo>
+                  <a:lnTo>
+                    <a:pt x="0" y="179070"/>
+                  </a:lnTo>
+                  <a:close/>
+                </a:path>
+              </a:pathLst>
+            </a:custGeom>
+            <a:grpFill/>
+            <a:ln w="9525" cap="flat">
+              <a:noFill/>
+              <a:prstDash val="solid"/>
+              <a:miter/>
+            </a:ln>
+          </p:spPr>
+          <p:txBody>
+            <a:bodyPr/>
+            <a:lstStyle/>
+            <a:p>
+              <a:endParaRPr lang="en-US"/>
+            </a:p>
+          </p:txBody>
+        </p:sp>
+      </p:grpSp>
+      <p:cxnSp>
+        <p:nvCxnSpPr>
+          <p:cNvPr id="29" name="Straight Connector 28">
+            <a:extLst>
+              <a:ext uri="{FF2B5EF4-FFF2-40B4-BE49-F238E27FC236}">
+                <a16:creationId xmlns:a16="http://schemas.microsoft.com/office/drawing/2014/main" id="{C3BD4254-4828-25DD-CDBD-0DD19605F494}"/>
+              </a:ext>
+            </a:extLst>
+          </p:cNvPr>
+          <p:cNvCxnSpPr>
+            <a:cxnSpLocks/>
+            <a:stCxn id="3" idx="2"/>
+            <a:endCxn id="4" idx="0"/>
+          </p:cNvCxnSpPr>
+          <p:nvPr/>
+        </p:nvCxnSpPr>
+        <p:spPr>
+          <a:xfrm>
+            <a:off x="3592796" y="1348240"/>
+            <a:ext cx="0" cy="1001807"/>
+          </a:xfrm>
+          <a:prstGeom prst="line">
+            <a:avLst/>
+          </a:prstGeom>
+          <a:ln w="28575"/>
+        </p:spPr>
+        <p:style>
+          <a:lnRef idx="1">
+            <a:schemeClr val="accent1"/>
+          </a:lnRef>
+          <a:fillRef idx="0">
+            <a:schemeClr val="accent1"/>
+          </a:fillRef>
+          <a:effectRef idx="0">
+            <a:schemeClr val="accent1"/>
+          </a:effectRef>
+          <a:fontRef idx="minor">
+            <a:schemeClr val="tx1"/>
+          </a:fontRef>
+        </p:style>
+      </p:cxnSp>
+      <p:cxnSp>
+        <p:nvCxnSpPr>
+          <p:cNvPr id="30" name="Straight Connector 29">
+            <a:extLst>
+              <a:ext uri="{FF2B5EF4-FFF2-40B4-BE49-F238E27FC236}">
+                <a16:creationId xmlns:a16="http://schemas.microsoft.com/office/drawing/2014/main" id="{92C2D7D5-CBAF-7AF4-C1EE-622090B22F32}"/>
+              </a:ext>
+            </a:extLst>
+          </p:cNvPr>
+          <p:cNvCxnSpPr>
+            <a:cxnSpLocks/>
+            <a:stCxn id="4" idx="3"/>
+            <a:endCxn id="5" idx="1"/>
+          </p:cNvCxnSpPr>
+          <p:nvPr/>
+        </p:nvCxnSpPr>
+        <p:spPr>
+          <a:xfrm flipV="1">
+            <a:off x="4575513" y="2282301"/>
+            <a:ext cx="566950" cy="539726"/>
+          </a:xfrm>
+          <a:prstGeom prst="line">
+            <a:avLst/>
+          </a:prstGeom>
+          <a:ln w="28575"/>
+        </p:spPr>
+        <p:style>
+          <a:lnRef idx="1">
+            <a:schemeClr val="accent1"/>
+          </a:lnRef>
+          <a:fillRef idx="0">
+            <a:schemeClr val="accent1"/>
+          </a:fillRef>
+          <a:effectRef idx="0">
+            <a:schemeClr val="accent1"/>
+          </a:effectRef>
+          <a:fontRef idx="minor">
+            <a:schemeClr val="tx1"/>
+          </a:fontRef>
+        </p:style>
+      </p:cxnSp>
+      <p:cxnSp>
+        <p:nvCxnSpPr>
+          <p:cNvPr id="33" name="Straight Connector 32">
+            <a:extLst>
+              <a:ext uri="{FF2B5EF4-FFF2-40B4-BE49-F238E27FC236}">
+                <a16:creationId xmlns:a16="http://schemas.microsoft.com/office/drawing/2014/main" id="{DCBAFB78-133D-164D-3A87-93ADDF5CCCF3}"/>
+              </a:ext>
+            </a:extLst>
+          </p:cNvPr>
+          <p:cNvCxnSpPr>
+            <a:cxnSpLocks/>
+            <a:stCxn id="4" idx="3"/>
+            <a:endCxn id="9" idx="1"/>
+          </p:cNvCxnSpPr>
+          <p:nvPr/>
+        </p:nvCxnSpPr>
+        <p:spPr>
+          <a:xfrm>
+            <a:off x="4575513" y="2822027"/>
+            <a:ext cx="566950" cy="632959"/>
+          </a:xfrm>
+          <a:prstGeom prst="line">
+            <a:avLst/>
+          </a:prstGeom>
+          <a:ln w="28575"/>
+        </p:spPr>
+        <p:style>
+          <a:lnRef idx="1">
+            <a:schemeClr val="accent1"/>
+          </a:lnRef>
+          <a:fillRef idx="0">
+            <a:schemeClr val="accent1"/>
+          </a:fillRef>
+          <a:effectRef idx="0">
+            <a:schemeClr val="accent1"/>
+          </a:effectRef>
+          <a:fontRef idx="minor">
+            <a:schemeClr val="tx1"/>
+          </a:fontRef>
+        </p:style>
+      </p:cxnSp>
+      <p:cxnSp>
+        <p:nvCxnSpPr>
+          <p:cNvPr id="36" name="Straight Connector 35">
+            <a:extLst>
+              <a:ext uri="{FF2B5EF4-FFF2-40B4-BE49-F238E27FC236}">
+                <a16:creationId xmlns:a16="http://schemas.microsoft.com/office/drawing/2014/main" id="{B3CA7B34-BD32-BB56-E188-60CAD0C8EC20}"/>
+              </a:ext>
+            </a:extLst>
+          </p:cNvPr>
+          <p:cNvCxnSpPr>
+            <a:cxnSpLocks/>
+            <a:stCxn id="5" idx="3"/>
+            <a:endCxn id="21" idx="1"/>
+          </p:cNvCxnSpPr>
+          <p:nvPr/>
+        </p:nvCxnSpPr>
+        <p:spPr>
+          <a:xfrm>
+            <a:off x="6761270" y="2282301"/>
+            <a:ext cx="480631" cy="0"/>
+          </a:xfrm>
+          <a:prstGeom prst="line">
+            <a:avLst/>
+          </a:prstGeom>
+          <a:ln w="28575"/>
+        </p:spPr>
+        <p:style>
+          <a:lnRef idx="1">
+            <a:schemeClr val="accent1"/>
+          </a:lnRef>
+          <a:fillRef idx="0">
+            <a:schemeClr val="accent1"/>
+          </a:fillRef>
+          <a:effectRef idx="0">
+            <a:schemeClr val="accent1"/>
+          </a:effectRef>
+          <a:fontRef idx="minor">
+            <a:schemeClr val="tx1"/>
+          </a:fontRef>
+        </p:style>
+      </p:cxnSp>
+      <p:cxnSp>
+        <p:nvCxnSpPr>
+          <p:cNvPr id="39" name="Straight Connector 38">
+            <a:extLst>
+              <a:ext uri="{FF2B5EF4-FFF2-40B4-BE49-F238E27FC236}">
+                <a16:creationId xmlns:a16="http://schemas.microsoft.com/office/drawing/2014/main" id="{D3F0BE3F-B3AF-902C-2074-BA2EB84430BF}"/>
+              </a:ext>
+            </a:extLst>
+          </p:cNvPr>
+          <p:cNvCxnSpPr>
+            <a:cxnSpLocks/>
+            <a:stCxn id="9" idx="2"/>
+            <a:endCxn id="11" idx="0"/>
+          </p:cNvCxnSpPr>
+          <p:nvPr/>
+        </p:nvCxnSpPr>
+        <p:spPr>
+          <a:xfrm flipH="1">
+            <a:off x="5944750" y="3817592"/>
+            <a:ext cx="7117" cy="463706"/>
+          </a:xfrm>
+          <a:prstGeom prst="line">
+            <a:avLst/>
+          </a:prstGeom>
+          <a:ln w="28575"/>
+        </p:spPr>
+        <p:style>
+          <a:lnRef idx="1">
+            <a:schemeClr val="accent1"/>
+          </a:lnRef>
+          <a:fillRef idx="0">
+            <a:schemeClr val="accent1"/>
+          </a:fillRef>
+          <a:effectRef idx="0">
+            <a:schemeClr val="accent1"/>
+          </a:effectRef>
+          <a:fontRef idx="minor">
+            <a:schemeClr val="tx1"/>
+          </a:fontRef>
+        </p:style>
+      </p:cxnSp>
+      <p:cxnSp>
+        <p:nvCxnSpPr>
+          <p:cNvPr id="42" name="Straight Connector 41">
+            <a:extLst>
+              <a:ext uri="{FF2B5EF4-FFF2-40B4-BE49-F238E27FC236}">
+                <a16:creationId xmlns:a16="http://schemas.microsoft.com/office/drawing/2014/main" id="{8486C7CB-3013-ED61-13DF-3AAB40C7ACD5}"/>
+              </a:ext>
+            </a:extLst>
+          </p:cNvPr>
+          <p:cNvCxnSpPr>
+            <a:cxnSpLocks/>
+            <a:stCxn id="22" idx="1"/>
+            <a:endCxn id="10" idx="3"/>
+          </p:cNvCxnSpPr>
+          <p:nvPr/>
+        </p:nvCxnSpPr>
+        <p:spPr>
+          <a:xfrm flipH="1">
+            <a:off x="6761270" y="4756873"/>
+            <a:ext cx="480631" cy="2576"/>
+          </a:xfrm>
+          <a:prstGeom prst="line">
+            <a:avLst/>
+          </a:prstGeom>
+          <a:ln w="28575"/>
+        </p:spPr>
+        <p:style>
+          <a:lnRef idx="1">
+            <a:schemeClr val="accent1"/>
+          </a:lnRef>
+          <a:fillRef idx="0">
+            <a:schemeClr val="accent1"/>
+          </a:fillRef>
+          <a:effectRef idx="0">
+            <a:schemeClr val="accent1"/>
+          </a:effectRef>
+          <a:fontRef idx="minor">
+            <a:schemeClr val="tx1"/>
+          </a:fontRef>
+        </p:style>
+      </p:cxnSp>
+    </p:spTree>
+    <p:extLst>
+      <p:ext uri="{BB962C8B-B14F-4D97-AF65-F5344CB8AC3E}">
+        <p14:creationId xmlns:p14="http://schemas.microsoft.com/office/powerpoint/2010/main" val="3123655805"/>
+      </p:ext>
+    </p:extLst>
+  </p:cSld>
+  <p:clrMapOvr>
+    <a:masterClrMapping/>
+  </p:clrMapOvr>
+</p:sld>
+</file>
+
+<file path=ppt/slides/slide52.xml><?xml version="1.0" encoding="utf-8"?>
+<p:sld xmlns:a="http://schemas.openxmlformats.org/drawingml/2006/main" xmlns:r="http://schemas.openxmlformats.org/officeDocument/2006/relationships" xmlns:p="http://schemas.openxmlformats.org/presentationml/2006/main">
+  <p:cSld>
+    <p:spTree>
+      <p:nvGrpSpPr>
+        <p:cNvPr id="1" name=""/>
+        <p:cNvGrpSpPr/>
+        <p:nvPr/>
+      </p:nvGrpSpPr>
+      <p:grpSpPr>
+        <a:xfrm>
+          <a:off x="0" y="0"/>
+          <a:ext cx="0" cy="0"/>
+          <a:chOff x="0" y="0"/>
+          <a:chExt cx="0" cy="0"/>
+        </a:xfrm>
+      </p:grpSpPr>
+      <p:sp>
+        <p:nvSpPr>
+          <p:cNvPr id="2" name="Rounded Rectangle 1">
+            <a:extLst>
+              <a:ext uri="{FF2B5EF4-FFF2-40B4-BE49-F238E27FC236}">
+                <a16:creationId xmlns:a16="http://schemas.microsoft.com/office/drawing/2014/main" id="{61EA41CE-57A6-B5AB-CB80-C0450F65AD00}"/>
+              </a:ext>
+            </a:extLst>
+          </p:cNvPr>
+          <p:cNvSpPr/>
+          <p:nvPr/>
+        </p:nvSpPr>
+        <p:spPr>
+          <a:xfrm>
+            <a:off x="1513491" y="2680138"/>
+            <a:ext cx="7672550" cy="3121574"/>
+          </a:xfrm>
+          <a:prstGeom prst="roundRect">
+            <a:avLst/>
+          </a:prstGeom>
+        </p:spPr>
+        <p:style>
+          <a:lnRef idx="2">
+            <a:schemeClr val="accent1"/>
+          </a:lnRef>
+          <a:fillRef idx="1">
+            <a:schemeClr val="lt1"/>
+          </a:fillRef>
+          <a:effectRef idx="0">
+            <a:schemeClr val="accent1"/>
+          </a:effectRef>
+          <a:fontRef idx="minor">
+            <a:schemeClr val="dk1"/>
+          </a:fontRef>
+        </p:style>
+        <p:txBody>
+          <a:bodyPr lIns="90000" rtlCol="0" anchor="t" anchorCtr="0"/>
+          <a:lstStyle/>
+          <a:p>
+            <a:r>
+              <a:rPr lang="en-US"/>
+              <a:t>Your computer</a:t>
+            </a:r>
+          </a:p>
+        </p:txBody>
+      </p:sp>
+      <p:sp>
+        <p:nvSpPr>
+          <p:cNvPr id="3" name="Rounded Rectangle 2">
+            <a:extLst>
+              <a:ext uri="{FF2B5EF4-FFF2-40B4-BE49-F238E27FC236}">
+                <a16:creationId xmlns:a16="http://schemas.microsoft.com/office/drawing/2014/main" id="{ACFC4BFE-7FB9-7AF0-F9A5-0894AC698C95}"/>
+              </a:ext>
+            </a:extLst>
+          </p:cNvPr>
+          <p:cNvSpPr/>
+          <p:nvPr/>
+        </p:nvSpPr>
+        <p:spPr>
+          <a:xfrm>
+            <a:off x="3741683" y="3238497"/>
+            <a:ext cx="3111062" cy="2341182"/>
+          </a:xfrm>
+          <a:prstGeom prst="roundRect">
+            <a:avLst/>
+          </a:prstGeom>
+          <a:solidFill>
+            <a:schemeClr val="accent2">
+              <a:lumMod val="20000"/>
+              <a:lumOff val="80000"/>
+            </a:schemeClr>
+          </a:solidFill>
+        </p:spPr>
+        <p:style>
+          <a:lnRef idx="2">
+            <a:schemeClr val="accent1"/>
+          </a:lnRef>
+          <a:fillRef idx="1">
+            <a:schemeClr val="lt1"/>
+          </a:fillRef>
+          <a:effectRef idx="0">
+            <a:schemeClr val="accent1"/>
+          </a:effectRef>
+          <a:fontRef idx="minor">
+            <a:schemeClr val="dk1"/>
+          </a:fontRef>
+        </p:style>
+        <p:txBody>
+          <a:bodyPr rtlCol="0" anchor="ctr"/>
+          <a:lstStyle/>
+          <a:p>
+            <a:pPr algn="ctr"/>
+            <a:r>
+              <a:rPr lang="en-US"/>
+              <a:t>Docker container</a:t>
+            </a:r>
+          </a:p>
+          <a:p>
+            <a:pPr algn="ctr"/>
+            <a:endParaRPr lang="en-US"/>
+          </a:p>
+          <a:p>
+            <a:pPr marL="742950" lvl="1" indent="-285750">
+              <a:buFont typeface="Arial" panose="020B0604020202020204" pitchFamily="34" charset="0"/>
+              <a:buChar char="•"/>
+            </a:pPr>
+            <a:r>
+              <a:rPr lang="en-US" sz="1600"/>
+              <a:t>.NET MAUI 9</a:t>
+            </a:r>
+          </a:p>
+          <a:p>
+            <a:pPr marL="742950" lvl="1" indent="-285750">
+              <a:buFont typeface="Arial" panose="020B0604020202020204" pitchFamily="34" charset="0"/>
+              <a:buChar char="•"/>
+            </a:pPr>
+            <a:r>
+              <a:rPr lang="en-US" sz="1600"/>
+              <a:t>MAUI workloads</a:t>
+            </a:r>
+          </a:p>
+          <a:p>
+            <a:pPr marL="742950" lvl="1" indent="-285750">
+              <a:buFont typeface="Arial" panose="020B0604020202020204" pitchFamily="34" charset="0"/>
+              <a:buChar char="•"/>
+            </a:pPr>
+            <a:r>
+              <a:rPr lang="en-US" sz="1600"/>
+              <a:t>Java SDK</a:t>
+            </a:r>
+          </a:p>
+          <a:p>
+            <a:pPr marL="742950" lvl="1" indent="-285750">
+              <a:buFont typeface="Arial" panose="020B0604020202020204" pitchFamily="34" charset="0"/>
+              <a:buChar char="•"/>
+            </a:pPr>
+            <a:r>
+              <a:rPr lang="en-US" sz="1600"/>
+              <a:t>Android SDK</a:t>
+            </a:r>
+          </a:p>
+          <a:p>
+            <a:pPr marL="742950" lvl="1" indent="-285750">
+              <a:buFont typeface="Arial" panose="020B0604020202020204" pitchFamily="34" charset="0"/>
+              <a:buChar char="•"/>
+            </a:pPr>
+            <a:r>
+              <a:rPr lang="en-US" sz="1600"/>
+              <a:t>Android cmdline-tools</a:t>
+            </a:r>
+          </a:p>
+          <a:p>
+            <a:pPr marL="742950" lvl="1" indent="-285750">
+              <a:buFont typeface="Arial" panose="020B0604020202020204" pitchFamily="34" charset="0"/>
+              <a:buChar char="•"/>
+            </a:pPr>
+            <a:r>
+              <a:rPr lang="en-US" sz="1600"/>
+              <a:t>PosgreSQL client</a:t>
+            </a:r>
+          </a:p>
+        </p:txBody>
+      </p:sp>
+      <p:sp>
+        <p:nvSpPr>
+          <p:cNvPr id="4" name="Rounded Rectangle 3">
+            <a:extLst>
+              <a:ext uri="{FF2B5EF4-FFF2-40B4-BE49-F238E27FC236}">
+                <a16:creationId xmlns:a16="http://schemas.microsoft.com/office/drawing/2014/main" id="{62CE8BC0-F86E-31F5-0792-9397EFD6361D}"/>
+              </a:ext>
+            </a:extLst>
+          </p:cNvPr>
+          <p:cNvSpPr/>
+          <p:nvPr/>
+        </p:nvSpPr>
+        <p:spPr>
+          <a:xfrm>
+            <a:off x="1710559" y="3502572"/>
+            <a:ext cx="1295400" cy="1813033"/>
+          </a:xfrm>
+          <a:prstGeom prst="roundRect">
+            <a:avLst/>
+          </a:prstGeom>
+          <a:solidFill>
+            <a:schemeClr val="accent1">
+              <a:lumMod val="20000"/>
+              <a:lumOff val="80000"/>
+            </a:schemeClr>
+          </a:solidFill>
+        </p:spPr>
+        <p:style>
+          <a:lnRef idx="2">
+            <a:schemeClr val="accent1"/>
+          </a:lnRef>
+          <a:fillRef idx="1">
+            <a:schemeClr val="lt1"/>
+          </a:fillRef>
+          <a:effectRef idx="0">
+            <a:schemeClr val="accent1"/>
+          </a:effectRef>
+          <a:fontRef idx="minor">
+            <a:schemeClr val="dk1"/>
+          </a:fontRef>
+        </p:style>
+        <p:txBody>
+          <a:bodyPr rtlCol="0" anchor="ctr"/>
+          <a:lstStyle/>
+          <a:p>
+            <a:pPr algn="ctr"/>
+            <a:r>
+              <a:rPr lang="en-US"/>
+              <a:t>Android emulator</a:t>
+            </a:r>
+          </a:p>
+        </p:txBody>
+      </p:sp>
+      <p:sp>
+        <p:nvSpPr>
+          <p:cNvPr id="5" name="Rounded Rectangle 4">
+            <a:extLst>
+              <a:ext uri="{FF2B5EF4-FFF2-40B4-BE49-F238E27FC236}">
+                <a16:creationId xmlns:a16="http://schemas.microsoft.com/office/drawing/2014/main" id="{0DF3B869-F475-0157-B08E-8E421F7555CB}"/>
+              </a:ext>
+            </a:extLst>
+          </p:cNvPr>
+          <p:cNvSpPr/>
+          <p:nvPr/>
+        </p:nvSpPr>
+        <p:spPr>
+          <a:xfrm>
+            <a:off x="7588469" y="3502572"/>
+            <a:ext cx="1418897" cy="1813033"/>
+          </a:xfrm>
+          <a:prstGeom prst="roundRect">
+            <a:avLst/>
+          </a:prstGeom>
+          <a:solidFill>
+            <a:schemeClr val="accent6">
+              <a:lumMod val="20000"/>
+              <a:lumOff val="80000"/>
+            </a:schemeClr>
+          </a:solidFill>
+        </p:spPr>
+        <p:style>
+          <a:lnRef idx="2">
+            <a:schemeClr val="accent1"/>
+          </a:lnRef>
+          <a:fillRef idx="1">
+            <a:schemeClr val="lt1"/>
+          </a:fillRef>
+          <a:effectRef idx="0">
+            <a:schemeClr val="accent1"/>
+          </a:effectRef>
+          <a:fontRef idx="minor">
+            <a:schemeClr val="dk1"/>
+          </a:fontRef>
+        </p:style>
+        <p:txBody>
+          <a:bodyPr rtlCol="0" anchor="ctr"/>
+          <a:lstStyle/>
+          <a:p>
+            <a:pPr algn="ctr"/>
+            <a:r>
+              <a:rPr lang="en-US"/>
+              <a:t>Docker container</a:t>
+            </a:r>
+          </a:p>
+          <a:p>
+            <a:pPr algn="ctr"/>
+            <a:endParaRPr lang="en-US"/>
+          </a:p>
+          <a:p>
+            <a:pPr algn="ctr"/>
+            <a:r>
+              <a:rPr lang="en-US"/>
+              <a:t>PostgreSQL database</a:t>
+            </a:r>
+          </a:p>
+        </p:txBody>
+      </p:sp>
+      <p:sp>
+        <p:nvSpPr>
+          <p:cNvPr id="6" name="Rounded Rectangle 5">
+            <a:extLst>
+              <a:ext uri="{FF2B5EF4-FFF2-40B4-BE49-F238E27FC236}">
+                <a16:creationId xmlns:a16="http://schemas.microsoft.com/office/drawing/2014/main" id="{45417FF4-4A02-73B8-6C0D-694C962DEC81}"/>
+              </a:ext>
+            </a:extLst>
+          </p:cNvPr>
+          <p:cNvSpPr/>
+          <p:nvPr/>
+        </p:nvSpPr>
+        <p:spPr>
+          <a:xfrm>
+            <a:off x="4771696" y="430924"/>
+            <a:ext cx="1051035" cy="1753913"/>
+          </a:xfrm>
+          <a:prstGeom prst="roundRect">
+            <a:avLst/>
+          </a:prstGeom>
+          <a:solidFill>
+            <a:schemeClr val="accent1">
+              <a:lumMod val="20000"/>
+              <a:lumOff val="80000"/>
+            </a:schemeClr>
+          </a:solidFill>
+        </p:spPr>
+        <p:style>
+          <a:lnRef idx="2">
+            <a:schemeClr val="accent1"/>
+          </a:lnRef>
+          <a:fillRef idx="1">
+            <a:schemeClr val="lt1"/>
+          </a:fillRef>
+          <a:effectRef idx="0">
+            <a:schemeClr val="accent1"/>
+          </a:effectRef>
+          <a:fontRef idx="minor">
+            <a:schemeClr val="dk1"/>
+          </a:fontRef>
+        </p:style>
+        <p:txBody>
+          <a:bodyPr rtlCol="0" anchor="ctr"/>
+          <a:lstStyle/>
+          <a:p>
+            <a:pPr algn="ctr"/>
+            <a:r>
+              <a:rPr lang="en-US"/>
+              <a:t>Physical Android device</a:t>
+            </a:r>
+          </a:p>
+        </p:txBody>
+      </p:sp>
+      <p:cxnSp>
+        <p:nvCxnSpPr>
+          <p:cNvPr id="8" name="Straight Connector 7">
+            <a:extLst>
+              <a:ext uri="{FF2B5EF4-FFF2-40B4-BE49-F238E27FC236}">
+                <a16:creationId xmlns:a16="http://schemas.microsoft.com/office/drawing/2014/main" id="{8ADF3B96-72BE-25DD-176C-813134166620}"/>
+              </a:ext>
+            </a:extLst>
+          </p:cNvPr>
+          <p:cNvCxnSpPr>
+            <a:cxnSpLocks/>
+            <a:stCxn id="4" idx="3"/>
+            <a:endCxn id="3" idx="1"/>
+          </p:cNvCxnSpPr>
+          <p:nvPr/>
+        </p:nvCxnSpPr>
+        <p:spPr>
+          <a:xfrm flipV="1">
+            <a:off x="3005959" y="4409088"/>
+            <a:ext cx="735724" cy="1"/>
+          </a:xfrm>
+          <a:prstGeom prst="line">
+            <a:avLst/>
+          </a:prstGeom>
+          <a:ln w="28575"/>
+        </p:spPr>
+        <p:style>
+          <a:lnRef idx="1">
+            <a:schemeClr val="accent1"/>
+          </a:lnRef>
+          <a:fillRef idx="0">
+            <a:schemeClr val="accent1"/>
+          </a:fillRef>
+          <a:effectRef idx="0">
+            <a:schemeClr val="accent1"/>
+          </a:effectRef>
+          <a:fontRef idx="minor">
+            <a:schemeClr val="tx1"/>
+          </a:fontRef>
+        </p:style>
+      </p:cxnSp>
+      <p:cxnSp>
+        <p:nvCxnSpPr>
+          <p:cNvPr id="9" name="Straight Connector 8">
+            <a:extLst>
+              <a:ext uri="{FF2B5EF4-FFF2-40B4-BE49-F238E27FC236}">
+                <a16:creationId xmlns:a16="http://schemas.microsoft.com/office/drawing/2014/main" id="{1B590931-29A4-5457-FF5B-8E5FF997ED6C}"/>
+              </a:ext>
+            </a:extLst>
+          </p:cNvPr>
+          <p:cNvCxnSpPr>
+            <a:cxnSpLocks/>
+            <a:stCxn id="3" idx="3"/>
+            <a:endCxn id="5" idx="1"/>
+          </p:cNvCxnSpPr>
+          <p:nvPr/>
+        </p:nvCxnSpPr>
+        <p:spPr>
+          <a:xfrm>
+            <a:off x="6852745" y="4409088"/>
+            <a:ext cx="735724" cy="1"/>
+          </a:xfrm>
+          <a:prstGeom prst="line">
+            <a:avLst/>
+          </a:prstGeom>
+          <a:ln w="28575"/>
+        </p:spPr>
+        <p:style>
+          <a:lnRef idx="1">
+            <a:schemeClr val="accent1"/>
+          </a:lnRef>
+          <a:fillRef idx="0">
+            <a:schemeClr val="accent1"/>
+          </a:fillRef>
+          <a:effectRef idx="0">
+            <a:schemeClr val="accent1"/>
+          </a:effectRef>
+          <a:fontRef idx="minor">
+            <a:schemeClr val="tx1"/>
+          </a:fontRef>
+        </p:style>
+      </p:cxnSp>
+      <p:cxnSp>
+        <p:nvCxnSpPr>
+          <p:cNvPr id="12" name="Straight Connector 11">
+            <a:extLst>
+              <a:ext uri="{FF2B5EF4-FFF2-40B4-BE49-F238E27FC236}">
+                <a16:creationId xmlns:a16="http://schemas.microsoft.com/office/drawing/2014/main" id="{59EA0A69-2DE3-BB3E-A3E3-5E69005A0B90}"/>
+              </a:ext>
+            </a:extLst>
+          </p:cNvPr>
+          <p:cNvCxnSpPr>
+            <a:cxnSpLocks/>
+            <a:stCxn id="3" idx="0"/>
+            <a:endCxn id="6" idx="2"/>
+          </p:cNvCxnSpPr>
+          <p:nvPr/>
+        </p:nvCxnSpPr>
+        <p:spPr>
+          <a:xfrm flipV="1">
+            <a:off x="5297214" y="2184837"/>
+            <a:ext cx="0" cy="1053660"/>
+          </a:xfrm>
+          <a:prstGeom prst="line">
+            <a:avLst/>
+          </a:prstGeom>
+          <a:ln w="28575"/>
+        </p:spPr>
+        <p:style>
+          <a:lnRef idx="1">
+            <a:schemeClr val="accent1"/>
+          </a:lnRef>
+          <a:fillRef idx="0">
+            <a:schemeClr val="accent1"/>
+          </a:fillRef>
+          <a:effectRef idx="0">
+            <a:schemeClr val="accent1"/>
+          </a:effectRef>
+          <a:fontRef idx="minor">
+            <a:schemeClr val="tx1"/>
+          </a:fontRef>
+        </p:style>
+      </p:cxnSp>
+      <p:sp>
+        <p:nvSpPr>
+          <p:cNvPr id="19" name="TextBox 18">
+            <a:extLst>
+              <a:ext uri="{FF2B5EF4-FFF2-40B4-BE49-F238E27FC236}">
+                <a16:creationId xmlns:a16="http://schemas.microsoft.com/office/drawing/2014/main" id="{2676B6D8-4A8B-9024-AD44-545E22508662}"/>
+              </a:ext>
+            </a:extLst>
+          </p:cNvPr>
+          <p:cNvSpPr txBox="1"/>
+          <p:nvPr/>
+        </p:nvSpPr>
+        <p:spPr>
+          <a:xfrm>
+            <a:off x="2932387" y="3762757"/>
+            <a:ext cx="882869" cy="646331"/>
+          </a:xfrm>
+          <a:prstGeom prst="rect">
+            <a:avLst/>
+          </a:prstGeom>
+          <a:noFill/>
+        </p:spPr>
+        <p:txBody>
+          <a:bodyPr wrap="square" rtlCol="0">
+            <a:spAutoFit/>
+          </a:bodyPr>
+          <a:lstStyle/>
+          <a:p>
+            <a:pPr algn="ctr"/>
+            <a:r>
+              <a:rPr lang="en-US"/>
+              <a:t>ADB bridge</a:t>
+            </a:r>
+          </a:p>
+        </p:txBody>
+      </p:sp>
+      <p:sp>
+        <p:nvSpPr>
+          <p:cNvPr id="20" name="TextBox 19">
+            <a:extLst>
+              <a:ext uri="{FF2B5EF4-FFF2-40B4-BE49-F238E27FC236}">
+                <a16:creationId xmlns:a16="http://schemas.microsoft.com/office/drawing/2014/main" id="{D96AF8BB-DFBF-FF41-34BB-C0436673AAFA}"/>
+              </a:ext>
+            </a:extLst>
+          </p:cNvPr>
+          <p:cNvSpPr txBox="1"/>
+          <p:nvPr/>
+        </p:nvSpPr>
+        <p:spPr>
+          <a:xfrm>
+            <a:off x="5305098" y="2273439"/>
+            <a:ext cx="882869" cy="369332"/>
+          </a:xfrm>
+          <a:prstGeom prst="rect">
+            <a:avLst/>
+          </a:prstGeom>
+          <a:noFill/>
+        </p:spPr>
+        <p:txBody>
+          <a:bodyPr wrap="square" rtlCol="0">
+            <a:spAutoFit/>
+          </a:bodyPr>
+          <a:lstStyle/>
+          <a:p>
+            <a:r>
+              <a:rPr lang="en-US"/>
+              <a:t>USB</a:t>
+            </a:r>
+          </a:p>
+        </p:txBody>
+      </p:sp>
+    </p:spTree>
+    <p:extLst>
+      <p:ext uri="{BB962C8B-B14F-4D97-AF65-F5344CB8AC3E}">
+        <p14:creationId xmlns:p14="http://schemas.microsoft.com/office/powerpoint/2010/main" val="777442469"/>
+      </p:ext>
+    </p:extLst>
+  </p:cSld>
+  <p:clrMapOvr>
+    <a:masterClrMapping/>
+  </p:clrMapOvr>
+</p:sld>
+</file>
+
 <file path=ppt/slides/slide6.xml><?xml version="1.0" encoding="utf-8"?>
 <p:sld xmlns:a="http://schemas.openxmlformats.org/drawingml/2006/main" xmlns:r="http://schemas.openxmlformats.org/officeDocument/2006/relationships" xmlns:p="http://schemas.openxmlformats.org/presentationml/2006/main">
   <p:cSld>

</xml_diff>